<commit_message>
Add hands to controls
</commit_message>
<xml_diff>
--- a/GraphicDesign.pptx
+++ b/GraphicDesign.pptx
@@ -3369,7 +3369,7 @@
       </p:pic>
       <p:pic>
         <p:nvPicPr>
-          <p:cNvPr id="42" name="Picture 41"/>
+          <p:cNvPr id="45" name="Picture 44"/>
           <p:cNvPicPr>
             <a:picLocks noChangeAspect="1"/>
           </p:cNvPicPr>
@@ -3383,8 +3383,8 @@
         </p:blipFill>
         <p:spPr>
           <a:xfrm>
-            <a:off x="7549502" y="3188998"/>
-            <a:ext cx="409709" cy="413295"/>
+            <a:off x="7404576" y="3197531"/>
+            <a:ext cx="395668" cy="399131"/>
           </a:xfrm>
           <a:prstGeom prst="rect">
             <a:avLst/>
@@ -3393,22 +3393,22 @@
       </p:pic>
       <p:pic>
         <p:nvPicPr>
-          <p:cNvPr id="43" name="Picture 42"/>
+          <p:cNvPr id="48" name="Picture 47"/>
           <p:cNvPicPr>
             <a:picLocks noChangeAspect="1"/>
           </p:cNvPicPr>
           <p:nvPr/>
         </p:nvPicPr>
         <p:blipFill>
-          <a:blip r:embed="rId9"/>
+          <a:blip r:embed="rId10"/>
           <a:stretch>
             <a:fillRect/>
           </a:stretch>
         </p:blipFill>
         <p:spPr>
-          <a:xfrm flipH="1">
-            <a:off x="8131274" y="3183368"/>
-            <a:ext cx="409709" cy="413295"/>
+          <a:xfrm>
+            <a:off x="8021484" y="3188503"/>
+            <a:ext cx="401576" cy="408159"/>
           </a:xfrm>
           <a:prstGeom prst="rect">
             <a:avLst/>
@@ -4042,7 +4042,55 @@
         </p:blipFill>
         <p:spPr>
           <a:xfrm>
-            <a:off x="6726903" y="5602820"/>
+            <a:off x="5809225" y="3521658"/>
+            <a:ext cx="740696" cy="747179"/>
+          </a:xfrm>
+          <a:prstGeom prst="rect">
+            <a:avLst/>
+          </a:prstGeom>
+        </p:spPr>
+      </p:pic>
+      <p:pic>
+        <p:nvPicPr>
+          <p:cNvPr id="10" name="Picture 9"/>
+          <p:cNvPicPr>
+            <a:picLocks noChangeAspect="1"/>
+          </p:cNvPicPr>
+          <p:nvPr/>
+        </p:nvPicPr>
+        <p:blipFill>
+          <a:blip r:embed="rId4"/>
+          <a:stretch>
+            <a:fillRect/>
+          </a:stretch>
+        </p:blipFill>
+        <p:spPr>
+          <a:xfrm>
+            <a:off x="8005598" y="3197532"/>
+            <a:ext cx="399131" cy="399131"/>
+          </a:xfrm>
+          <a:prstGeom prst="rect">
+            <a:avLst/>
+          </a:prstGeom>
+        </p:spPr>
+      </p:pic>
+      <p:pic>
+        <p:nvPicPr>
+          <p:cNvPr id="11" name="Picture 10"/>
+          <p:cNvPicPr>
+            <a:picLocks noChangeAspect="1"/>
+          </p:cNvPicPr>
+          <p:nvPr/>
+        </p:nvPicPr>
+        <p:blipFill>
+          <a:blip r:embed="rId3"/>
+          <a:stretch>
+            <a:fillRect/>
+          </a:stretch>
+        </p:blipFill>
+        <p:spPr>
+          <a:xfrm flipH="1">
+            <a:off x="4159044" y="3436445"/>
             <a:ext cx="740696" cy="747179"/>
           </a:xfrm>
           <a:prstGeom prst="rect">

</xml_diff>

<commit_message>
Switch play and stop buttons
</commit_message>
<xml_diff>
--- a/GraphicDesign.pptx
+++ b/GraphicDesign.pptx
@@ -3138,7 +3138,7 @@
         </p:blipFill>
         <p:spPr>
           <a:xfrm>
-            <a:off x="3846130" y="3197532"/>
+            <a:off x="4368068" y="3198894"/>
             <a:ext cx="403399" cy="403399"/>
           </a:xfrm>
           <a:prstGeom prst="rect">
@@ -3162,7 +3162,7 @@
         </p:blipFill>
         <p:spPr>
           <a:xfrm>
-            <a:off x="4349676" y="3197532"/>
+            <a:off x="3846130" y="3197532"/>
             <a:ext cx="403399" cy="403399"/>
           </a:xfrm>
           <a:prstGeom prst="rect">
@@ -3431,8 +3431,8 @@
         </p:blipFill>
         <p:spPr>
           <a:xfrm>
-            <a:off x="3846130" y="2648564"/>
-            <a:ext cx="414593" cy="414593"/>
+            <a:off x="4368068" y="2648564"/>
+            <a:ext cx="403399" cy="414593"/>
           </a:xfrm>
           <a:prstGeom prst="rect">
             <a:avLst/>
@@ -3612,7 +3612,7 @@
         </p:blipFill>
         <p:spPr>
           <a:xfrm>
-            <a:off x="3850970" y="3197532"/>
+            <a:off x="4375355" y="3197532"/>
             <a:ext cx="412580" cy="412580"/>
           </a:xfrm>
           <a:prstGeom prst="rect">
@@ -3636,7 +3636,7 @@
         </p:blipFill>
         <p:spPr>
           <a:xfrm>
-            <a:off x="4375355" y="3188998"/>
+            <a:off x="3880465" y="3188998"/>
             <a:ext cx="404761" cy="404761"/>
           </a:xfrm>
           <a:prstGeom prst="rect">
@@ -3916,7 +3916,7 @@
         </p:blipFill>
         <p:spPr>
           <a:xfrm>
-            <a:off x="4932512" y="3197532"/>
+            <a:off x="4932512" y="3208183"/>
             <a:ext cx="415411" cy="415411"/>
           </a:xfrm>
           <a:prstGeom prst="rect">
@@ -3964,7 +3964,7 @@
         </p:blipFill>
         <p:spPr>
           <a:xfrm>
-            <a:off x="4381090" y="3193436"/>
+            <a:off x="3831309" y="3204087"/>
             <a:ext cx="408856" cy="408856"/>
           </a:xfrm>
           <a:prstGeom prst="rect">
@@ -3988,7 +3988,7 @@
         </p:blipFill>
         <p:spPr>
           <a:xfrm>
-            <a:off x="3855887" y="3197532"/>
+            <a:off x="4363887" y="3208183"/>
             <a:ext cx="404760" cy="404760"/>
           </a:xfrm>
           <a:prstGeom prst="rect">

</xml_diff>

<commit_message>
Add play display and metronome references
</commit_message>
<xml_diff>
--- a/GraphicDesign.pptx
+++ b/GraphicDesign.pptx
@@ -3322,7 +3322,7 @@
         </p:nvSpPr>
         <p:spPr>
           <a:xfrm>
-            <a:off x="3727591" y="966839"/>
+            <a:off x="3846130" y="1056968"/>
             <a:ext cx="1043876" cy="369332"/>
           </a:xfrm>
           <a:prstGeom prst="rect">
@@ -3652,7 +3652,7 @@
         </p:nvSpPr>
         <p:spPr>
           <a:xfrm>
-            <a:off x="3727591" y="966839"/>
+            <a:off x="3870950" y="1081548"/>
             <a:ext cx="1008810" cy="369332"/>
           </a:xfrm>
           <a:prstGeom prst="rect">
@@ -3855,7 +3855,7 @@
         </p:nvSpPr>
         <p:spPr>
           <a:xfrm>
-            <a:off x="3727591" y="966839"/>
+            <a:off x="3812989" y="1089742"/>
             <a:ext cx="1101796" cy="369332"/>
           </a:xfrm>
           <a:prstGeom prst="rect">
@@ -4042,7 +4042,7 @@
         </p:blipFill>
         <p:spPr>
           <a:xfrm>
-            <a:off x="3965123" y="1096844"/>
+            <a:off x="327188" y="1428814"/>
             <a:ext cx="403399" cy="403399"/>
           </a:xfrm>
           <a:prstGeom prst="rect">
@@ -4066,7 +4066,7 @@
         </p:blipFill>
         <p:spPr>
           <a:xfrm>
-            <a:off x="5809225" y="3521658"/>
+            <a:off x="663399" y="883335"/>
             <a:ext cx="740696" cy="747179"/>
           </a:xfrm>
           <a:prstGeom prst="rect">
@@ -4090,7 +4090,7 @@
         </p:blipFill>
         <p:spPr>
           <a:xfrm>
-            <a:off x="8005598" y="3197532"/>
+            <a:off x="1934179" y="977081"/>
             <a:ext cx="399131" cy="399131"/>
           </a:xfrm>
           <a:prstGeom prst="rect">
@@ -4116,6 +4116,78 @@
           <a:xfrm flipH="1">
             <a:off x="4159044" y="3436445"/>
             <a:ext cx="740696" cy="747179"/>
+          </a:xfrm>
+          <a:prstGeom prst="rect">
+            <a:avLst/>
+          </a:prstGeom>
+        </p:spPr>
+      </p:pic>
+      <p:pic>
+        <p:nvPicPr>
+          <p:cNvPr id="12" name="Picture 11"/>
+          <p:cNvPicPr>
+            <a:picLocks noChangeAspect="1"/>
+          </p:cNvPicPr>
+          <p:nvPr/>
+        </p:nvPicPr>
+        <p:blipFill>
+          <a:blip r:embed="rId5"/>
+          <a:stretch>
+            <a:fillRect/>
+          </a:stretch>
+        </p:blipFill>
+        <p:spPr>
+          <a:xfrm>
+            <a:off x="434258" y="3306066"/>
+            <a:ext cx="836151" cy="1256511"/>
+          </a:xfrm>
+          <a:prstGeom prst="rect">
+            <a:avLst/>
+          </a:prstGeom>
+        </p:spPr>
+      </p:pic>
+      <p:pic>
+        <p:nvPicPr>
+          <p:cNvPr id="13" name="Picture 12"/>
+          <p:cNvPicPr>
+            <a:picLocks noChangeAspect="1"/>
+          </p:cNvPicPr>
+          <p:nvPr/>
+        </p:nvPicPr>
+        <p:blipFill>
+          <a:blip r:embed="rId6"/>
+          <a:stretch>
+            <a:fillRect/>
+          </a:stretch>
+        </p:blipFill>
+        <p:spPr>
+          <a:xfrm>
+            <a:off x="547258" y="2089356"/>
+            <a:ext cx="942738" cy="696040"/>
+          </a:xfrm>
+          <a:prstGeom prst="rect">
+            <a:avLst/>
+          </a:prstGeom>
+        </p:spPr>
+      </p:pic>
+      <p:pic>
+        <p:nvPicPr>
+          <p:cNvPr id="14" name="Picture 13"/>
+          <p:cNvPicPr>
+            <a:picLocks noChangeAspect="1"/>
+          </p:cNvPicPr>
+          <p:nvPr/>
+        </p:nvPicPr>
+        <p:blipFill>
+          <a:blip r:embed="rId7"/>
+          <a:stretch>
+            <a:fillRect/>
+          </a:stretch>
+        </p:blipFill>
+        <p:spPr>
+          <a:xfrm>
+            <a:off x="2930011" y="2015202"/>
+            <a:ext cx="5154971" cy="3219658"/>
           </a:xfrm>
           <a:prstGeom prst="rect">
             <a:avLst/>

</xml_diff>

<commit_message>
Make measure display as a celendar
</commit_message>
<xml_diff>
--- a/GraphicDesign.pptx
+++ b/GraphicDesign.pptx
@@ -3098,23 +3098,941 @@
           <a:chExt cx="0" cy="0"/>
         </a:xfrm>
       </p:grpSpPr>
+      <p:sp>
+        <p:nvSpPr>
+          <p:cNvPr id="39" name="TextBox 38"/>
+          <p:cNvSpPr txBox="1"/>
+          <p:nvPr/>
+        </p:nvSpPr>
+        <p:spPr>
+          <a:xfrm>
+            <a:off x="3846130" y="1056968"/>
+            <a:ext cx="1043876" cy="369332"/>
+          </a:xfrm>
+          <a:prstGeom prst="rect">
+            <a:avLst/>
+          </a:prstGeom>
+          <a:noFill/>
+        </p:spPr>
+        <p:txBody>
+          <a:bodyPr wrap="none" rtlCol="0">
+            <a:spAutoFit/>
+          </a:bodyPr>
+          <a:lstStyle/>
+          <a:p>
+            <a:r>
+              <a:rPr lang="en-US" dirty="0" smtClean="0"/>
+              <a:t>NORMAL</a:t>
+            </a:r>
+          </a:p>
+        </p:txBody>
+      </p:sp>
+      <p:sp>
+        <p:nvSpPr>
+          <p:cNvPr id="16" name="Rectangle 15"/>
+          <p:cNvSpPr/>
+          <p:nvPr/>
+        </p:nvSpPr>
+        <p:spPr>
+          <a:xfrm>
+            <a:off x="57620" y="3821042"/>
+            <a:ext cx="9004443" cy="693839"/>
+          </a:xfrm>
+          <a:prstGeom prst="rect">
+            <a:avLst/>
+          </a:prstGeom>
+        </p:spPr>
+        <p:style>
+          <a:lnRef idx="1">
+            <a:schemeClr val="dk1"/>
+          </a:lnRef>
+          <a:fillRef idx="3">
+            <a:schemeClr val="dk1"/>
+          </a:fillRef>
+          <a:effectRef idx="2">
+            <a:schemeClr val="dk1"/>
+          </a:effectRef>
+          <a:fontRef idx="minor">
+            <a:schemeClr val="lt1"/>
+          </a:fontRef>
+        </p:style>
+        <p:txBody>
+          <a:bodyPr rtlCol="0" anchor="ctr"/>
+          <a:lstStyle/>
+          <a:p>
+            <a:pPr algn="ctr"/>
+            <a:endParaRPr lang="en-US" dirty="0"/>
+          </a:p>
+        </p:txBody>
+      </p:sp>
+      <p:pic>
+        <p:nvPicPr>
+          <p:cNvPr id="6" name="Picture 5"/>
+          <p:cNvPicPr>
+            <a:picLocks noChangeAspect="1"/>
+          </p:cNvPicPr>
+          <p:nvPr/>
+        </p:nvPicPr>
+        <p:blipFill>
+          <a:blip r:embed="rId2"/>
+          <a:stretch>
+            <a:fillRect/>
+          </a:stretch>
+        </p:blipFill>
+        <p:spPr>
+          <a:xfrm>
+            <a:off x="4108826" y="3955525"/>
+            <a:ext cx="403399" cy="403399"/>
+          </a:xfrm>
+          <a:prstGeom prst="rect">
+            <a:avLst/>
+          </a:prstGeom>
+        </p:spPr>
+      </p:pic>
+      <p:pic>
+        <p:nvPicPr>
+          <p:cNvPr id="9" name="Picture 8"/>
+          <p:cNvPicPr>
+            <a:picLocks noChangeAspect="1"/>
+          </p:cNvPicPr>
+          <p:nvPr/>
+        </p:nvPicPr>
+        <p:blipFill>
+          <a:blip r:embed="rId3"/>
+          <a:stretch>
+            <a:fillRect/>
+          </a:stretch>
+        </p:blipFill>
+        <p:spPr>
+          <a:xfrm>
+            <a:off x="4651162" y="3954163"/>
+            <a:ext cx="403399" cy="403399"/>
+          </a:xfrm>
+          <a:prstGeom prst="rect">
+            <a:avLst/>
+          </a:prstGeom>
+        </p:spPr>
+      </p:pic>
+      <p:pic>
+        <p:nvPicPr>
+          <p:cNvPr id="10" name="Picture 9"/>
+          <p:cNvPicPr>
+            <a:picLocks noChangeAspect="1"/>
+          </p:cNvPicPr>
+          <p:nvPr/>
+        </p:nvPicPr>
+        <p:blipFill>
+          <a:blip r:embed="rId3"/>
+          <a:stretch>
+            <a:fillRect/>
+          </a:stretch>
+        </p:blipFill>
+        <p:spPr>
+          <a:xfrm flipH="1">
+            <a:off x="3104110" y="3954163"/>
+            <a:ext cx="403399" cy="403399"/>
+          </a:xfrm>
+          <a:prstGeom prst="rect">
+            <a:avLst/>
+          </a:prstGeom>
+        </p:spPr>
+      </p:pic>
+      <p:pic>
+        <p:nvPicPr>
+          <p:cNvPr id="45" name="Picture 44"/>
+          <p:cNvPicPr>
+            <a:picLocks noChangeAspect="1"/>
+          </p:cNvPicPr>
+          <p:nvPr/>
+        </p:nvPicPr>
+        <p:blipFill>
+          <a:blip r:embed="rId4"/>
+          <a:stretch>
+            <a:fillRect/>
+          </a:stretch>
+        </p:blipFill>
+        <p:spPr>
+          <a:xfrm>
+            <a:off x="5581980" y="3965570"/>
+            <a:ext cx="395668" cy="399131"/>
+          </a:xfrm>
+          <a:prstGeom prst="rect">
+            <a:avLst/>
+          </a:prstGeom>
+        </p:spPr>
+      </p:pic>
+      <p:pic>
+        <p:nvPicPr>
+          <p:cNvPr id="48" name="Picture 47"/>
+          <p:cNvPicPr>
+            <a:picLocks noChangeAspect="1"/>
+          </p:cNvPicPr>
+          <p:nvPr/>
+        </p:nvPicPr>
+        <p:blipFill>
+          <a:blip r:embed="rId5"/>
+          <a:stretch>
+            <a:fillRect/>
+          </a:stretch>
+        </p:blipFill>
+        <p:spPr>
+          <a:xfrm>
+            <a:off x="6299092" y="3967738"/>
+            <a:ext cx="401576" cy="408159"/>
+          </a:xfrm>
+          <a:prstGeom prst="rect">
+            <a:avLst/>
+          </a:prstGeom>
+        </p:spPr>
+      </p:pic>
+      <p:sp>
+        <p:nvSpPr>
+          <p:cNvPr id="56" name="Rectangle 55"/>
+          <p:cNvSpPr/>
+          <p:nvPr/>
+        </p:nvSpPr>
+        <p:spPr>
+          <a:xfrm>
+            <a:off x="65407" y="1663583"/>
+            <a:ext cx="9025414" cy="215684"/>
+          </a:xfrm>
+          <a:prstGeom prst="rect">
+            <a:avLst/>
+          </a:prstGeom>
+          <a:solidFill>
+            <a:schemeClr val="tx1">
+              <a:lumMod val="50000"/>
+              <a:lumOff val="50000"/>
+            </a:schemeClr>
+          </a:solidFill>
+        </p:spPr>
+        <p:style>
+          <a:lnRef idx="1">
+            <a:schemeClr val="dk1"/>
+          </a:lnRef>
+          <a:fillRef idx="3">
+            <a:schemeClr val="dk1"/>
+          </a:fillRef>
+          <a:effectRef idx="2">
+            <a:schemeClr val="dk1"/>
+          </a:effectRef>
+          <a:fontRef idx="minor">
+            <a:schemeClr val="lt1"/>
+          </a:fontRef>
+        </p:style>
+        <p:txBody>
+          <a:bodyPr rot="0" spcFirstLastPara="0" vertOverflow="overflow" horzOverflow="overflow" vert="horz" wrap="square" lIns="91440" tIns="45720" rIns="91440" bIns="45720" numCol="1" spcCol="0" rtlCol="0" fromWordArt="0" anchor="ctr" anchorCtr="0" forceAA="0" compatLnSpc="1">
+            <a:prstTxWarp prst="textNoShape">
+              <a:avLst/>
+            </a:prstTxWarp>
+            <a:noAutofit/>
+          </a:bodyPr>
+          <a:lstStyle/>
+          <a:p>
+            <a:pPr algn="ctr"/>
+            <a:endParaRPr lang="en-US"/>
+          </a:p>
+        </p:txBody>
+      </p:sp>
+      <p:grpSp>
+        <p:nvGrpSpPr>
+          <p:cNvPr id="12" name="Group 11"/>
+          <p:cNvGrpSpPr/>
+          <p:nvPr/>
+        </p:nvGrpSpPr>
+        <p:grpSpPr>
+          <a:xfrm>
+            <a:off x="36650" y="4531269"/>
+            <a:ext cx="9025414" cy="850391"/>
+            <a:chOff x="0" y="3853591"/>
+            <a:chExt cx="9144000" cy="850391"/>
+          </a:xfrm>
+        </p:grpSpPr>
+        <p:sp>
+          <p:nvSpPr>
+            <p:cNvPr id="13" name="Rectangle 12"/>
+            <p:cNvSpPr/>
+            <p:nvPr/>
+          </p:nvSpPr>
+          <p:spPr>
+            <a:xfrm>
+              <a:off x="19604" y="3853591"/>
+              <a:ext cx="9124396" cy="45719"/>
+            </a:xfrm>
+            <a:prstGeom prst="rect">
+              <a:avLst/>
+            </a:prstGeom>
+            <a:solidFill>
+              <a:srgbClr val="FF0000"/>
+            </a:solidFill>
+          </p:spPr>
+          <p:style>
+            <a:lnRef idx="2">
+              <a:schemeClr val="accent2">
+                <a:shade val="50000"/>
+              </a:schemeClr>
+            </a:lnRef>
+            <a:fillRef idx="1">
+              <a:schemeClr val="accent2"/>
+            </a:fillRef>
+            <a:effectRef idx="0">
+              <a:schemeClr val="accent2"/>
+            </a:effectRef>
+            <a:fontRef idx="minor">
+              <a:schemeClr val="lt1"/>
+            </a:fontRef>
+          </p:style>
+          <p:txBody>
+            <a:bodyPr rtlCol="0" anchor="ctr"/>
+            <a:lstStyle/>
+            <a:p>
+              <a:pPr algn="ctr"/>
+              <a:endParaRPr lang="en-US"/>
+            </a:p>
+          </p:txBody>
+        </p:sp>
+        <p:pic>
+          <p:nvPicPr>
+            <p:cNvPr id="8" name="Picture 7"/>
+            <p:cNvPicPr>
+              <a:picLocks noChangeAspect="1"/>
+            </p:cNvPicPr>
+            <p:nvPr/>
+          </p:nvPicPr>
+          <p:blipFill>
+            <a:blip r:embed="rId6"/>
+            <a:stretch>
+              <a:fillRect/>
+            </a:stretch>
+          </p:blipFill>
+          <p:spPr>
+            <a:xfrm>
+              <a:off x="0" y="3899310"/>
+              <a:ext cx="9144000" cy="804672"/>
+            </a:xfrm>
+            <a:prstGeom prst="rect">
+              <a:avLst/>
+            </a:prstGeom>
+          </p:spPr>
+        </p:pic>
+      </p:grpSp>
+      <p:cxnSp>
+        <p:nvCxnSpPr>
+          <p:cNvPr id="29" name="Straight Connector 28"/>
+          <p:cNvCxnSpPr/>
+          <p:nvPr/>
+        </p:nvCxnSpPr>
+        <p:spPr>
+          <a:xfrm>
+            <a:off x="2839879" y="3837430"/>
+            <a:ext cx="0" cy="693839"/>
+          </a:xfrm>
+          <a:prstGeom prst="line">
+            <a:avLst/>
+          </a:prstGeom>
+          <a:ln w="9525" cmpd="sng">
+            <a:solidFill>
+              <a:schemeClr val="bg1">
+                <a:lumMod val="50000"/>
+              </a:schemeClr>
+            </a:solidFill>
+            <a:prstDash val="lgDash"/>
+          </a:ln>
+        </p:spPr>
+        <p:style>
+          <a:lnRef idx="2">
+            <a:schemeClr val="accent1"/>
+          </a:lnRef>
+          <a:fillRef idx="0">
+            <a:schemeClr val="accent1"/>
+          </a:fillRef>
+          <a:effectRef idx="1">
+            <a:schemeClr val="accent1"/>
+          </a:effectRef>
+          <a:fontRef idx="minor">
+            <a:schemeClr val="tx1"/>
+          </a:fontRef>
+        </p:style>
+      </p:cxnSp>
+      <p:cxnSp>
+        <p:nvCxnSpPr>
+          <p:cNvPr id="31" name="Straight Connector 30"/>
+          <p:cNvCxnSpPr/>
+          <p:nvPr/>
+        </p:nvCxnSpPr>
+        <p:spPr>
+          <a:xfrm>
+            <a:off x="5327440" y="3837430"/>
+            <a:ext cx="0" cy="693839"/>
+          </a:xfrm>
+          <a:prstGeom prst="line">
+            <a:avLst/>
+          </a:prstGeom>
+          <a:ln w="9525" cmpd="sng">
+            <a:solidFill>
+              <a:schemeClr val="bg1">
+                <a:lumMod val="50000"/>
+              </a:schemeClr>
+            </a:solidFill>
+            <a:prstDash val="lgDash"/>
+          </a:ln>
+        </p:spPr>
+        <p:style>
+          <a:lnRef idx="2">
+            <a:schemeClr val="accent1"/>
+          </a:lnRef>
+          <a:fillRef idx="0">
+            <a:schemeClr val="accent1"/>
+          </a:fillRef>
+          <a:effectRef idx="1">
+            <a:schemeClr val="accent1"/>
+          </a:effectRef>
+          <a:fontRef idx="minor">
+            <a:schemeClr val="tx1"/>
+          </a:fontRef>
+        </p:style>
+      </p:cxnSp>
+      <p:cxnSp>
+        <p:nvCxnSpPr>
+          <p:cNvPr id="32" name="Straight Connector 31"/>
+          <p:cNvCxnSpPr/>
+          <p:nvPr/>
+        </p:nvCxnSpPr>
+        <p:spPr>
+          <a:xfrm>
+            <a:off x="6897324" y="3797976"/>
+            <a:ext cx="0" cy="693839"/>
+          </a:xfrm>
+          <a:prstGeom prst="line">
+            <a:avLst/>
+          </a:prstGeom>
+          <a:ln w="9525" cmpd="sng">
+            <a:solidFill>
+              <a:schemeClr val="bg1">
+                <a:lumMod val="50000"/>
+              </a:schemeClr>
+            </a:solidFill>
+            <a:prstDash val="lgDash"/>
+          </a:ln>
+        </p:spPr>
+        <p:style>
+          <a:lnRef idx="2">
+            <a:schemeClr val="accent1"/>
+          </a:lnRef>
+          <a:fillRef idx="0">
+            <a:schemeClr val="accent1"/>
+          </a:fillRef>
+          <a:effectRef idx="1">
+            <a:schemeClr val="accent1"/>
+          </a:effectRef>
+          <a:fontRef idx="minor">
+            <a:schemeClr val="tx1"/>
+          </a:fontRef>
+        </p:style>
+      </p:cxnSp>
+      <p:sp>
+        <p:nvSpPr>
+          <p:cNvPr id="15" name="TextBox 14"/>
+          <p:cNvSpPr txBox="1"/>
+          <p:nvPr/>
+        </p:nvSpPr>
+        <p:spPr>
+          <a:xfrm>
+            <a:off x="73193" y="3814364"/>
+            <a:ext cx="630903" cy="215444"/>
+          </a:xfrm>
+          <a:prstGeom prst="rect">
+            <a:avLst/>
+          </a:prstGeom>
+          <a:noFill/>
+        </p:spPr>
+        <p:txBody>
+          <a:bodyPr wrap="square" rtlCol="0">
+            <a:spAutoFit/>
+          </a:bodyPr>
+          <a:lstStyle/>
+          <a:p>
+            <a:r>
+              <a:rPr lang="en-US" sz="800" dirty="0" smtClean="0">
+                <a:solidFill>
+                  <a:schemeClr val="tx1">
+                    <a:lumMod val="65000"/>
+                    <a:lumOff val="35000"/>
+                  </a:schemeClr>
+                </a:solidFill>
+                <a:latin typeface="Arial"/>
+                <a:cs typeface="Arial"/>
+              </a:rPr>
+              <a:t>REPEAT</a:t>
+            </a:r>
+            <a:endParaRPr lang="en-US" sz="800" dirty="0">
+              <a:solidFill>
+                <a:schemeClr val="tx1">
+                  <a:lumMod val="65000"/>
+                  <a:lumOff val="35000"/>
+                </a:schemeClr>
+              </a:solidFill>
+              <a:latin typeface="Arial"/>
+              <a:cs typeface="Arial"/>
+            </a:endParaRPr>
+          </a:p>
+        </p:txBody>
+      </p:sp>
+      <p:sp>
+        <p:nvSpPr>
+          <p:cNvPr id="33" name="TextBox 32"/>
+          <p:cNvSpPr txBox="1"/>
+          <p:nvPr/>
+        </p:nvSpPr>
+        <p:spPr>
+          <a:xfrm>
+            <a:off x="2786562" y="3771606"/>
+            <a:ext cx="630903" cy="215444"/>
+          </a:xfrm>
+          <a:prstGeom prst="rect">
+            <a:avLst/>
+          </a:prstGeom>
+          <a:noFill/>
+        </p:spPr>
+        <p:txBody>
+          <a:bodyPr wrap="square" rtlCol="0">
+            <a:spAutoFit/>
+          </a:bodyPr>
+          <a:lstStyle/>
+          <a:p>
+            <a:r>
+              <a:rPr lang="en-US" sz="800" dirty="0" smtClean="0">
+                <a:solidFill>
+                  <a:schemeClr val="tx1">
+                    <a:lumMod val="65000"/>
+                    <a:lumOff val="35000"/>
+                  </a:schemeClr>
+                </a:solidFill>
+                <a:latin typeface="Arial"/>
+                <a:cs typeface="Arial"/>
+              </a:rPr>
+              <a:t>PLAY</a:t>
+            </a:r>
+            <a:endParaRPr lang="en-US" sz="800" dirty="0">
+              <a:solidFill>
+                <a:schemeClr val="tx1">
+                  <a:lumMod val="65000"/>
+                  <a:lumOff val="35000"/>
+                </a:schemeClr>
+              </a:solidFill>
+              <a:latin typeface="Arial"/>
+              <a:cs typeface="Arial"/>
+            </a:endParaRPr>
+          </a:p>
+        </p:txBody>
+      </p:sp>
+      <p:sp>
+        <p:nvSpPr>
+          <p:cNvPr id="35" name="TextBox 34"/>
+          <p:cNvSpPr txBox="1"/>
+          <p:nvPr/>
+        </p:nvSpPr>
+        <p:spPr>
+          <a:xfrm>
+            <a:off x="6831772" y="3771606"/>
+            <a:ext cx="630903" cy="215444"/>
+          </a:xfrm>
+          <a:prstGeom prst="rect">
+            <a:avLst/>
+          </a:prstGeom>
+          <a:noFill/>
+        </p:spPr>
+        <p:txBody>
+          <a:bodyPr wrap="square" rtlCol="0">
+            <a:spAutoFit/>
+          </a:bodyPr>
+          <a:lstStyle/>
+          <a:p>
+            <a:r>
+              <a:rPr lang="en-US" sz="800" dirty="0" smtClean="0">
+                <a:solidFill>
+                  <a:schemeClr val="tx1">
+                    <a:lumMod val="65000"/>
+                    <a:lumOff val="35000"/>
+                  </a:schemeClr>
+                </a:solidFill>
+                <a:latin typeface="Arial"/>
+                <a:cs typeface="Arial"/>
+              </a:rPr>
+              <a:t>TEMPO</a:t>
+            </a:r>
+            <a:endParaRPr lang="en-US" sz="800" dirty="0">
+              <a:solidFill>
+                <a:schemeClr val="tx1">
+                  <a:lumMod val="65000"/>
+                  <a:lumOff val="35000"/>
+                </a:schemeClr>
+              </a:solidFill>
+              <a:latin typeface="Arial"/>
+              <a:cs typeface="Arial"/>
+            </a:endParaRPr>
+          </a:p>
+        </p:txBody>
+      </p:sp>
+      <p:cxnSp>
+        <p:nvCxnSpPr>
+          <p:cNvPr id="22" name="Straight Connector 21"/>
+          <p:cNvCxnSpPr/>
+          <p:nvPr/>
+        </p:nvCxnSpPr>
+        <p:spPr>
+          <a:xfrm>
+            <a:off x="7447073" y="4181524"/>
+            <a:ext cx="1397053" cy="0"/>
+          </a:xfrm>
+          <a:prstGeom prst="line">
+            <a:avLst/>
+          </a:prstGeom>
+          <a:ln w="57150" cmpd="sng"/>
+        </p:spPr>
+        <p:style>
+          <a:lnRef idx="3">
+            <a:schemeClr val="accent1"/>
+          </a:lnRef>
+          <a:fillRef idx="0">
+            <a:schemeClr val="accent1"/>
+          </a:fillRef>
+          <a:effectRef idx="2">
+            <a:schemeClr val="accent1"/>
+          </a:effectRef>
+          <a:fontRef idx="minor">
+            <a:schemeClr val="tx1"/>
+          </a:fontRef>
+        </p:style>
+      </p:cxnSp>
+      <p:sp>
+        <p:nvSpPr>
+          <p:cNvPr id="38" name="Oval 37"/>
+          <p:cNvSpPr/>
+          <p:nvPr/>
+        </p:nvSpPr>
+        <p:spPr>
+          <a:xfrm>
+            <a:off x="7866653" y="4115427"/>
+            <a:ext cx="137160" cy="137160"/>
+          </a:xfrm>
+          <a:prstGeom prst="ellipse">
+            <a:avLst/>
+          </a:prstGeom>
+        </p:spPr>
+        <p:style>
+          <a:lnRef idx="1">
+            <a:schemeClr val="dk1"/>
+          </a:lnRef>
+          <a:fillRef idx="2">
+            <a:schemeClr val="dk1"/>
+          </a:fillRef>
+          <a:effectRef idx="1">
+            <a:schemeClr val="dk1"/>
+          </a:effectRef>
+          <a:fontRef idx="minor">
+            <a:schemeClr val="dk1"/>
+          </a:fontRef>
+        </p:style>
+        <p:txBody>
+          <a:bodyPr rtlCol="0" anchor="ctr"/>
+          <a:lstStyle/>
+          <a:p>
+            <a:pPr algn="ctr"/>
+            <a:endParaRPr lang="en-US"/>
+          </a:p>
+        </p:txBody>
+      </p:sp>
+      <p:sp>
+        <p:nvSpPr>
+          <p:cNvPr id="46" name="TextBox 45"/>
+          <p:cNvSpPr txBox="1"/>
+          <p:nvPr/>
+        </p:nvSpPr>
+        <p:spPr>
+          <a:xfrm>
+            <a:off x="704096" y="3818290"/>
+            <a:ext cx="942807" cy="215444"/>
+          </a:xfrm>
+          <a:prstGeom prst="rect">
+            <a:avLst/>
+          </a:prstGeom>
+          <a:noFill/>
+        </p:spPr>
+        <p:txBody>
+          <a:bodyPr wrap="square" rtlCol="0">
+            <a:spAutoFit/>
+          </a:bodyPr>
+          <a:lstStyle/>
+          <a:p>
+            <a:r>
+              <a:rPr lang="en-US" sz="800" dirty="0" smtClean="0">
+                <a:solidFill>
+                  <a:schemeClr val="tx1">
+                    <a:lumMod val="65000"/>
+                    <a:lumOff val="35000"/>
+                  </a:schemeClr>
+                </a:solidFill>
+                <a:latin typeface="Arial"/>
+                <a:cs typeface="Arial"/>
+              </a:rPr>
+              <a:t>SELECT</a:t>
+            </a:r>
+            <a:r>
+              <a:rPr lang="en-US" sz="800" dirty="0" smtClean="0">
+                <a:solidFill>
+                  <a:schemeClr val="tx1">
+                    <a:lumMod val="65000"/>
+                    <a:lumOff val="35000"/>
+                  </a:schemeClr>
+                </a:solidFill>
+                <a:latin typeface="Arial"/>
+                <a:cs typeface="Arial"/>
+              </a:rPr>
+              <a:t> START </a:t>
+            </a:r>
+            <a:endParaRPr lang="en-US" sz="800" dirty="0">
+              <a:solidFill>
+                <a:schemeClr val="tx1">
+                  <a:lumMod val="65000"/>
+                  <a:lumOff val="35000"/>
+                </a:schemeClr>
+              </a:solidFill>
+              <a:latin typeface="Arial"/>
+              <a:cs typeface="Arial"/>
+            </a:endParaRPr>
+          </a:p>
+        </p:txBody>
+      </p:sp>
+      <p:grpSp>
+        <p:nvGrpSpPr>
+          <p:cNvPr id="2" name="Group 1"/>
+          <p:cNvGrpSpPr/>
+          <p:nvPr/>
+        </p:nvGrpSpPr>
+        <p:grpSpPr>
+          <a:xfrm>
+            <a:off x="7019396" y="3989834"/>
+            <a:ext cx="255648" cy="417248"/>
+            <a:chOff x="6595790" y="1009052"/>
+            <a:chExt cx="255648" cy="417248"/>
+          </a:xfrm>
+        </p:grpSpPr>
+        <p:sp>
+          <p:nvSpPr>
+            <p:cNvPr id="49" name="Trapezoid 48"/>
+            <p:cNvSpPr/>
+            <p:nvPr/>
+          </p:nvSpPr>
+          <p:spPr>
+            <a:xfrm>
+              <a:off x="6595790" y="1009052"/>
+              <a:ext cx="255648" cy="417248"/>
+            </a:xfrm>
+            <a:prstGeom prst="trapezoid">
+              <a:avLst>
+                <a:gd name="adj" fmla="val 34677"/>
+              </a:avLst>
+            </a:prstGeom>
+            <a:ln/>
+          </p:spPr>
+          <p:style>
+            <a:lnRef idx="1">
+              <a:schemeClr val="accent6"/>
+            </a:lnRef>
+            <a:fillRef idx="2">
+              <a:schemeClr val="accent6"/>
+            </a:fillRef>
+            <a:effectRef idx="1">
+              <a:schemeClr val="accent6"/>
+            </a:effectRef>
+            <a:fontRef idx="minor">
+              <a:schemeClr val="dk1"/>
+            </a:fontRef>
+          </p:style>
+          <p:txBody>
+            <a:bodyPr rtlCol="0" anchor="ctr"/>
+            <a:lstStyle/>
+            <a:p>
+              <a:pPr algn="ctr"/>
+              <a:endParaRPr lang="en-US"/>
+            </a:p>
+          </p:txBody>
+        </p:sp>
+        <p:cxnSp>
+          <p:nvCxnSpPr>
+            <p:cNvPr id="51" name="Straight Connector 50"/>
+            <p:cNvCxnSpPr>
+              <a:stCxn id="49" idx="0"/>
+            </p:cNvCxnSpPr>
+            <p:nvPr/>
+          </p:nvCxnSpPr>
+          <p:spPr>
+            <a:xfrm flipH="1">
+              <a:off x="6716206" y="1009052"/>
+              <a:ext cx="7408" cy="311301"/>
+            </a:xfrm>
+            <a:prstGeom prst="line">
+              <a:avLst/>
+            </a:prstGeom>
+            <a:ln/>
+          </p:spPr>
+          <p:style>
+            <a:lnRef idx="1">
+              <a:schemeClr val="accent6"/>
+            </a:lnRef>
+            <a:fillRef idx="2">
+              <a:schemeClr val="accent6"/>
+            </a:fillRef>
+            <a:effectRef idx="1">
+              <a:schemeClr val="accent6"/>
+            </a:effectRef>
+            <a:fontRef idx="minor">
+              <a:schemeClr val="dk1"/>
+            </a:fontRef>
+          </p:style>
+        </p:cxnSp>
+        <p:sp>
+          <p:nvSpPr>
+            <p:cNvPr id="52" name="Isosceles Triangle 51"/>
+            <p:cNvSpPr/>
+            <p:nvPr/>
+          </p:nvSpPr>
+          <p:spPr>
+            <a:xfrm flipV="1">
+              <a:off x="6681839" y="1212403"/>
+              <a:ext cx="72457" cy="87692"/>
+            </a:xfrm>
+            <a:prstGeom prst="triangle">
+              <a:avLst/>
+            </a:prstGeom>
+            <a:ln/>
+          </p:spPr>
+          <p:style>
+            <a:lnRef idx="1">
+              <a:schemeClr val="accent6"/>
+            </a:lnRef>
+            <a:fillRef idx="2">
+              <a:schemeClr val="accent6"/>
+            </a:fillRef>
+            <a:effectRef idx="1">
+              <a:schemeClr val="accent6"/>
+            </a:effectRef>
+            <a:fontRef idx="minor">
+              <a:schemeClr val="dk1"/>
+            </a:fontRef>
+          </p:style>
+          <p:txBody>
+            <a:bodyPr rtlCol="0" anchor="ctr"/>
+            <a:lstStyle/>
+            <a:p>
+              <a:pPr algn="ctr"/>
+              <a:endParaRPr lang="en-US"/>
+            </a:p>
+          </p:txBody>
+        </p:sp>
+      </p:grpSp>
+      <p:pic>
+        <p:nvPicPr>
+          <p:cNvPr id="42" name="Picture 41"/>
+          <p:cNvPicPr>
+            <a:picLocks noChangeAspect="1"/>
+          </p:cNvPicPr>
+          <p:nvPr/>
+        </p:nvPicPr>
+        <p:blipFill>
+          <a:blip r:embed="rId7"/>
+          <a:stretch>
+            <a:fillRect/>
+          </a:stretch>
+        </p:blipFill>
+        <p:spPr>
+          <a:xfrm>
+            <a:off x="3609113" y="3947916"/>
+            <a:ext cx="403399" cy="403399"/>
+          </a:xfrm>
+          <a:prstGeom prst="rect">
+            <a:avLst/>
+          </a:prstGeom>
+        </p:spPr>
+      </p:pic>
+      <p:pic>
+        <p:nvPicPr>
+          <p:cNvPr id="55" name="Picture 54" descr="repeat.png"/>
+          <p:cNvPicPr>
+            <a:picLocks noChangeAspect="1"/>
+          </p:cNvPicPr>
+          <p:nvPr/>
+        </p:nvPicPr>
+        <p:blipFill>
+          <a:blip r:embed="rId8">
+            <a:extLst>
+              <a:ext uri="{28A0092B-C50C-407E-A947-70E740481C1C}">
+                <a14:useLocalDpi xmlns:a14="http://schemas.microsoft.com/office/drawing/2010/main" val="0"/>
+              </a:ext>
+            </a:extLst>
+          </a:blip>
+          <a:stretch>
+            <a:fillRect/>
+          </a:stretch>
+        </p:blipFill>
+        <p:spPr>
+          <a:xfrm>
+            <a:off x="143385" y="4010882"/>
+            <a:ext cx="421788" cy="421788"/>
+          </a:xfrm>
+          <a:prstGeom prst="rect">
+            <a:avLst/>
+          </a:prstGeom>
+        </p:spPr>
+      </p:pic>
+      <p:pic>
+        <p:nvPicPr>
+          <p:cNvPr id="57" name="Picture 56" descr="repeatIconoff.png"/>
+          <p:cNvPicPr>
+            <a:picLocks noChangeAspect="1"/>
+          </p:cNvPicPr>
+          <p:nvPr/>
+        </p:nvPicPr>
+        <p:blipFill>
+          <a:blip r:embed="rId9">
+            <a:extLst>
+              <a:ext uri="{28A0092B-C50C-407E-A947-70E740481C1C}">
+                <a14:useLocalDpi xmlns:a14="http://schemas.microsoft.com/office/drawing/2010/main" val="0"/>
+              </a:ext>
+            </a:extLst>
+          </a:blip>
+          <a:stretch>
+            <a:fillRect/>
+          </a:stretch>
+        </p:blipFill>
+        <p:spPr>
+          <a:xfrm>
+            <a:off x="8632425" y="1213136"/>
+            <a:ext cx="332965" cy="332965"/>
+          </a:xfrm>
+          <a:prstGeom prst="rect">
+            <a:avLst/>
+          </a:prstGeom>
+        </p:spPr>
+      </p:pic>
       <p:graphicFrame>
         <p:nvGraphicFramePr>
-          <p:cNvPr id="19" name="Table 18"/>
+          <p:cNvPr id="58" name="Table 57"/>
           <p:cNvGraphicFramePr>
             <a:graphicFrameLocks noGrp="1"/>
           </p:cNvGraphicFramePr>
           <p:nvPr>
             <p:extLst>
               <p:ext uri="{D42A27DB-BD31-4B8C-83A1-F6EECF244321}">
-                <p14:modId xmlns:p14="http://schemas.microsoft.com/office/powerpoint/2010/main" val="921143747"/>
+                <p14:modId xmlns:p14="http://schemas.microsoft.com/office/powerpoint/2010/main" val="3109970632"/>
               </p:ext>
             </p:extLst>
           </p:nvPr>
         </p:nvGraphicFramePr>
         <p:xfrm>
-          <a:off x="54683" y="2542981"/>
-          <a:ext cx="9014250" cy="472278"/>
+          <a:off x="65407" y="1898629"/>
+          <a:ext cx="9003520" cy="472278"/>
         </p:xfrm>
         <a:graphic>
           <a:graphicData uri="http://schemas.openxmlformats.org/drawingml/2006/table">
@@ -3123,31 +4041,26 @@
                 <a:tableStyleId>{69CF1AB2-1976-4502-BF36-3FF5EA218861}</a:tableStyleId>
               </a:tblPr>
               <a:tblGrid>
-                <a:gridCol w="360570"/>
-                <a:gridCol w="360570"/>
-                <a:gridCol w="360570"/>
-                <a:gridCol w="360570"/>
-                <a:gridCol w="360570"/>
-                <a:gridCol w="360570"/>
-                <a:gridCol w="360570"/>
-                <a:gridCol w="360570"/>
-                <a:gridCol w="360570"/>
-                <a:gridCol w="360570"/>
-                <a:gridCol w="360570"/>
-                <a:gridCol w="360570"/>
-                <a:gridCol w="360570"/>
-                <a:gridCol w="360570"/>
-                <a:gridCol w="360570"/>
-                <a:gridCol w="360570"/>
-                <a:gridCol w="360570"/>
-                <a:gridCol w="360570"/>
-                <a:gridCol w="360570"/>
-                <a:gridCol w="360570"/>
-                <a:gridCol w="360570"/>
-                <a:gridCol w="360570"/>
-                <a:gridCol w="360570"/>
-                <a:gridCol w="402996"/>
-                <a:gridCol w="318144"/>
+                <a:gridCol w="450176"/>
+                <a:gridCol w="450176"/>
+                <a:gridCol w="450176"/>
+                <a:gridCol w="450176"/>
+                <a:gridCol w="450176"/>
+                <a:gridCol w="450176"/>
+                <a:gridCol w="450176"/>
+                <a:gridCol w="450176"/>
+                <a:gridCol w="450176"/>
+                <a:gridCol w="450176"/>
+                <a:gridCol w="450176"/>
+                <a:gridCol w="450176"/>
+                <a:gridCol w="450176"/>
+                <a:gridCol w="450176"/>
+                <a:gridCol w="450176"/>
+                <a:gridCol w="450176"/>
+                <a:gridCol w="450176"/>
+                <a:gridCol w="450176"/>
+                <a:gridCol w="450176"/>
+                <a:gridCol w="450176"/>
               </a:tblGrid>
               <a:tr h="472278">
                 <a:tc>
@@ -3925,6 +4838,58 @@
                     </a:solidFill>
                   </a:tcPr>
                 </a:tc>
+              </a:tr>
+            </a:tbl>
+          </a:graphicData>
+        </a:graphic>
+      </p:graphicFrame>
+      <p:graphicFrame>
+        <p:nvGraphicFramePr>
+          <p:cNvPr id="59" name="Table 58"/>
+          <p:cNvGraphicFramePr>
+            <a:graphicFrameLocks noGrp="1"/>
+          </p:cNvGraphicFramePr>
+          <p:nvPr>
+            <p:extLst>
+              <p:ext uri="{D42A27DB-BD31-4B8C-83A1-F6EECF244321}">
+                <p14:modId xmlns:p14="http://schemas.microsoft.com/office/powerpoint/2010/main" val="3773176173"/>
+              </p:ext>
+            </p:extLst>
+          </p:nvPr>
+        </p:nvGraphicFramePr>
+        <p:xfrm>
+          <a:off x="65815" y="2387378"/>
+          <a:ext cx="9003520" cy="472278"/>
+        </p:xfrm>
+        <a:graphic>
+          <a:graphicData uri="http://schemas.openxmlformats.org/drawingml/2006/table">
+            <a:tbl>
+              <a:tblPr firstRow="1" bandRow="1">
+                <a:tableStyleId>{69CF1AB2-1976-4502-BF36-3FF5EA218861}</a:tableStyleId>
+              </a:tblPr>
+              <a:tblGrid>
+                <a:gridCol w="450176"/>
+                <a:gridCol w="450176"/>
+                <a:gridCol w="450176"/>
+                <a:gridCol w="450176"/>
+                <a:gridCol w="450176"/>
+                <a:gridCol w="450176"/>
+                <a:gridCol w="450176"/>
+                <a:gridCol w="450176"/>
+                <a:gridCol w="450176"/>
+                <a:gridCol w="450176"/>
+                <a:gridCol w="450176"/>
+                <a:gridCol w="450176"/>
+                <a:gridCol w="450176"/>
+                <a:gridCol w="450176"/>
+                <a:gridCol w="450176"/>
+                <a:gridCol w="450176"/>
+                <a:gridCol w="450176"/>
+                <a:gridCol w="450176"/>
+                <a:gridCol w="450176"/>
+                <a:gridCol w="450176"/>
+              </a:tblGrid>
+              <a:tr h="472278">
                 <a:tc>
                   <a:txBody>
                     <a:bodyPr/>
@@ -4099,7 +5064,2548 @@
                           <a:spcPct val="150000"/>
                         </a:lnSpc>
                       </a:pPr>
-                      <a:endParaRPr lang="en-US" sz="1200" dirty="0"/>
+                      <a:r>
+                        <a:rPr lang="en-US" sz="1200" dirty="0" smtClean="0">
+                          <a:solidFill>
+                            <a:schemeClr val="bg1">
+                              <a:lumMod val="50000"/>
+                            </a:schemeClr>
+                          </a:solidFill>
+                          <a:latin typeface="Arial"/>
+                          <a:cs typeface="Arial"/>
+                        </a:rPr>
+                        <a:t>25</a:t>
+                      </a:r>
+                      <a:endParaRPr lang="en-US" sz="1200" dirty="0">
+                        <a:solidFill>
+                          <a:schemeClr val="bg1">
+                            <a:lumMod val="50000"/>
+                          </a:schemeClr>
+                        </a:solidFill>
+                        <a:latin typeface="Arial"/>
+                        <a:cs typeface="Arial"/>
+                      </a:endParaRPr>
+                    </a:p>
+                  </a:txBody>
+                  <a:tcPr>
+                    <a:solidFill>
+                      <a:schemeClr val="bg1">
+                        <a:lumMod val="75000"/>
+                      </a:schemeClr>
+                    </a:solidFill>
+                  </a:tcPr>
+                </a:tc>
+                <a:tc>
+                  <a:txBody>
+                    <a:bodyPr/>
+                    <a:lstStyle/>
+                    <a:p>
+                      <a:pPr algn="ctr">
+                        <a:lnSpc>
+                          <a:spcPct val="150000"/>
+                        </a:lnSpc>
+                      </a:pPr>
+                      <a:r>
+                        <a:rPr lang="en-US" sz="1200" dirty="0" smtClean="0">
+                          <a:solidFill>
+                            <a:schemeClr val="bg1">
+                              <a:lumMod val="50000"/>
+                            </a:schemeClr>
+                          </a:solidFill>
+                          <a:latin typeface="Arial"/>
+                          <a:cs typeface="Arial"/>
+                        </a:rPr>
+                        <a:t>26</a:t>
+                      </a:r>
+                      <a:endParaRPr lang="en-US" sz="1200" dirty="0">
+                        <a:solidFill>
+                          <a:schemeClr val="bg1">
+                            <a:lumMod val="50000"/>
+                          </a:schemeClr>
+                        </a:solidFill>
+                        <a:latin typeface="Arial"/>
+                        <a:cs typeface="Arial"/>
+                      </a:endParaRPr>
+                    </a:p>
+                  </a:txBody>
+                  <a:tcPr>
+                    <a:solidFill>
+                      <a:schemeClr val="bg1">
+                        <a:lumMod val="75000"/>
+                      </a:schemeClr>
+                    </a:solidFill>
+                  </a:tcPr>
+                </a:tc>
+                <a:tc>
+                  <a:txBody>
+                    <a:bodyPr/>
+                    <a:lstStyle/>
+                    <a:p>
+                      <a:pPr algn="ctr">
+                        <a:lnSpc>
+                          <a:spcPct val="150000"/>
+                        </a:lnSpc>
+                      </a:pPr>
+                      <a:r>
+                        <a:rPr lang="en-US" sz="1200" dirty="0" smtClean="0">
+                          <a:solidFill>
+                            <a:schemeClr val="bg1">
+                              <a:lumMod val="50000"/>
+                            </a:schemeClr>
+                          </a:solidFill>
+                          <a:latin typeface="Arial"/>
+                          <a:cs typeface="Arial"/>
+                        </a:rPr>
+                        <a:t>27</a:t>
+                      </a:r>
+                      <a:endParaRPr lang="en-US" sz="1200" dirty="0">
+                        <a:solidFill>
+                          <a:schemeClr val="bg1">
+                            <a:lumMod val="50000"/>
+                          </a:schemeClr>
+                        </a:solidFill>
+                        <a:latin typeface="Arial"/>
+                        <a:cs typeface="Arial"/>
+                      </a:endParaRPr>
+                    </a:p>
+                  </a:txBody>
+                  <a:tcPr>
+                    <a:solidFill>
+                      <a:schemeClr val="bg1">
+                        <a:lumMod val="75000"/>
+                      </a:schemeClr>
+                    </a:solidFill>
+                  </a:tcPr>
+                </a:tc>
+                <a:tc>
+                  <a:txBody>
+                    <a:bodyPr/>
+                    <a:lstStyle/>
+                    <a:p>
+                      <a:pPr algn="ctr">
+                        <a:lnSpc>
+                          <a:spcPct val="150000"/>
+                        </a:lnSpc>
+                      </a:pPr>
+                      <a:r>
+                        <a:rPr lang="en-US" sz="1200" dirty="0" smtClean="0">
+                          <a:solidFill>
+                            <a:schemeClr val="bg1">
+                              <a:lumMod val="50000"/>
+                            </a:schemeClr>
+                          </a:solidFill>
+                          <a:latin typeface="Arial"/>
+                          <a:cs typeface="Arial"/>
+                        </a:rPr>
+                        <a:t>28</a:t>
+                      </a:r>
+                      <a:endParaRPr lang="en-US" sz="1200" dirty="0">
+                        <a:solidFill>
+                          <a:schemeClr val="bg1">
+                            <a:lumMod val="50000"/>
+                          </a:schemeClr>
+                        </a:solidFill>
+                        <a:latin typeface="Arial"/>
+                        <a:cs typeface="Arial"/>
+                      </a:endParaRPr>
+                    </a:p>
+                  </a:txBody>
+                  <a:tcPr>
+                    <a:solidFill>
+                      <a:schemeClr val="bg1">
+                        <a:lumMod val="75000"/>
+                      </a:schemeClr>
+                    </a:solidFill>
+                  </a:tcPr>
+                </a:tc>
+                <a:tc>
+                  <a:txBody>
+                    <a:bodyPr/>
+                    <a:lstStyle/>
+                    <a:p>
+                      <a:pPr algn="ctr">
+                        <a:lnSpc>
+                          <a:spcPct val="150000"/>
+                        </a:lnSpc>
+                      </a:pPr>
+                      <a:r>
+                        <a:rPr lang="en-US" sz="1200" dirty="0" smtClean="0">
+                          <a:solidFill>
+                            <a:schemeClr val="bg1">
+                              <a:lumMod val="50000"/>
+                            </a:schemeClr>
+                          </a:solidFill>
+                          <a:latin typeface="Arial"/>
+                          <a:cs typeface="Arial"/>
+                        </a:rPr>
+                        <a:t>29</a:t>
+                      </a:r>
+                      <a:endParaRPr lang="en-US" sz="1200" dirty="0">
+                        <a:solidFill>
+                          <a:schemeClr val="bg1">
+                            <a:lumMod val="50000"/>
+                          </a:schemeClr>
+                        </a:solidFill>
+                        <a:latin typeface="Arial"/>
+                        <a:cs typeface="Arial"/>
+                      </a:endParaRPr>
+                    </a:p>
+                  </a:txBody>
+                  <a:tcPr>
+                    <a:solidFill>
+                      <a:schemeClr val="bg1">
+                        <a:lumMod val="75000"/>
+                      </a:schemeClr>
+                    </a:solidFill>
+                  </a:tcPr>
+                </a:tc>
+                <a:tc>
+                  <a:txBody>
+                    <a:bodyPr/>
+                    <a:lstStyle/>
+                    <a:p>
+                      <a:pPr algn="ctr">
+                        <a:lnSpc>
+                          <a:spcPct val="150000"/>
+                        </a:lnSpc>
+                      </a:pPr>
+                      <a:r>
+                        <a:rPr lang="en-US" sz="1200" dirty="0" smtClean="0">
+                          <a:solidFill>
+                            <a:schemeClr val="bg1">
+                              <a:lumMod val="50000"/>
+                            </a:schemeClr>
+                          </a:solidFill>
+                          <a:latin typeface="Arial"/>
+                          <a:cs typeface="Arial"/>
+                        </a:rPr>
+                        <a:t>30</a:t>
+                      </a:r>
+                      <a:endParaRPr lang="en-US" sz="1200" dirty="0">
+                        <a:solidFill>
+                          <a:schemeClr val="bg1">
+                            <a:lumMod val="50000"/>
+                          </a:schemeClr>
+                        </a:solidFill>
+                        <a:latin typeface="Arial"/>
+                        <a:cs typeface="Arial"/>
+                      </a:endParaRPr>
+                    </a:p>
+                  </a:txBody>
+                  <a:tcPr>
+                    <a:solidFill>
+                      <a:schemeClr val="bg1">
+                        <a:lumMod val="75000"/>
+                      </a:schemeClr>
+                    </a:solidFill>
+                  </a:tcPr>
+                </a:tc>
+                <a:tc>
+                  <a:txBody>
+                    <a:bodyPr/>
+                    <a:lstStyle/>
+                    <a:p>
+                      <a:pPr algn="ctr">
+                        <a:lnSpc>
+                          <a:spcPct val="150000"/>
+                        </a:lnSpc>
+                      </a:pPr>
+                      <a:r>
+                        <a:rPr lang="en-US" sz="1200" dirty="0" smtClean="0">
+                          <a:solidFill>
+                            <a:schemeClr val="bg1">
+                              <a:lumMod val="50000"/>
+                            </a:schemeClr>
+                          </a:solidFill>
+                          <a:latin typeface="Arial"/>
+                          <a:cs typeface="Arial"/>
+                        </a:rPr>
+                        <a:t>31</a:t>
+                      </a:r>
+                      <a:endParaRPr lang="en-US" sz="1200" dirty="0" smtClean="0">
+                        <a:solidFill>
+                          <a:schemeClr val="bg1">
+                            <a:lumMod val="50000"/>
+                          </a:schemeClr>
+                        </a:solidFill>
+                        <a:latin typeface="Arial"/>
+                        <a:cs typeface="Arial"/>
+                      </a:endParaRPr>
+                    </a:p>
+                  </a:txBody>
+                  <a:tcPr>
+                    <a:solidFill>
+                      <a:schemeClr val="bg1">
+                        <a:lumMod val="75000"/>
+                      </a:schemeClr>
+                    </a:solidFill>
+                  </a:tcPr>
+                </a:tc>
+                <a:tc>
+                  <a:txBody>
+                    <a:bodyPr/>
+                    <a:lstStyle/>
+                    <a:p>
+                      <a:pPr algn="ctr">
+                        <a:lnSpc>
+                          <a:spcPct val="150000"/>
+                        </a:lnSpc>
+                      </a:pPr>
+                      <a:r>
+                        <a:rPr lang="en-US" sz="1200" dirty="0" smtClean="0">
+                          <a:solidFill>
+                            <a:schemeClr val="bg1">
+                              <a:lumMod val="50000"/>
+                            </a:schemeClr>
+                          </a:solidFill>
+                          <a:latin typeface="Arial"/>
+                          <a:cs typeface="Arial"/>
+                        </a:rPr>
+                        <a:t>32</a:t>
+                      </a:r>
+                      <a:endParaRPr lang="en-US" sz="1200" dirty="0">
+                        <a:solidFill>
+                          <a:schemeClr val="bg1">
+                            <a:lumMod val="50000"/>
+                          </a:schemeClr>
+                        </a:solidFill>
+                        <a:latin typeface="Arial"/>
+                        <a:cs typeface="Arial"/>
+                      </a:endParaRPr>
+                    </a:p>
+                  </a:txBody>
+                  <a:tcPr>
+                    <a:solidFill>
+                      <a:schemeClr val="bg1">
+                        <a:lumMod val="75000"/>
+                      </a:schemeClr>
+                    </a:solidFill>
+                  </a:tcPr>
+                </a:tc>
+                <a:tc>
+                  <a:txBody>
+                    <a:bodyPr/>
+                    <a:lstStyle/>
+                    <a:p>
+                      <a:pPr algn="ctr">
+                        <a:lnSpc>
+                          <a:spcPct val="150000"/>
+                        </a:lnSpc>
+                      </a:pPr>
+                      <a:r>
+                        <a:rPr lang="en-US" sz="1200" dirty="0" smtClean="0">
+                          <a:solidFill>
+                            <a:schemeClr val="bg1">
+                              <a:lumMod val="50000"/>
+                            </a:schemeClr>
+                          </a:solidFill>
+                          <a:latin typeface="Arial"/>
+                          <a:cs typeface="Arial"/>
+                        </a:rPr>
+                        <a:t>33</a:t>
+                      </a:r>
+                      <a:endParaRPr lang="en-US" sz="1200" dirty="0">
+                        <a:solidFill>
+                          <a:schemeClr val="bg1">
+                            <a:lumMod val="50000"/>
+                          </a:schemeClr>
+                        </a:solidFill>
+                        <a:latin typeface="Arial"/>
+                        <a:cs typeface="Arial"/>
+                      </a:endParaRPr>
+                    </a:p>
+                  </a:txBody>
+                  <a:tcPr>
+                    <a:solidFill>
+                      <a:schemeClr val="bg1">
+                        <a:lumMod val="75000"/>
+                      </a:schemeClr>
+                    </a:solidFill>
+                  </a:tcPr>
+                </a:tc>
+                <a:tc>
+                  <a:txBody>
+                    <a:bodyPr/>
+                    <a:lstStyle/>
+                    <a:p>
+                      <a:pPr algn="ctr">
+                        <a:lnSpc>
+                          <a:spcPct val="150000"/>
+                        </a:lnSpc>
+                      </a:pPr>
+                      <a:r>
+                        <a:rPr lang="en-US" sz="1200" dirty="0" smtClean="0">
+                          <a:solidFill>
+                            <a:schemeClr val="bg1">
+                              <a:lumMod val="50000"/>
+                            </a:schemeClr>
+                          </a:solidFill>
+                          <a:latin typeface="Arial"/>
+                          <a:cs typeface="Arial"/>
+                        </a:rPr>
+                        <a:t>34</a:t>
+                      </a:r>
+                      <a:endParaRPr lang="en-US" sz="1200" dirty="0">
+                        <a:solidFill>
+                          <a:schemeClr val="bg1">
+                            <a:lumMod val="50000"/>
+                          </a:schemeClr>
+                        </a:solidFill>
+                        <a:latin typeface="Arial"/>
+                        <a:cs typeface="Arial"/>
+                      </a:endParaRPr>
+                    </a:p>
+                  </a:txBody>
+                  <a:tcPr>
+                    <a:solidFill>
+                      <a:schemeClr val="bg1">
+                        <a:lumMod val="75000"/>
+                      </a:schemeClr>
+                    </a:solidFill>
+                  </a:tcPr>
+                </a:tc>
+                <a:tc>
+                  <a:txBody>
+                    <a:bodyPr/>
+                    <a:lstStyle/>
+                    <a:p>
+                      <a:pPr algn="ctr">
+                        <a:lnSpc>
+                          <a:spcPct val="150000"/>
+                        </a:lnSpc>
+                      </a:pPr>
+                      <a:r>
+                        <a:rPr lang="en-US" sz="1200" dirty="0" smtClean="0">
+                          <a:solidFill>
+                            <a:schemeClr val="bg1">
+                              <a:lumMod val="50000"/>
+                            </a:schemeClr>
+                          </a:solidFill>
+                          <a:latin typeface="Arial"/>
+                          <a:cs typeface="Arial"/>
+                        </a:rPr>
+                        <a:t>35</a:t>
+                      </a:r>
+                      <a:endParaRPr lang="en-US" sz="1200" dirty="0">
+                        <a:solidFill>
+                          <a:schemeClr val="bg1">
+                            <a:lumMod val="50000"/>
+                          </a:schemeClr>
+                        </a:solidFill>
+                        <a:latin typeface="Arial"/>
+                        <a:cs typeface="Arial"/>
+                      </a:endParaRPr>
+                    </a:p>
+                  </a:txBody>
+                  <a:tcPr>
+                    <a:solidFill>
+                      <a:schemeClr val="bg1">
+                        <a:lumMod val="75000"/>
+                      </a:schemeClr>
+                    </a:solidFill>
+                  </a:tcPr>
+                </a:tc>
+                <a:tc>
+                  <a:txBody>
+                    <a:bodyPr/>
+                    <a:lstStyle/>
+                    <a:p>
+                      <a:pPr algn="ctr">
+                        <a:lnSpc>
+                          <a:spcPct val="150000"/>
+                        </a:lnSpc>
+                      </a:pPr>
+                      <a:r>
+                        <a:rPr lang="en-US" sz="1200" dirty="0" smtClean="0">
+                          <a:solidFill>
+                            <a:schemeClr val="bg1">
+                              <a:lumMod val="50000"/>
+                            </a:schemeClr>
+                          </a:solidFill>
+                          <a:latin typeface="Arial"/>
+                          <a:cs typeface="Arial"/>
+                        </a:rPr>
+                        <a:t>36</a:t>
+                      </a:r>
+                      <a:endParaRPr lang="en-US" sz="1200" dirty="0">
+                        <a:solidFill>
+                          <a:schemeClr val="bg1">
+                            <a:lumMod val="50000"/>
+                          </a:schemeClr>
+                        </a:solidFill>
+                        <a:latin typeface="Arial"/>
+                        <a:cs typeface="Arial"/>
+                      </a:endParaRPr>
+                    </a:p>
+                  </a:txBody>
+                  <a:tcPr>
+                    <a:solidFill>
+                      <a:schemeClr val="bg1">
+                        <a:lumMod val="75000"/>
+                      </a:schemeClr>
+                    </a:solidFill>
+                  </a:tcPr>
+                </a:tc>
+                <a:tc>
+                  <a:txBody>
+                    <a:bodyPr/>
+                    <a:lstStyle/>
+                    <a:p>
+                      <a:pPr algn="ctr">
+                        <a:lnSpc>
+                          <a:spcPct val="150000"/>
+                        </a:lnSpc>
+                      </a:pPr>
+                      <a:r>
+                        <a:rPr lang="en-US" sz="1200" dirty="0" smtClean="0">
+                          <a:solidFill>
+                            <a:schemeClr val="bg1">
+                              <a:lumMod val="50000"/>
+                            </a:schemeClr>
+                          </a:solidFill>
+                          <a:latin typeface="Arial"/>
+                          <a:cs typeface="Arial"/>
+                        </a:rPr>
+                        <a:t>37</a:t>
+                      </a:r>
+                      <a:endParaRPr lang="en-US" sz="1200" dirty="0">
+                        <a:solidFill>
+                          <a:schemeClr val="bg1">
+                            <a:lumMod val="50000"/>
+                          </a:schemeClr>
+                        </a:solidFill>
+                        <a:latin typeface="Arial"/>
+                        <a:cs typeface="Arial"/>
+                      </a:endParaRPr>
+                    </a:p>
+                  </a:txBody>
+                  <a:tcPr>
+                    <a:solidFill>
+                      <a:schemeClr val="bg1">
+                        <a:lumMod val="75000"/>
+                      </a:schemeClr>
+                    </a:solidFill>
+                  </a:tcPr>
+                </a:tc>
+                <a:tc>
+                  <a:txBody>
+                    <a:bodyPr/>
+                    <a:lstStyle/>
+                    <a:p>
+                      <a:pPr algn="ctr">
+                        <a:lnSpc>
+                          <a:spcPct val="150000"/>
+                        </a:lnSpc>
+                      </a:pPr>
+                      <a:r>
+                        <a:rPr lang="en-US" sz="1200" dirty="0" smtClean="0">
+                          <a:solidFill>
+                            <a:schemeClr val="bg1">
+                              <a:lumMod val="50000"/>
+                            </a:schemeClr>
+                          </a:solidFill>
+                          <a:latin typeface="Arial"/>
+                          <a:cs typeface="Arial"/>
+                        </a:rPr>
+                        <a:t>38</a:t>
+                      </a:r>
+                      <a:endParaRPr lang="en-US" sz="1200" dirty="0">
+                        <a:solidFill>
+                          <a:schemeClr val="bg1">
+                            <a:lumMod val="50000"/>
+                          </a:schemeClr>
+                        </a:solidFill>
+                        <a:latin typeface="Arial"/>
+                        <a:cs typeface="Arial"/>
+                      </a:endParaRPr>
+                    </a:p>
+                  </a:txBody>
+                  <a:tcPr>
+                    <a:solidFill>
+                      <a:schemeClr val="bg1">
+                        <a:lumMod val="75000"/>
+                      </a:schemeClr>
+                    </a:solidFill>
+                  </a:tcPr>
+                </a:tc>
+                <a:tc>
+                  <a:txBody>
+                    <a:bodyPr/>
+                    <a:lstStyle/>
+                    <a:p>
+                      <a:pPr algn="ctr">
+                        <a:lnSpc>
+                          <a:spcPct val="150000"/>
+                        </a:lnSpc>
+                      </a:pPr>
+                      <a:r>
+                        <a:rPr lang="en-US" sz="1200" dirty="0" smtClean="0">
+                          <a:solidFill>
+                            <a:schemeClr val="bg1">
+                              <a:lumMod val="50000"/>
+                            </a:schemeClr>
+                          </a:solidFill>
+                          <a:latin typeface="Arial"/>
+                          <a:cs typeface="Arial"/>
+                        </a:rPr>
+                        <a:t>39</a:t>
+                      </a:r>
+                      <a:endParaRPr lang="en-US" sz="1200" dirty="0">
+                        <a:solidFill>
+                          <a:schemeClr val="bg1">
+                            <a:lumMod val="50000"/>
+                          </a:schemeClr>
+                        </a:solidFill>
+                        <a:latin typeface="Arial"/>
+                        <a:cs typeface="Arial"/>
+                      </a:endParaRPr>
+                    </a:p>
+                  </a:txBody>
+                  <a:tcPr>
+                    <a:solidFill>
+                      <a:schemeClr val="bg1">
+                        <a:lumMod val="75000"/>
+                      </a:schemeClr>
+                    </a:solidFill>
+                  </a:tcPr>
+                </a:tc>
+                <a:tc>
+                  <a:txBody>
+                    <a:bodyPr/>
+                    <a:lstStyle/>
+                    <a:p>
+                      <a:pPr algn="ctr">
+                        <a:lnSpc>
+                          <a:spcPct val="150000"/>
+                        </a:lnSpc>
+                      </a:pPr>
+                      <a:r>
+                        <a:rPr lang="en-US" sz="1200" dirty="0" smtClean="0">
+                          <a:solidFill>
+                            <a:schemeClr val="bg1">
+                              <a:lumMod val="50000"/>
+                            </a:schemeClr>
+                          </a:solidFill>
+                          <a:latin typeface="Arial"/>
+                          <a:cs typeface="Arial"/>
+                        </a:rPr>
+                        <a:t>40</a:t>
+                      </a:r>
+                      <a:endParaRPr lang="en-US" sz="1200" dirty="0">
+                        <a:solidFill>
+                          <a:schemeClr val="bg1">
+                            <a:lumMod val="50000"/>
+                          </a:schemeClr>
+                        </a:solidFill>
+                        <a:latin typeface="Arial"/>
+                        <a:cs typeface="Arial"/>
+                      </a:endParaRPr>
+                    </a:p>
+                  </a:txBody>
+                  <a:tcPr>
+                    <a:solidFill>
+                      <a:schemeClr val="bg1">
+                        <a:lumMod val="75000"/>
+                      </a:schemeClr>
+                    </a:solidFill>
+                  </a:tcPr>
+                </a:tc>
+              </a:tr>
+            </a:tbl>
+          </a:graphicData>
+        </a:graphic>
+      </p:graphicFrame>
+      <p:graphicFrame>
+        <p:nvGraphicFramePr>
+          <p:cNvPr id="62" name="Table 61"/>
+          <p:cNvGraphicFramePr>
+            <a:graphicFrameLocks noGrp="1"/>
+          </p:cNvGraphicFramePr>
+          <p:nvPr>
+            <p:extLst>
+              <p:ext uri="{D42A27DB-BD31-4B8C-83A1-F6EECF244321}">
+                <p14:modId xmlns:p14="http://schemas.microsoft.com/office/powerpoint/2010/main" val="1934333854"/>
+              </p:ext>
+            </p:extLst>
+          </p:nvPr>
+        </p:nvGraphicFramePr>
+        <p:xfrm>
+          <a:off x="62902" y="2859656"/>
+          <a:ext cx="9003520" cy="944556"/>
+        </p:xfrm>
+        <a:graphic>
+          <a:graphicData uri="http://schemas.openxmlformats.org/drawingml/2006/table">
+            <a:tbl>
+              <a:tblPr firstRow="1" bandRow="1">
+                <a:tableStyleId>{69CF1AB2-1976-4502-BF36-3FF5EA218861}</a:tableStyleId>
+              </a:tblPr>
+              <a:tblGrid>
+                <a:gridCol w="450176"/>
+                <a:gridCol w="450176"/>
+                <a:gridCol w="450176"/>
+                <a:gridCol w="450176"/>
+                <a:gridCol w="450176"/>
+                <a:gridCol w="450176"/>
+                <a:gridCol w="450176"/>
+                <a:gridCol w="450176"/>
+                <a:gridCol w="450176"/>
+                <a:gridCol w="450176"/>
+                <a:gridCol w="450176"/>
+                <a:gridCol w="450176"/>
+                <a:gridCol w="450176"/>
+                <a:gridCol w="450176"/>
+                <a:gridCol w="450176"/>
+                <a:gridCol w="450176"/>
+                <a:gridCol w="450176"/>
+                <a:gridCol w="450176"/>
+                <a:gridCol w="450176"/>
+                <a:gridCol w="450176"/>
+              </a:tblGrid>
+              <a:tr h="472278">
+                <a:tc>
+                  <a:txBody>
+                    <a:bodyPr/>
+                    <a:lstStyle/>
+                    <a:p>
+                      <a:pPr algn="ctr">
+                        <a:lnSpc>
+                          <a:spcPct val="150000"/>
+                        </a:lnSpc>
+                      </a:pPr>
+                      <a:r>
+                        <a:rPr lang="en-US" sz="1200" dirty="0" smtClean="0">
+                          <a:solidFill>
+                            <a:schemeClr val="bg1">
+                              <a:lumMod val="50000"/>
+                            </a:schemeClr>
+                          </a:solidFill>
+                          <a:latin typeface="Arial"/>
+                          <a:cs typeface="Arial"/>
+                        </a:rPr>
+                        <a:t>41</a:t>
+                      </a:r>
+                      <a:endParaRPr lang="en-US" sz="1200" dirty="0">
+                        <a:solidFill>
+                          <a:schemeClr val="bg1">
+                            <a:lumMod val="50000"/>
+                          </a:schemeClr>
+                        </a:solidFill>
+                        <a:latin typeface="Arial"/>
+                        <a:cs typeface="Arial"/>
+                      </a:endParaRPr>
+                    </a:p>
+                  </a:txBody>
+                  <a:tcPr>
+                    <a:solidFill>
+                      <a:schemeClr val="bg1">
+                        <a:lumMod val="75000"/>
+                      </a:schemeClr>
+                    </a:solidFill>
+                  </a:tcPr>
+                </a:tc>
+                <a:tc>
+                  <a:txBody>
+                    <a:bodyPr/>
+                    <a:lstStyle/>
+                    <a:p>
+                      <a:pPr algn="ctr">
+                        <a:lnSpc>
+                          <a:spcPct val="150000"/>
+                        </a:lnSpc>
+                      </a:pPr>
+                      <a:r>
+                        <a:rPr lang="en-US" sz="1200" dirty="0" smtClean="0">
+                          <a:solidFill>
+                            <a:schemeClr val="bg1">
+                              <a:lumMod val="50000"/>
+                            </a:schemeClr>
+                          </a:solidFill>
+                          <a:latin typeface="Arial"/>
+                          <a:cs typeface="Arial"/>
+                        </a:rPr>
+                        <a:t>42</a:t>
+                      </a:r>
+                      <a:endParaRPr lang="en-US" sz="1200" dirty="0">
+                        <a:solidFill>
+                          <a:schemeClr val="bg1">
+                            <a:lumMod val="50000"/>
+                          </a:schemeClr>
+                        </a:solidFill>
+                        <a:latin typeface="Arial"/>
+                        <a:cs typeface="Arial"/>
+                      </a:endParaRPr>
+                    </a:p>
+                  </a:txBody>
+                  <a:tcPr>
+                    <a:solidFill>
+                      <a:schemeClr val="bg1">
+                        <a:lumMod val="75000"/>
+                      </a:schemeClr>
+                    </a:solidFill>
+                  </a:tcPr>
+                </a:tc>
+                <a:tc>
+                  <a:txBody>
+                    <a:bodyPr/>
+                    <a:lstStyle/>
+                    <a:p>
+                      <a:pPr algn="ctr">
+                        <a:lnSpc>
+                          <a:spcPct val="150000"/>
+                        </a:lnSpc>
+                      </a:pPr>
+                      <a:r>
+                        <a:rPr lang="en-US" sz="1200" dirty="0" smtClean="0">
+                          <a:solidFill>
+                            <a:schemeClr val="bg1">
+                              <a:lumMod val="50000"/>
+                            </a:schemeClr>
+                          </a:solidFill>
+                          <a:latin typeface="Arial"/>
+                          <a:cs typeface="Arial"/>
+                        </a:rPr>
+                        <a:t>43</a:t>
+                      </a:r>
+                      <a:endParaRPr lang="en-US" sz="1200" dirty="0">
+                        <a:solidFill>
+                          <a:schemeClr val="bg1">
+                            <a:lumMod val="50000"/>
+                          </a:schemeClr>
+                        </a:solidFill>
+                        <a:latin typeface="Arial"/>
+                        <a:cs typeface="Arial"/>
+                      </a:endParaRPr>
+                    </a:p>
+                  </a:txBody>
+                  <a:tcPr>
+                    <a:solidFill>
+                      <a:schemeClr val="bg1">
+                        <a:lumMod val="75000"/>
+                      </a:schemeClr>
+                    </a:solidFill>
+                  </a:tcPr>
+                </a:tc>
+                <a:tc>
+                  <a:txBody>
+                    <a:bodyPr/>
+                    <a:lstStyle/>
+                    <a:p>
+                      <a:pPr algn="ctr">
+                        <a:lnSpc>
+                          <a:spcPct val="150000"/>
+                        </a:lnSpc>
+                      </a:pPr>
+                      <a:r>
+                        <a:rPr lang="en-US" sz="1200" dirty="0" smtClean="0">
+                          <a:solidFill>
+                            <a:schemeClr val="bg1">
+                              <a:lumMod val="50000"/>
+                            </a:schemeClr>
+                          </a:solidFill>
+                          <a:latin typeface="Arial"/>
+                          <a:cs typeface="Arial"/>
+                        </a:rPr>
+                        <a:t>44</a:t>
+                      </a:r>
+                      <a:endParaRPr lang="en-US" sz="1200" dirty="0">
+                        <a:solidFill>
+                          <a:schemeClr val="bg1">
+                            <a:lumMod val="50000"/>
+                          </a:schemeClr>
+                        </a:solidFill>
+                        <a:latin typeface="Arial"/>
+                        <a:cs typeface="Arial"/>
+                      </a:endParaRPr>
+                    </a:p>
+                  </a:txBody>
+                  <a:tcPr>
+                    <a:solidFill>
+                      <a:schemeClr val="bg1">
+                        <a:lumMod val="75000"/>
+                      </a:schemeClr>
+                    </a:solidFill>
+                  </a:tcPr>
+                </a:tc>
+                <a:tc>
+                  <a:txBody>
+                    <a:bodyPr/>
+                    <a:lstStyle/>
+                    <a:p>
+                      <a:pPr algn="ctr">
+                        <a:lnSpc>
+                          <a:spcPct val="150000"/>
+                        </a:lnSpc>
+                      </a:pPr>
+                      <a:r>
+                        <a:rPr lang="en-US" sz="1200" dirty="0" smtClean="0">
+                          <a:solidFill>
+                            <a:schemeClr val="bg1">
+                              <a:lumMod val="50000"/>
+                            </a:schemeClr>
+                          </a:solidFill>
+                          <a:latin typeface="Arial"/>
+                          <a:cs typeface="Arial"/>
+                        </a:rPr>
+                        <a:t>45</a:t>
+                      </a:r>
+                      <a:endParaRPr lang="en-US" sz="1200" dirty="0">
+                        <a:solidFill>
+                          <a:schemeClr val="bg1">
+                            <a:lumMod val="50000"/>
+                          </a:schemeClr>
+                        </a:solidFill>
+                        <a:latin typeface="Arial"/>
+                        <a:cs typeface="Arial"/>
+                      </a:endParaRPr>
+                    </a:p>
+                  </a:txBody>
+                  <a:tcPr>
+                    <a:solidFill>
+                      <a:schemeClr val="bg1">
+                        <a:lumMod val="75000"/>
+                      </a:schemeClr>
+                    </a:solidFill>
+                  </a:tcPr>
+                </a:tc>
+                <a:tc>
+                  <a:txBody>
+                    <a:bodyPr/>
+                    <a:lstStyle/>
+                    <a:p>
+                      <a:pPr algn="ctr">
+                        <a:lnSpc>
+                          <a:spcPct val="150000"/>
+                        </a:lnSpc>
+                      </a:pPr>
+                      <a:r>
+                        <a:rPr lang="en-US" sz="1200" dirty="0" smtClean="0">
+                          <a:solidFill>
+                            <a:schemeClr val="bg1">
+                              <a:lumMod val="50000"/>
+                            </a:schemeClr>
+                          </a:solidFill>
+                          <a:latin typeface="Arial"/>
+                          <a:cs typeface="Arial"/>
+                        </a:rPr>
+                        <a:t>46</a:t>
+                      </a:r>
+                      <a:endParaRPr lang="en-US" sz="1200" dirty="0">
+                        <a:solidFill>
+                          <a:schemeClr val="bg1">
+                            <a:lumMod val="50000"/>
+                          </a:schemeClr>
+                        </a:solidFill>
+                        <a:latin typeface="Arial"/>
+                        <a:cs typeface="Arial"/>
+                      </a:endParaRPr>
+                    </a:p>
+                  </a:txBody>
+                  <a:tcPr>
+                    <a:solidFill>
+                      <a:schemeClr val="bg1">
+                        <a:lumMod val="75000"/>
+                      </a:schemeClr>
+                    </a:solidFill>
+                  </a:tcPr>
+                </a:tc>
+                <a:tc>
+                  <a:txBody>
+                    <a:bodyPr/>
+                    <a:lstStyle/>
+                    <a:p>
+                      <a:pPr algn="ctr">
+                        <a:lnSpc>
+                          <a:spcPct val="150000"/>
+                        </a:lnSpc>
+                      </a:pPr>
+                      <a:r>
+                        <a:rPr lang="en-US" sz="1200" dirty="0" smtClean="0">
+                          <a:solidFill>
+                            <a:schemeClr val="bg1">
+                              <a:lumMod val="50000"/>
+                            </a:schemeClr>
+                          </a:solidFill>
+                          <a:latin typeface="Arial"/>
+                          <a:cs typeface="Arial"/>
+                        </a:rPr>
+                        <a:t>47</a:t>
+                      </a:r>
+                      <a:endParaRPr lang="en-US" sz="1200" dirty="0">
+                        <a:solidFill>
+                          <a:schemeClr val="bg1">
+                            <a:lumMod val="50000"/>
+                          </a:schemeClr>
+                        </a:solidFill>
+                        <a:latin typeface="Arial"/>
+                        <a:cs typeface="Arial"/>
+                      </a:endParaRPr>
+                    </a:p>
+                  </a:txBody>
+                  <a:tcPr>
+                    <a:solidFill>
+                      <a:schemeClr val="bg1">
+                        <a:lumMod val="75000"/>
+                      </a:schemeClr>
+                    </a:solidFill>
+                  </a:tcPr>
+                </a:tc>
+                <a:tc>
+                  <a:txBody>
+                    <a:bodyPr/>
+                    <a:lstStyle/>
+                    <a:p>
+                      <a:pPr algn="ctr">
+                        <a:lnSpc>
+                          <a:spcPct val="150000"/>
+                        </a:lnSpc>
+                      </a:pPr>
+                      <a:r>
+                        <a:rPr lang="en-US" sz="1200" dirty="0" smtClean="0">
+                          <a:solidFill>
+                            <a:schemeClr val="bg1">
+                              <a:lumMod val="50000"/>
+                            </a:schemeClr>
+                          </a:solidFill>
+                          <a:latin typeface="Arial"/>
+                          <a:cs typeface="Arial"/>
+                        </a:rPr>
+                        <a:t>48</a:t>
+                      </a:r>
+                      <a:endParaRPr lang="en-US" sz="1200" dirty="0">
+                        <a:solidFill>
+                          <a:schemeClr val="bg1">
+                            <a:lumMod val="50000"/>
+                          </a:schemeClr>
+                        </a:solidFill>
+                        <a:latin typeface="Arial"/>
+                        <a:cs typeface="Arial"/>
+                      </a:endParaRPr>
+                    </a:p>
+                  </a:txBody>
+                  <a:tcPr>
+                    <a:solidFill>
+                      <a:schemeClr val="bg1">
+                        <a:lumMod val="75000"/>
+                      </a:schemeClr>
+                    </a:solidFill>
+                  </a:tcPr>
+                </a:tc>
+                <a:tc>
+                  <a:txBody>
+                    <a:bodyPr/>
+                    <a:lstStyle/>
+                    <a:p>
+                      <a:pPr algn="ctr">
+                        <a:lnSpc>
+                          <a:spcPct val="150000"/>
+                        </a:lnSpc>
+                      </a:pPr>
+                      <a:r>
+                        <a:rPr lang="en-US" sz="1200" dirty="0" smtClean="0">
+                          <a:solidFill>
+                            <a:schemeClr val="bg1">
+                              <a:lumMod val="50000"/>
+                            </a:schemeClr>
+                          </a:solidFill>
+                          <a:latin typeface="Arial"/>
+                          <a:cs typeface="Arial"/>
+                        </a:rPr>
+                        <a:t>49</a:t>
+                      </a:r>
+                      <a:endParaRPr lang="en-US" sz="1200" dirty="0">
+                        <a:solidFill>
+                          <a:schemeClr val="bg1">
+                            <a:lumMod val="50000"/>
+                          </a:schemeClr>
+                        </a:solidFill>
+                        <a:latin typeface="Arial"/>
+                        <a:cs typeface="Arial"/>
+                      </a:endParaRPr>
+                    </a:p>
+                  </a:txBody>
+                  <a:tcPr>
+                    <a:solidFill>
+                      <a:schemeClr val="bg1">
+                        <a:lumMod val="75000"/>
+                      </a:schemeClr>
+                    </a:solidFill>
+                  </a:tcPr>
+                </a:tc>
+                <a:tc>
+                  <a:txBody>
+                    <a:bodyPr/>
+                    <a:lstStyle/>
+                    <a:p>
+                      <a:pPr algn="ctr">
+                        <a:lnSpc>
+                          <a:spcPct val="150000"/>
+                        </a:lnSpc>
+                      </a:pPr>
+                      <a:r>
+                        <a:rPr lang="en-US" sz="1200" dirty="0" smtClean="0">
+                          <a:solidFill>
+                            <a:schemeClr val="bg1">
+                              <a:lumMod val="50000"/>
+                            </a:schemeClr>
+                          </a:solidFill>
+                          <a:latin typeface="Arial"/>
+                          <a:cs typeface="Arial"/>
+                        </a:rPr>
+                        <a:t>50</a:t>
+                      </a:r>
+                      <a:endParaRPr lang="en-US" sz="1200" dirty="0">
+                        <a:solidFill>
+                          <a:schemeClr val="bg1">
+                            <a:lumMod val="50000"/>
+                          </a:schemeClr>
+                        </a:solidFill>
+                        <a:latin typeface="Arial"/>
+                        <a:cs typeface="Arial"/>
+                      </a:endParaRPr>
+                    </a:p>
+                  </a:txBody>
+                  <a:tcPr>
+                    <a:solidFill>
+                      <a:schemeClr val="bg1">
+                        <a:lumMod val="75000"/>
+                      </a:schemeClr>
+                    </a:solidFill>
+                  </a:tcPr>
+                </a:tc>
+                <a:tc>
+                  <a:txBody>
+                    <a:bodyPr/>
+                    <a:lstStyle/>
+                    <a:p>
+                      <a:pPr algn="ctr">
+                        <a:lnSpc>
+                          <a:spcPct val="150000"/>
+                        </a:lnSpc>
+                      </a:pPr>
+                      <a:r>
+                        <a:rPr lang="en-US" sz="1200" dirty="0" smtClean="0">
+                          <a:solidFill>
+                            <a:schemeClr val="bg1">
+                              <a:lumMod val="50000"/>
+                            </a:schemeClr>
+                          </a:solidFill>
+                          <a:latin typeface="Arial"/>
+                          <a:cs typeface="Arial"/>
+                        </a:rPr>
+                        <a:t>51</a:t>
+                      </a:r>
+                      <a:endParaRPr lang="en-US" sz="1200" dirty="0" smtClean="0">
+                        <a:solidFill>
+                          <a:schemeClr val="bg1">
+                            <a:lumMod val="50000"/>
+                          </a:schemeClr>
+                        </a:solidFill>
+                        <a:latin typeface="Arial"/>
+                        <a:cs typeface="Arial"/>
+                      </a:endParaRPr>
+                    </a:p>
+                  </a:txBody>
+                  <a:tcPr>
+                    <a:solidFill>
+                      <a:schemeClr val="bg1">
+                        <a:lumMod val="75000"/>
+                      </a:schemeClr>
+                    </a:solidFill>
+                  </a:tcPr>
+                </a:tc>
+                <a:tc>
+                  <a:txBody>
+                    <a:bodyPr/>
+                    <a:lstStyle/>
+                    <a:p>
+                      <a:pPr algn="ctr">
+                        <a:lnSpc>
+                          <a:spcPct val="150000"/>
+                        </a:lnSpc>
+                      </a:pPr>
+                      <a:r>
+                        <a:rPr lang="en-US" sz="1200" dirty="0" smtClean="0">
+                          <a:solidFill>
+                            <a:schemeClr val="bg1">
+                              <a:lumMod val="50000"/>
+                            </a:schemeClr>
+                          </a:solidFill>
+                          <a:latin typeface="Arial"/>
+                          <a:cs typeface="Arial"/>
+                        </a:rPr>
+                        <a:t>52</a:t>
+                      </a:r>
+                      <a:endParaRPr lang="en-US" sz="1200" dirty="0">
+                        <a:solidFill>
+                          <a:schemeClr val="bg1">
+                            <a:lumMod val="50000"/>
+                          </a:schemeClr>
+                        </a:solidFill>
+                        <a:latin typeface="Arial"/>
+                        <a:cs typeface="Arial"/>
+                      </a:endParaRPr>
+                    </a:p>
+                  </a:txBody>
+                  <a:tcPr>
+                    <a:solidFill>
+                      <a:schemeClr val="bg1">
+                        <a:lumMod val="75000"/>
+                      </a:schemeClr>
+                    </a:solidFill>
+                  </a:tcPr>
+                </a:tc>
+                <a:tc>
+                  <a:txBody>
+                    <a:bodyPr/>
+                    <a:lstStyle/>
+                    <a:p>
+                      <a:pPr algn="ctr">
+                        <a:lnSpc>
+                          <a:spcPct val="150000"/>
+                        </a:lnSpc>
+                      </a:pPr>
+                      <a:r>
+                        <a:rPr lang="en-US" sz="1200" dirty="0" smtClean="0">
+                          <a:solidFill>
+                            <a:schemeClr val="bg1">
+                              <a:lumMod val="50000"/>
+                            </a:schemeClr>
+                          </a:solidFill>
+                          <a:latin typeface="Arial"/>
+                          <a:cs typeface="Arial"/>
+                        </a:rPr>
+                        <a:t>53</a:t>
+                      </a:r>
+                      <a:endParaRPr lang="en-US" sz="1200" dirty="0">
+                        <a:solidFill>
+                          <a:schemeClr val="bg1">
+                            <a:lumMod val="50000"/>
+                          </a:schemeClr>
+                        </a:solidFill>
+                        <a:latin typeface="Arial"/>
+                        <a:cs typeface="Arial"/>
+                      </a:endParaRPr>
+                    </a:p>
+                  </a:txBody>
+                  <a:tcPr>
+                    <a:solidFill>
+                      <a:schemeClr val="bg1">
+                        <a:lumMod val="75000"/>
+                      </a:schemeClr>
+                    </a:solidFill>
+                  </a:tcPr>
+                </a:tc>
+                <a:tc>
+                  <a:txBody>
+                    <a:bodyPr/>
+                    <a:lstStyle/>
+                    <a:p>
+                      <a:pPr algn="ctr">
+                        <a:lnSpc>
+                          <a:spcPct val="150000"/>
+                        </a:lnSpc>
+                      </a:pPr>
+                      <a:r>
+                        <a:rPr lang="en-US" sz="1200" dirty="0" smtClean="0">
+                          <a:solidFill>
+                            <a:schemeClr val="bg1">
+                              <a:lumMod val="50000"/>
+                            </a:schemeClr>
+                          </a:solidFill>
+                          <a:latin typeface="Arial"/>
+                          <a:cs typeface="Arial"/>
+                        </a:rPr>
+                        <a:t>54</a:t>
+                      </a:r>
+                      <a:endParaRPr lang="en-US" sz="1200" dirty="0">
+                        <a:solidFill>
+                          <a:schemeClr val="bg1">
+                            <a:lumMod val="50000"/>
+                          </a:schemeClr>
+                        </a:solidFill>
+                        <a:latin typeface="Arial"/>
+                        <a:cs typeface="Arial"/>
+                      </a:endParaRPr>
+                    </a:p>
+                  </a:txBody>
+                  <a:tcPr>
+                    <a:solidFill>
+                      <a:schemeClr val="bg1">
+                        <a:lumMod val="75000"/>
+                      </a:schemeClr>
+                    </a:solidFill>
+                  </a:tcPr>
+                </a:tc>
+                <a:tc>
+                  <a:txBody>
+                    <a:bodyPr/>
+                    <a:lstStyle/>
+                    <a:p>
+                      <a:pPr algn="ctr">
+                        <a:lnSpc>
+                          <a:spcPct val="150000"/>
+                        </a:lnSpc>
+                      </a:pPr>
+                      <a:r>
+                        <a:rPr lang="en-US" sz="1200" dirty="0" smtClean="0">
+                          <a:solidFill>
+                            <a:schemeClr val="bg1">
+                              <a:lumMod val="50000"/>
+                            </a:schemeClr>
+                          </a:solidFill>
+                          <a:latin typeface="Arial"/>
+                          <a:cs typeface="Arial"/>
+                        </a:rPr>
+                        <a:t>54</a:t>
+                      </a:r>
+                      <a:endParaRPr lang="en-US" sz="1200" dirty="0">
+                        <a:solidFill>
+                          <a:schemeClr val="bg1">
+                            <a:lumMod val="50000"/>
+                          </a:schemeClr>
+                        </a:solidFill>
+                        <a:latin typeface="Arial"/>
+                        <a:cs typeface="Arial"/>
+                      </a:endParaRPr>
+                    </a:p>
+                  </a:txBody>
+                  <a:tcPr>
+                    <a:solidFill>
+                      <a:schemeClr val="bg1">
+                        <a:lumMod val="75000"/>
+                      </a:schemeClr>
+                    </a:solidFill>
+                  </a:tcPr>
+                </a:tc>
+                <a:tc>
+                  <a:txBody>
+                    <a:bodyPr/>
+                    <a:lstStyle/>
+                    <a:p>
+                      <a:pPr algn="ctr">
+                        <a:lnSpc>
+                          <a:spcPct val="150000"/>
+                        </a:lnSpc>
+                      </a:pPr>
+                      <a:r>
+                        <a:rPr lang="en-US" sz="1200" dirty="0" smtClean="0">
+                          <a:solidFill>
+                            <a:schemeClr val="bg1">
+                              <a:lumMod val="50000"/>
+                            </a:schemeClr>
+                          </a:solidFill>
+                          <a:latin typeface="Arial"/>
+                          <a:cs typeface="Arial"/>
+                        </a:rPr>
+                        <a:t>55</a:t>
+                      </a:r>
+                      <a:endParaRPr lang="en-US" sz="1200" dirty="0">
+                        <a:solidFill>
+                          <a:schemeClr val="bg1">
+                            <a:lumMod val="50000"/>
+                          </a:schemeClr>
+                        </a:solidFill>
+                        <a:latin typeface="Arial"/>
+                        <a:cs typeface="Arial"/>
+                      </a:endParaRPr>
+                    </a:p>
+                  </a:txBody>
+                  <a:tcPr>
+                    <a:solidFill>
+                      <a:schemeClr val="bg1">
+                        <a:lumMod val="75000"/>
+                      </a:schemeClr>
+                    </a:solidFill>
+                  </a:tcPr>
+                </a:tc>
+                <a:tc>
+                  <a:txBody>
+                    <a:bodyPr/>
+                    <a:lstStyle/>
+                    <a:p>
+                      <a:pPr algn="ctr">
+                        <a:lnSpc>
+                          <a:spcPct val="150000"/>
+                        </a:lnSpc>
+                      </a:pPr>
+                      <a:r>
+                        <a:rPr lang="en-US" sz="1200" dirty="0" smtClean="0">
+                          <a:solidFill>
+                            <a:schemeClr val="bg1">
+                              <a:lumMod val="50000"/>
+                            </a:schemeClr>
+                          </a:solidFill>
+                          <a:latin typeface="Arial"/>
+                          <a:cs typeface="Arial"/>
+                        </a:rPr>
+                        <a:t>56</a:t>
+                      </a:r>
+                      <a:endParaRPr lang="en-US" sz="1200" dirty="0">
+                        <a:solidFill>
+                          <a:schemeClr val="bg1">
+                            <a:lumMod val="50000"/>
+                          </a:schemeClr>
+                        </a:solidFill>
+                        <a:latin typeface="Arial"/>
+                        <a:cs typeface="Arial"/>
+                      </a:endParaRPr>
+                    </a:p>
+                  </a:txBody>
+                  <a:tcPr>
+                    <a:solidFill>
+                      <a:schemeClr val="bg1">
+                        <a:lumMod val="75000"/>
+                      </a:schemeClr>
+                    </a:solidFill>
+                  </a:tcPr>
+                </a:tc>
+                <a:tc>
+                  <a:txBody>
+                    <a:bodyPr/>
+                    <a:lstStyle/>
+                    <a:p>
+                      <a:pPr algn="ctr">
+                        <a:lnSpc>
+                          <a:spcPct val="150000"/>
+                        </a:lnSpc>
+                      </a:pPr>
+                      <a:r>
+                        <a:rPr lang="en-US" sz="1200" dirty="0" smtClean="0">
+                          <a:solidFill>
+                            <a:schemeClr val="bg1">
+                              <a:lumMod val="50000"/>
+                            </a:schemeClr>
+                          </a:solidFill>
+                          <a:latin typeface="Arial"/>
+                          <a:cs typeface="Arial"/>
+                        </a:rPr>
+                        <a:t>57</a:t>
+                      </a:r>
+                      <a:endParaRPr lang="en-US" sz="1200" dirty="0">
+                        <a:solidFill>
+                          <a:schemeClr val="bg1">
+                            <a:lumMod val="50000"/>
+                          </a:schemeClr>
+                        </a:solidFill>
+                        <a:latin typeface="Arial"/>
+                        <a:cs typeface="Arial"/>
+                      </a:endParaRPr>
+                    </a:p>
+                  </a:txBody>
+                  <a:tcPr>
+                    <a:solidFill>
+                      <a:schemeClr val="bg1">
+                        <a:lumMod val="75000"/>
+                      </a:schemeClr>
+                    </a:solidFill>
+                  </a:tcPr>
+                </a:tc>
+                <a:tc>
+                  <a:txBody>
+                    <a:bodyPr/>
+                    <a:lstStyle/>
+                    <a:p>
+                      <a:pPr algn="ctr">
+                        <a:lnSpc>
+                          <a:spcPct val="150000"/>
+                        </a:lnSpc>
+                      </a:pPr>
+                      <a:r>
+                        <a:rPr lang="en-US" sz="1200" dirty="0" smtClean="0">
+                          <a:solidFill>
+                            <a:schemeClr val="bg1">
+                              <a:lumMod val="50000"/>
+                            </a:schemeClr>
+                          </a:solidFill>
+                          <a:latin typeface="Arial"/>
+                          <a:cs typeface="Arial"/>
+                        </a:rPr>
+                        <a:t>58</a:t>
+                      </a:r>
+                      <a:endParaRPr lang="en-US" sz="1200" dirty="0">
+                        <a:solidFill>
+                          <a:schemeClr val="bg1">
+                            <a:lumMod val="50000"/>
+                          </a:schemeClr>
+                        </a:solidFill>
+                        <a:latin typeface="Arial"/>
+                        <a:cs typeface="Arial"/>
+                      </a:endParaRPr>
+                    </a:p>
+                  </a:txBody>
+                  <a:tcPr>
+                    <a:solidFill>
+                      <a:schemeClr val="bg1">
+                        <a:lumMod val="75000"/>
+                      </a:schemeClr>
+                    </a:solidFill>
+                  </a:tcPr>
+                </a:tc>
+                <a:tc>
+                  <a:txBody>
+                    <a:bodyPr/>
+                    <a:lstStyle/>
+                    <a:p>
+                      <a:pPr algn="ctr">
+                        <a:lnSpc>
+                          <a:spcPct val="150000"/>
+                        </a:lnSpc>
+                      </a:pPr>
+                      <a:r>
+                        <a:rPr lang="en-US" sz="1200" dirty="0" smtClean="0">
+                          <a:solidFill>
+                            <a:schemeClr val="bg1">
+                              <a:lumMod val="50000"/>
+                            </a:schemeClr>
+                          </a:solidFill>
+                          <a:latin typeface="Arial"/>
+                          <a:cs typeface="Arial"/>
+                        </a:rPr>
+                        <a:t>59</a:t>
+                      </a:r>
+                      <a:endParaRPr lang="en-US" sz="1200" dirty="0">
+                        <a:solidFill>
+                          <a:schemeClr val="bg1">
+                            <a:lumMod val="50000"/>
+                          </a:schemeClr>
+                        </a:solidFill>
+                        <a:latin typeface="Arial"/>
+                        <a:cs typeface="Arial"/>
+                      </a:endParaRPr>
+                    </a:p>
+                  </a:txBody>
+                  <a:tcPr>
+                    <a:solidFill>
+                      <a:schemeClr val="bg1">
+                        <a:lumMod val="75000"/>
+                      </a:schemeClr>
+                    </a:solidFill>
+                  </a:tcPr>
+                </a:tc>
+              </a:tr>
+              <a:tr h="472278">
+                <a:tc>
+                  <a:txBody>
+                    <a:bodyPr/>
+                    <a:lstStyle/>
+                    <a:p>
+                      <a:pPr algn="ctr">
+                        <a:lnSpc>
+                          <a:spcPct val="150000"/>
+                        </a:lnSpc>
+                      </a:pPr>
+                      <a:endParaRPr lang="en-US" sz="1200" dirty="0">
+                        <a:solidFill>
+                          <a:schemeClr val="bg1">
+                            <a:lumMod val="50000"/>
+                          </a:schemeClr>
+                        </a:solidFill>
+                        <a:latin typeface="Arial"/>
+                        <a:cs typeface="Arial"/>
+                      </a:endParaRPr>
+                    </a:p>
+                  </a:txBody>
+                  <a:tcPr>
+                    <a:solidFill>
+                      <a:schemeClr val="bg1">
+                        <a:lumMod val="75000"/>
+                      </a:schemeClr>
+                    </a:solidFill>
+                  </a:tcPr>
+                </a:tc>
+                <a:tc>
+                  <a:txBody>
+                    <a:bodyPr/>
+                    <a:lstStyle/>
+                    <a:p>
+                      <a:pPr algn="ctr">
+                        <a:lnSpc>
+                          <a:spcPct val="150000"/>
+                        </a:lnSpc>
+                      </a:pPr>
+                      <a:endParaRPr lang="en-US" sz="1200" dirty="0">
+                        <a:solidFill>
+                          <a:schemeClr val="bg1">
+                            <a:lumMod val="50000"/>
+                          </a:schemeClr>
+                        </a:solidFill>
+                        <a:latin typeface="Arial"/>
+                        <a:cs typeface="Arial"/>
+                      </a:endParaRPr>
+                    </a:p>
+                  </a:txBody>
+                  <a:tcPr>
+                    <a:solidFill>
+                      <a:schemeClr val="bg1">
+                        <a:lumMod val="75000"/>
+                      </a:schemeClr>
+                    </a:solidFill>
+                  </a:tcPr>
+                </a:tc>
+                <a:tc>
+                  <a:txBody>
+                    <a:bodyPr/>
+                    <a:lstStyle/>
+                    <a:p>
+                      <a:pPr algn="ctr">
+                        <a:lnSpc>
+                          <a:spcPct val="150000"/>
+                        </a:lnSpc>
+                      </a:pPr>
+                      <a:endParaRPr lang="en-US" sz="1200" dirty="0">
+                        <a:solidFill>
+                          <a:schemeClr val="bg1">
+                            <a:lumMod val="50000"/>
+                          </a:schemeClr>
+                        </a:solidFill>
+                        <a:latin typeface="Arial"/>
+                        <a:cs typeface="Arial"/>
+                      </a:endParaRPr>
+                    </a:p>
+                  </a:txBody>
+                  <a:tcPr>
+                    <a:solidFill>
+                      <a:schemeClr val="bg1">
+                        <a:lumMod val="75000"/>
+                      </a:schemeClr>
+                    </a:solidFill>
+                  </a:tcPr>
+                </a:tc>
+                <a:tc>
+                  <a:txBody>
+                    <a:bodyPr/>
+                    <a:lstStyle/>
+                    <a:p>
+                      <a:pPr algn="ctr">
+                        <a:lnSpc>
+                          <a:spcPct val="150000"/>
+                        </a:lnSpc>
+                      </a:pPr>
+                      <a:endParaRPr lang="en-US" sz="1200" dirty="0">
+                        <a:solidFill>
+                          <a:schemeClr val="bg1">
+                            <a:lumMod val="50000"/>
+                          </a:schemeClr>
+                        </a:solidFill>
+                        <a:latin typeface="Arial"/>
+                        <a:cs typeface="Arial"/>
+                      </a:endParaRPr>
+                    </a:p>
+                  </a:txBody>
+                  <a:tcPr>
+                    <a:solidFill>
+                      <a:schemeClr val="bg1">
+                        <a:lumMod val="75000"/>
+                      </a:schemeClr>
+                    </a:solidFill>
+                  </a:tcPr>
+                </a:tc>
+                <a:tc>
+                  <a:txBody>
+                    <a:bodyPr/>
+                    <a:lstStyle/>
+                    <a:p>
+                      <a:pPr algn="ctr">
+                        <a:lnSpc>
+                          <a:spcPct val="150000"/>
+                        </a:lnSpc>
+                      </a:pPr>
+                      <a:endParaRPr lang="en-US" sz="1200" dirty="0">
+                        <a:solidFill>
+                          <a:schemeClr val="bg1">
+                            <a:lumMod val="50000"/>
+                          </a:schemeClr>
+                        </a:solidFill>
+                        <a:latin typeface="Arial"/>
+                        <a:cs typeface="Arial"/>
+                      </a:endParaRPr>
+                    </a:p>
+                  </a:txBody>
+                  <a:tcPr>
+                    <a:solidFill>
+                      <a:schemeClr val="bg1">
+                        <a:lumMod val="75000"/>
+                      </a:schemeClr>
+                    </a:solidFill>
+                  </a:tcPr>
+                </a:tc>
+                <a:tc>
+                  <a:txBody>
+                    <a:bodyPr/>
+                    <a:lstStyle/>
+                    <a:p>
+                      <a:pPr algn="ctr">
+                        <a:lnSpc>
+                          <a:spcPct val="150000"/>
+                        </a:lnSpc>
+                      </a:pPr>
+                      <a:endParaRPr lang="en-US" sz="1200" dirty="0">
+                        <a:solidFill>
+                          <a:schemeClr val="bg1">
+                            <a:lumMod val="50000"/>
+                          </a:schemeClr>
+                        </a:solidFill>
+                        <a:latin typeface="Arial"/>
+                        <a:cs typeface="Arial"/>
+                      </a:endParaRPr>
+                    </a:p>
+                  </a:txBody>
+                  <a:tcPr>
+                    <a:solidFill>
+                      <a:schemeClr val="bg1">
+                        <a:lumMod val="75000"/>
+                      </a:schemeClr>
+                    </a:solidFill>
+                  </a:tcPr>
+                </a:tc>
+                <a:tc>
+                  <a:txBody>
+                    <a:bodyPr/>
+                    <a:lstStyle/>
+                    <a:p>
+                      <a:pPr algn="ctr">
+                        <a:lnSpc>
+                          <a:spcPct val="150000"/>
+                        </a:lnSpc>
+                      </a:pPr>
+                      <a:endParaRPr lang="en-US" sz="1200" dirty="0">
+                        <a:solidFill>
+                          <a:schemeClr val="bg1">
+                            <a:lumMod val="50000"/>
+                          </a:schemeClr>
+                        </a:solidFill>
+                        <a:latin typeface="Arial"/>
+                        <a:cs typeface="Arial"/>
+                      </a:endParaRPr>
+                    </a:p>
+                  </a:txBody>
+                  <a:tcPr>
+                    <a:solidFill>
+                      <a:schemeClr val="bg1">
+                        <a:lumMod val="75000"/>
+                      </a:schemeClr>
+                    </a:solidFill>
+                  </a:tcPr>
+                </a:tc>
+                <a:tc>
+                  <a:txBody>
+                    <a:bodyPr/>
+                    <a:lstStyle/>
+                    <a:p>
+                      <a:pPr algn="ctr">
+                        <a:lnSpc>
+                          <a:spcPct val="150000"/>
+                        </a:lnSpc>
+                      </a:pPr>
+                      <a:endParaRPr lang="en-US" sz="1200" dirty="0">
+                        <a:solidFill>
+                          <a:schemeClr val="bg1">
+                            <a:lumMod val="50000"/>
+                          </a:schemeClr>
+                        </a:solidFill>
+                        <a:latin typeface="Arial"/>
+                        <a:cs typeface="Arial"/>
+                      </a:endParaRPr>
+                    </a:p>
+                  </a:txBody>
+                  <a:tcPr>
+                    <a:solidFill>
+                      <a:schemeClr val="bg1">
+                        <a:lumMod val="75000"/>
+                      </a:schemeClr>
+                    </a:solidFill>
+                  </a:tcPr>
+                </a:tc>
+                <a:tc>
+                  <a:txBody>
+                    <a:bodyPr/>
+                    <a:lstStyle/>
+                    <a:p>
+                      <a:pPr algn="ctr">
+                        <a:lnSpc>
+                          <a:spcPct val="150000"/>
+                        </a:lnSpc>
+                      </a:pPr>
+                      <a:endParaRPr lang="en-US" sz="1200" dirty="0">
+                        <a:solidFill>
+                          <a:schemeClr val="bg1">
+                            <a:lumMod val="50000"/>
+                          </a:schemeClr>
+                        </a:solidFill>
+                        <a:latin typeface="Arial"/>
+                        <a:cs typeface="Arial"/>
+                      </a:endParaRPr>
+                    </a:p>
+                  </a:txBody>
+                  <a:tcPr>
+                    <a:solidFill>
+                      <a:schemeClr val="bg1">
+                        <a:lumMod val="75000"/>
+                      </a:schemeClr>
+                    </a:solidFill>
+                  </a:tcPr>
+                </a:tc>
+                <a:tc>
+                  <a:txBody>
+                    <a:bodyPr/>
+                    <a:lstStyle/>
+                    <a:p>
+                      <a:pPr algn="ctr">
+                        <a:lnSpc>
+                          <a:spcPct val="150000"/>
+                        </a:lnSpc>
+                      </a:pPr>
+                      <a:endParaRPr lang="en-US" sz="1200" dirty="0">
+                        <a:solidFill>
+                          <a:schemeClr val="bg1">
+                            <a:lumMod val="50000"/>
+                          </a:schemeClr>
+                        </a:solidFill>
+                        <a:latin typeface="Arial"/>
+                        <a:cs typeface="Arial"/>
+                      </a:endParaRPr>
+                    </a:p>
+                  </a:txBody>
+                  <a:tcPr>
+                    <a:solidFill>
+                      <a:schemeClr val="bg1">
+                        <a:lumMod val="75000"/>
+                      </a:schemeClr>
+                    </a:solidFill>
+                  </a:tcPr>
+                </a:tc>
+                <a:tc>
+                  <a:txBody>
+                    <a:bodyPr/>
+                    <a:lstStyle/>
+                    <a:p>
+                      <a:pPr algn="ctr">
+                        <a:lnSpc>
+                          <a:spcPct val="150000"/>
+                        </a:lnSpc>
+                      </a:pPr>
+                      <a:endParaRPr lang="en-US" sz="1200" dirty="0" smtClean="0">
+                        <a:solidFill>
+                          <a:schemeClr val="bg1">
+                            <a:lumMod val="50000"/>
+                          </a:schemeClr>
+                        </a:solidFill>
+                        <a:latin typeface="Arial"/>
+                        <a:cs typeface="Arial"/>
+                      </a:endParaRPr>
+                    </a:p>
+                  </a:txBody>
+                  <a:tcPr>
+                    <a:solidFill>
+                      <a:schemeClr val="bg1">
+                        <a:lumMod val="75000"/>
+                      </a:schemeClr>
+                    </a:solidFill>
+                  </a:tcPr>
+                </a:tc>
+                <a:tc>
+                  <a:txBody>
+                    <a:bodyPr/>
+                    <a:lstStyle/>
+                    <a:p>
+                      <a:pPr algn="ctr">
+                        <a:lnSpc>
+                          <a:spcPct val="150000"/>
+                        </a:lnSpc>
+                      </a:pPr>
+                      <a:endParaRPr lang="en-US" sz="1200" dirty="0">
+                        <a:solidFill>
+                          <a:schemeClr val="bg1">
+                            <a:lumMod val="50000"/>
+                          </a:schemeClr>
+                        </a:solidFill>
+                        <a:latin typeface="Arial"/>
+                        <a:cs typeface="Arial"/>
+                      </a:endParaRPr>
+                    </a:p>
+                  </a:txBody>
+                  <a:tcPr>
+                    <a:solidFill>
+                      <a:schemeClr val="bg1">
+                        <a:lumMod val="75000"/>
+                      </a:schemeClr>
+                    </a:solidFill>
+                  </a:tcPr>
+                </a:tc>
+                <a:tc>
+                  <a:txBody>
+                    <a:bodyPr/>
+                    <a:lstStyle/>
+                    <a:p>
+                      <a:pPr algn="ctr">
+                        <a:lnSpc>
+                          <a:spcPct val="150000"/>
+                        </a:lnSpc>
+                      </a:pPr>
+                      <a:endParaRPr lang="en-US" sz="1200" dirty="0">
+                        <a:solidFill>
+                          <a:schemeClr val="bg1">
+                            <a:lumMod val="50000"/>
+                          </a:schemeClr>
+                        </a:solidFill>
+                        <a:latin typeface="Arial"/>
+                        <a:cs typeface="Arial"/>
+                      </a:endParaRPr>
+                    </a:p>
+                  </a:txBody>
+                  <a:tcPr>
+                    <a:solidFill>
+                      <a:schemeClr val="bg1">
+                        <a:lumMod val="75000"/>
+                      </a:schemeClr>
+                    </a:solidFill>
+                  </a:tcPr>
+                </a:tc>
+                <a:tc>
+                  <a:txBody>
+                    <a:bodyPr/>
+                    <a:lstStyle/>
+                    <a:p>
+                      <a:pPr algn="ctr">
+                        <a:lnSpc>
+                          <a:spcPct val="150000"/>
+                        </a:lnSpc>
+                      </a:pPr>
+                      <a:endParaRPr lang="en-US" sz="1200" dirty="0">
+                        <a:solidFill>
+                          <a:schemeClr val="bg1">
+                            <a:lumMod val="50000"/>
+                          </a:schemeClr>
+                        </a:solidFill>
+                        <a:latin typeface="Arial"/>
+                        <a:cs typeface="Arial"/>
+                      </a:endParaRPr>
+                    </a:p>
+                  </a:txBody>
+                  <a:tcPr>
+                    <a:solidFill>
+                      <a:schemeClr val="bg1">
+                        <a:lumMod val="75000"/>
+                      </a:schemeClr>
+                    </a:solidFill>
+                  </a:tcPr>
+                </a:tc>
+                <a:tc>
+                  <a:txBody>
+                    <a:bodyPr/>
+                    <a:lstStyle/>
+                    <a:p>
+                      <a:pPr algn="ctr">
+                        <a:lnSpc>
+                          <a:spcPct val="150000"/>
+                        </a:lnSpc>
+                      </a:pPr>
+                      <a:endParaRPr lang="en-US" sz="1200" dirty="0">
+                        <a:solidFill>
+                          <a:schemeClr val="bg1">
+                            <a:lumMod val="50000"/>
+                          </a:schemeClr>
+                        </a:solidFill>
+                        <a:latin typeface="Arial"/>
+                        <a:cs typeface="Arial"/>
+                      </a:endParaRPr>
+                    </a:p>
+                  </a:txBody>
+                  <a:tcPr>
+                    <a:solidFill>
+                      <a:schemeClr val="bg1">
+                        <a:lumMod val="75000"/>
+                      </a:schemeClr>
+                    </a:solidFill>
+                  </a:tcPr>
+                </a:tc>
+                <a:tc>
+                  <a:txBody>
+                    <a:bodyPr/>
+                    <a:lstStyle/>
+                    <a:p>
+                      <a:pPr algn="ctr">
+                        <a:lnSpc>
+                          <a:spcPct val="150000"/>
+                        </a:lnSpc>
+                      </a:pPr>
+                      <a:endParaRPr lang="en-US" sz="1200" dirty="0">
+                        <a:solidFill>
+                          <a:schemeClr val="bg1">
+                            <a:lumMod val="50000"/>
+                          </a:schemeClr>
+                        </a:solidFill>
+                        <a:latin typeface="Arial"/>
+                        <a:cs typeface="Arial"/>
+                      </a:endParaRPr>
+                    </a:p>
+                  </a:txBody>
+                  <a:tcPr>
+                    <a:solidFill>
+                      <a:schemeClr val="bg1">
+                        <a:lumMod val="75000"/>
+                      </a:schemeClr>
+                    </a:solidFill>
+                  </a:tcPr>
+                </a:tc>
+                <a:tc>
+                  <a:txBody>
+                    <a:bodyPr/>
+                    <a:lstStyle/>
+                    <a:p>
+                      <a:pPr algn="ctr">
+                        <a:lnSpc>
+                          <a:spcPct val="150000"/>
+                        </a:lnSpc>
+                      </a:pPr>
+                      <a:endParaRPr lang="en-US" sz="1200" dirty="0">
+                        <a:solidFill>
+                          <a:schemeClr val="bg1">
+                            <a:lumMod val="50000"/>
+                          </a:schemeClr>
+                        </a:solidFill>
+                        <a:latin typeface="Arial"/>
+                        <a:cs typeface="Arial"/>
+                      </a:endParaRPr>
+                    </a:p>
+                  </a:txBody>
+                  <a:tcPr>
+                    <a:solidFill>
+                      <a:schemeClr val="bg1">
+                        <a:lumMod val="75000"/>
+                      </a:schemeClr>
+                    </a:solidFill>
+                  </a:tcPr>
+                </a:tc>
+                <a:tc>
+                  <a:txBody>
+                    <a:bodyPr/>
+                    <a:lstStyle/>
+                    <a:p>
+                      <a:pPr algn="ctr">
+                        <a:lnSpc>
+                          <a:spcPct val="150000"/>
+                        </a:lnSpc>
+                      </a:pPr>
+                      <a:endParaRPr lang="en-US" sz="1200" dirty="0">
+                        <a:solidFill>
+                          <a:schemeClr val="bg1">
+                            <a:lumMod val="50000"/>
+                          </a:schemeClr>
+                        </a:solidFill>
+                        <a:latin typeface="Arial"/>
+                        <a:cs typeface="Arial"/>
+                      </a:endParaRPr>
+                    </a:p>
+                  </a:txBody>
+                  <a:tcPr>
+                    <a:solidFill>
+                      <a:schemeClr val="bg1">
+                        <a:lumMod val="75000"/>
+                      </a:schemeClr>
+                    </a:solidFill>
+                  </a:tcPr>
+                </a:tc>
+                <a:tc>
+                  <a:txBody>
+                    <a:bodyPr/>
+                    <a:lstStyle/>
+                    <a:p>
+                      <a:pPr algn="ctr">
+                        <a:lnSpc>
+                          <a:spcPct val="150000"/>
+                        </a:lnSpc>
+                      </a:pPr>
+                      <a:endParaRPr lang="en-US" sz="1200" dirty="0">
+                        <a:solidFill>
+                          <a:schemeClr val="bg1">
+                            <a:lumMod val="50000"/>
+                          </a:schemeClr>
+                        </a:solidFill>
+                        <a:latin typeface="Arial"/>
+                        <a:cs typeface="Arial"/>
+                      </a:endParaRPr>
+                    </a:p>
+                  </a:txBody>
+                  <a:tcPr>
+                    <a:solidFill>
+                      <a:schemeClr val="bg1">
+                        <a:lumMod val="75000"/>
+                      </a:schemeClr>
+                    </a:solidFill>
+                  </a:tcPr>
+                </a:tc>
+                <a:tc>
+                  <a:txBody>
+                    <a:bodyPr/>
+                    <a:lstStyle/>
+                    <a:p>
+                      <a:pPr algn="ctr">
+                        <a:lnSpc>
+                          <a:spcPct val="150000"/>
+                        </a:lnSpc>
+                      </a:pPr>
+                      <a:endParaRPr lang="en-US" sz="1200" dirty="0">
+                        <a:solidFill>
+                          <a:schemeClr val="bg1">
+                            <a:lumMod val="50000"/>
+                          </a:schemeClr>
+                        </a:solidFill>
+                        <a:latin typeface="Arial"/>
+                        <a:cs typeface="Arial"/>
+                      </a:endParaRPr>
+                    </a:p>
+                  </a:txBody>
+                  <a:tcPr>
+                    <a:solidFill>
+                      <a:schemeClr val="bg1">
+                        <a:lumMod val="75000"/>
+                      </a:schemeClr>
+                    </a:solidFill>
+                  </a:tcPr>
+                </a:tc>
+              </a:tr>
+            </a:tbl>
+          </a:graphicData>
+        </a:graphic>
+      </p:graphicFrame>
+      <p:graphicFrame>
+        <p:nvGraphicFramePr>
+          <p:cNvPr id="63" name="Table 62"/>
+          <p:cNvGraphicFramePr>
+            <a:graphicFrameLocks noGrp="1"/>
+          </p:cNvGraphicFramePr>
+          <p:nvPr>
+            <p:extLst>
+              <p:ext uri="{D42A27DB-BD31-4B8C-83A1-F6EECF244321}">
+                <p14:modId xmlns:p14="http://schemas.microsoft.com/office/powerpoint/2010/main" val="1945434227"/>
+              </p:ext>
+            </p:extLst>
+          </p:nvPr>
+        </p:nvGraphicFramePr>
+        <p:xfrm>
+          <a:off x="61232" y="3331934"/>
+          <a:ext cx="4501760" cy="472278"/>
+        </p:xfrm>
+        <a:graphic>
+          <a:graphicData uri="http://schemas.openxmlformats.org/drawingml/2006/table">
+            <a:tbl>
+              <a:tblPr firstRow="1" bandRow="1">
+                <a:tableStyleId>{69CF1AB2-1976-4502-BF36-3FF5EA218861}</a:tableStyleId>
+              </a:tblPr>
+              <a:tblGrid>
+                <a:gridCol w="450176"/>
+                <a:gridCol w="450176"/>
+                <a:gridCol w="450176"/>
+                <a:gridCol w="450176"/>
+                <a:gridCol w="450176"/>
+                <a:gridCol w="450176"/>
+                <a:gridCol w="450176"/>
+                <a:gridCol w="450176"/>
+                <a:gridCol w="450176"/>
+                <a:gridCol w="450176"/>
+              </a:tblGrid>
+              <a:tr h="472278">
+                <a:tc>
+                  <a:txBody>
+                    <a:bodyPr/>
+                    <a:lstStyle/>
+                    <a:p>
+                      <a:pPr algn="ctr">
+                        <a:lnSpc>
+                          <a:spcPct val="150000"/>
+                        </a:lnSpc>
+                      </a:pPr>
+                      <a:r>
+                        <a:rPr lang="en-US" sz="1200" dirty="0" smtClean="0">
+                          <a:solidFill>
+                            <a:schemeClr val="bg1">
+                              <a:lumMod val="50000"/>
+                            </a:schemeClr>
+                          </a:solidFill>
+                          <a:latin typeface="Arial"/>
+                          <a:cs typeface="Arial"/>
+                        </a:rPr>
+                        <a:t>60</a:t>
+                      </a:r>
+                      <a:endParaRPr lang="en-US" sz="1200" dirty="0">
+                        <a:solidFill>
+                          <a:schemeClr val="bg1">
+                            <a:lumMod val="50000"/>
+                          </a:schemeClr>
+                        </a:solidFill>
+                        <a:latin typeface="Arial"/>
+                        <a:cs typeface="Arial"/>
+                      </a:endParaRPr>
+                    </a:p>
+                  </a:txBody>
+                  <a:tcPr>
+                    <a:solidFill>
+                      <a:schemeClr val="bg1">
+                        <a:lumMod val="75000"/>
+                      </a:schemeClr>
+                    </a:solidFill>
+                  </a:tcPr>
+                </a:tc>
+                <a:tc>
+                  <a:txBody>
+                    <a:bodyPr/>
+                    <a:lstStyle/>
+                    <a:p>
+                      <a:pPr algn="ctr">
+                        <a:lnSpc>
+                          <a:spcPct val="150000"/>
+                        </a:lnSpc>
+                      </a:pPr>
+                      <a:r>
+                        <a:rPr lang="en-US" sz="1200" dirty="0" smtClean="0">
+                          <a:solidFill>
+                            <a:schemeClr val="bg1">
+                              <a:lumMod val="50000"/>
+                            </a:schemeClr>
+                          </a:solidFill>
+                          <a:latin typeface="Arial"/>
+                          <a:cs typeface="Arial"/>
+                        </a:rPr>
+                        <a:t>61</a:t>
+                      </a:r>
+                      <a:endParaRPr lang="en-US" sz="1200" dirty="0">
+                        <a:solidFill>
+                          <a:schemeClr val="bg1">
+                            <a:lumMod val="50000"/>
+                          </a:schemeClr>
+                        </a:solidFill>
+                        <a:latin typeface="Arial"/>
+                        <a:cs typeface="Arial"/>
+                      </a:endParaRPr>
+                    </a:p>
+                  </a:txBody>
+                  <a:tcPr>
+                    <a:solidFill>
+                      <a:schemeClr val="bg1">
+                        <a:lumMod val="75000"/>
+                      </a:schemeClr>
+                    </a:solidFill>
+                  </a:tcPr>
+                </a:tc>
+                <a:tc>
+                  <a:txBody>
+                    <a:bodyPr/>
+                    <a:lstStyle/>
+                    <a:p>
+                      <a:pPr algn="ctr">
+                        <a:lnSpc>
+                          <a:spcPct val="150000"/>
+                        </a:lnSpc>
+                      </a:pPr>
+                      <a:r>
+                        <a:rPr lang="en-US" sz="1200" dirty="0" smtClean="0">
+                          <a:solidFill>
+                            <a:schemeClr val="bg1">
+                              <a:lumMod val="50000"/>
+                            </a:schemeClr>
+                          </a:solidFill>
+                          <a:latin typeface="Arial"/>
+                          <a:cs typeface="Arial"/>
+                        </a:rPr>
+                        <a:t>62</a:t>
+                      </a:r>
+                      <a:endParaRPr lang="en-US" sz="1200" dirty="0">
+                        <a:solidFill>
+                          <a:schemeClr val="bg1">
+                            <a:lumMod val="50000"/>
+                          </a:schemeClr>
+                        </a:solidFill>
+                        <a:latin typeface="Arial"/>
+                        <a:cs typeface="Arial"/>
+                      </a:endParaRPr>
+                    </a:p>
+                  </a:txBody>
+                  <a:tcPr>
+                    <a:solidFill>
+                      <a:schemeClr val="bg1">
+                        <a:lumMod val="75000"/>
+                      </a:schemeClr>
+                    </a:solidFill>
+                  </a:tcPr>
+                </a:tc>
+                <a:tc>
+                  <a:txBody>
+                    <a:bodyPr/>
+                    <a:lstStyle/>
+                    <a:p>
+                      <a:pPr algn="ctr">
+                        <a:lnSpc>
+                          <a:spcPct val="150000"/>
+                        </a:lnSpc>
+                      </a:pPr>
+                      <a:r>
+                        <a:rPr lang="en-US" sz="1200" dirty="0" smtClean="0">
+                          <a:solidFill>
+                            <a:schemeClr val="bg1">
+                              <a:lumMod val="50000"/>
+                            </a:schemeClr>
+                          </a:solidFill>
+                          <a:latin typeface="Arial"/>
+                          <a:cs typeface="Arial"/>
+                        </a:rPr>
+                        <a:t>63</a:t>
+                      </a:r>
+                      <a:endParaRPr lang="en-US" sz="1200" dirty="0">
+                        <a:solidFill>
+                          <a:schemeClr val="bg1">
+                            <a:lumMod val="50000"/>
+                          </a:schemeClr>
+                        </a:solidFill>
+                        <a:latin typeface="Arial"/>
+                        <a:cs typeface="Arial"/>
+                      </a:endParaRPr>
+                    </a:p>
+                  </a:txBody>
+                  <a:tcPr>
+                    <a:solidFill>
+                      <a:schemeClr val="bg1">
+                        <a:lumMod val="75000"/>
+                      </a:schemeClr>
+                    </a:solidFill>
+                  </a:tcPr>
+                </a:tc>
+                <a:tc>
+                  <a:txBody>
+                    <a:bodyPr/>
+                    <a:lstStyle/>
+                    <a:p>
+                      <a:pPr algn="ctr">
+                        <a:lnSpc>
+                          <a:spcPct val="150000"/>
+                        </a:lnSpc>
+                      </a:pPr>
+                      <a:r>
+                        <a:rPr lang="en-US" sz="1200" dirty="0" smtClean="0">
+                          <a:solidFill>
+                            <a:schemeClr val="bg1">
+                              <a:lumMod val="50000"/>
+                            </a:schemeClr>
+                          </a:solidFill>
+                          <a:latin typeface="Arial"/>
+                          <a:cs typeface="Arial"/>
+                        </a:rPr>
+                        <a:t>64</a:t>
+                      </a:r>
+                      <a:endParaRPr lang="en-US" sz="1200" dirty="0">
+                        <a:solidFill>
+                          <a:schemeClr val="bg1">
+                            <a:lumMod val="50000"/>
+                          </a:schemeClr>
+                        </a:solidFill>
+                        <a:latin typeface="Arial"/>
+                        <a:cs typeface="Arial"/>
+                      </a:endParaRPr>
+                    </a:p>
+                  </a:txBody>
+                  <a:tcPr>
+                    <a:solidFill>
+                      <a:schemeClr val="bg1">
+                        <a:lumMod val="75000"/>
+                      </a:schemeClr>
+                    </a:solidFill>
+                  </a:tcPr>
+                </a:tc>
+                <a:tc>
+                  <a:txBody>
+                    <a:bodyPr/>
+                    <a:lstStyle/>
+                    <a:p>
+                      <a:pPr algn="ctr">
+                        <a:lnSpc>
+                          <a:spcPct val="150000"/>
+                        </a:lnSpc>
+                      </a:pPr>
+                      <a:r>
+                        <a:rPr lang="en-US" sz="1200" dirty="0" smtClean="0">
+                          <a:solidFill>
+                            <a:schemeClr val="bg1">
+                              <a:lumMod val="50000"/>
+                            </a:schemeClr>
+                          </a:solidFill>
+                          <a:latin typeface="Arial"/>
+                          <a:cs typeface="Arial"/>
+                        </a:rPr>
+                        <a:t>65</a:t>
+                      </a:r>
+                      <a:endParaRPr lang="en-US" sz="1200" dirty="0">
+                        <a:solidFill>
+                          <a:schemeClr val="bg1">
+                            <a:lumMod val="50000"/>
+                          </a:schemeClr>
+                        </a:solidFill>
+                        <a:latin typeface="Arial"/>
+                        <a:cs typeface="Arial"/>
+                      </a:endParaRPr>
+                    </a:p>
+                  </a:txBody>
+                  <a:tcPr>
+                    <a:solidFill>
+                      <a:schemeClr val="bg1">
+                        <a:lumMod val="75000"/>
+                      </a:schemeClr>
+                    </a:solidFill>
+                  </a:tcPr>
+                </a:tc>
+                <a:tc>
+                  <a:txBody>
+                    <a:bodyPr/>
+                    <a:lstStyle/>
+                    <a:p>
+                      <a:pPr algn="ctr">
+                        <a:lnSpc>
+                          <a:spcPct val="150000"/>
+                        </a:lnSpc>
+                      </a:pPr>
+                      <a:r>
+                        <a:rPr lang="en-US" sz="1200" dirty="0" smtClean="0">
+                          <a:solidFill>
+                            <a:schemeClr val="bg1">
+                              <a:lumMod val="50000"/>
+                            </a:schemeClr>
+                          </a:solidFill>
+                          <a:latin typeface="Arial"/>
+                          <a:cs typeface="Arial"/>
+                        </a:rPr>
+                        <a:t>66</a:t>
+                      </a:r>
+                      <a:endParaRPr lang="en-US" sz="1200" dirty="0">
+                        <a:solidFill>
+                          <a:schemeClr val="bg1">
+                            <a:lumMod val="50000"/>
+                          </a:schemeClr>
+                        </a:solidFill>
+                        <a:latin typeface="Arial"/>
+                        <a:cs typeface="Arial"/>
+                      </a:endParaRPr>
+                    </a:p>
+                  </a:txBody>
+                  <a:tcPr>
+                    <a:solidFill>
+                      <a:schemeClr val="bg1">
+                        <a:lumMod val="75000"/>
+                      </a:schemeClr>
+                    </a:solidFill>
+                  </a:tcPr>
+                </a:tc>
+                <a:tc>
+                  <a:txBody>
+                    <a:bodyPr/>
+                    <a:lstStyle/>
+                    <a:p>
+                      <a:pPr algn="ctr">
+                        <a:lnSpc>
+                          <a:spcPct val="150000"/>
+                        </a:lnSpc>
+                      </a:pPr>
+                      <a:r>
+                        <a:rPr lang="en-US" sz="1200" dirty="0" smtClean="0">
+                          <a:solidFill>
+                            <a:schemeClr val="bg1">
+                              <a:lumMod val="50000"/>
+                            </a:schemeClr>
+                          </a:solidFill>
+                          <a:latin typeface="Arial"/>
+                          <a:cs typeface="Arial"/>
+                        </a:rPr>
+                        <a:t>67</a:t>
+                      </a:r>
+                      <a:endParaRPr lang="en-US" sz="1200" dirty="0">
+                        <a:solidFill>
+                          <a:schemeClr val="bg1">
+                            <a:lumMod val="50000"/>
+                          </a:schemeClr>
+                        </a:solidFill>
+                        <a:latin typeface="Arial"/>
+                        <a:cs typeface="Arial"/>
+                      </a:endParaRPr>
+                    </a:p>
+                  </a:txBody>
+                  <a:tcPr>
+                    <a:solidFill>
+                      <a:schemeClr val="bg1">
+                        <a:lumMod val="75000"/>
+                      </a:schemeClr>
+                    </a:solidFill>
+                  </a:tcPr>
+                </a:tc>
+                <a:tc>
+                  <a:txBody>
+                    <a:bodyPr/>
+                    <a:lstStyle/>
+                    <a:p>
+                      <a:pPr algn="ctr">
+                        <a:lnSpc>
+                          <a:spcPct val="150000"/>
+                        </a:lnSpc>
+                      </a:pPr>
+                      <a:r>
+                        <a:rPr lang="en-US" sz="1200" dirty="0" smtClean="0">
+                          <a:solidFill>
+                            <a:schemeClr val="bg1">
+                              <a:lumMod val="50000"/>
+                            </a:schemeClr>
+                          </a:solidFill>
+                          <a:latin typeface="Arial"/>
+                          <a:cs typeface="Arial"/>
+                        </a:rPr>
+                        <a:t>68</a:t>
+                      </a:r>
+                      <a:endParaRPr lang="en-US" sz="1200" dirty="0">
+                        <a:solidFill>
+                          <a:schemeClr val="bg1">
+                            <a:lumMod val="50000"/>
+                          </a:schemeClr>
+                        </a:solidFill>
+                        <a:latin typeface="Arial"/>
+                        <a:cs typeface="Arial"/>
+                      </a:endParaRPr>
+                    </a:p>
+                  </a:txBody>
+                  <a:tcPr>
+                    <a:solidFill>
+                      <a:schemeClr val="bg1">
+                        <a:lumMod val="75000"/>
+                      </a:schemeClr>
+                    </a:solidFill>
+                  </a:tcPr>
+                </a:tc>
+                <a:tc>
+                  <a:txBody>
+                    <a:bodyPr/>
+                    <a:lstStyle/>
+                    <a:p>
+                      <a:pPr algn="ctr">
+                        <a:lnSpc>
+                          <a:spcPct val="150000"/>
+                        </a:lnSpc>
+                      </a:pPr>
+                      <a:r>
+                        <a:rPr lang="en-US" sz="1200" dirty="0" smtClean="0">
+                          <a:solidFill>
+                            <a:schemeClr val="bg1">
+                              <a:lumMod val="50000"/>
+                            </a:schemeClr>
+                          </a:solidFill>
+                          <a:latin typeface="Arial"/>
+                          <a:cs typeface="Arial"/>
+                        </a:rPr>
+                        <a:t>69</a:t>
+                      </a:r>
+                      <a:endParaRPr lang="en-US" sz="1200" dirty="0">
+                        <a:solidFill>
+                          <a:schemeClr val="bg1">
+                            <a:lumMod val="50000"/>
+                          </a:schemeClr>
+                        </a:solidFill>
+                        <a:latin typeface="Arial"/>
+                        <a:cs typeface="Arial"/>
+                      </a:endParaRPr>
                     </a:p>
                   </a:txBody>
                   <a:tcPr>
@@ -4117,523 +7623,13 @@
       </p:graphicFrame>
       <p:sp>
         <p:nvSpPr>
-          <p:cNvPr id="39" name="TextBox 38"/>
+          <p:cNvPr id="64" name="TextBox 63"/>
           <p:cNvSpPr txBox="1"/>
           <p:nvPr/>
         </p:nvSpPr>
         <p:spPr>
           <a:xfrm>
-            <a:off x="3846130" y="1056968"/>
-            <a:ext cx="1043876" cy="369332"/>
-          </a:xfrm>
-          <a:prstGeom prst="rect">
-            <a:avLst/>
-          </a:prstGeom>
-          <a:noFill/>
-        </p:spPr>
-        <p:txBody>
-          <a:bodyPr wrap="none" rtlCol="0">
-            <a:spAutoFit/>
-          </a:bodyPr>
-          <a:lstStyle/>
-          <a:p>
-            <a:r>
-              <a:rPr lang="en-US" dirty="0" smtClean="0"/>
-              <a:t>NORMAL</a:t>
-            </a:r>
-          </a:p>
-        </p:txBody>
-      </p:sp>
-      <p:sp>
-        <p:nvSpPr>
-          <p:cNvPr id="16" name="Rectangle 15"/>
-          <p:cNvSpPr/>
-          <p:nvPr/>
-        </p:nvSpPr>
-        <p:spPr>
-          <a:xfrm>
-            <a:off x="53038" y="3015259"/>
-            <a:ext cx="9025414" cy="693839"/>
-          </a:xfrm>
-          <a:prstGeom prst="rect">
-            <a:avLst/>
-          </a:prstGeom>
-        </p:spPr>
-        <p:style>
-          <a:lnRef idx="1">
-            <a:schemeClr val="dk1"/>
-          </a:lnRef>
-          <a:fillRef idx="3">
-            <a:schemeClr val="dk1"/>
-          </a:fillRef>
-          <a:effectRef idx="2">
-            <a:schemeClr val="dk1"/>
-          </a:effectRef>
-          <a:fontRef idx="minor">
-            <a:schemeClr val="lt1"/>
-          </a:fontRef>
-        </p:style>
-        <p:txBody>
-          <a:bodyPr rtlCol="0" anchor="ctr"/>
-          <a:lstStyle/>
-          <a:p>
-            <a:pPr algn="ctr"/>
-            <a:endParaRPr lang="en-US" dirty="0"/>
-          </a:p>
-        </p:txBody>
-      </p:sp>
-      <p:pic>
-        <p:nvPicPr>
-          <p:cNvPr id="6" name="Picture 5"/>
-          <p:cNvPicPr>
-            <a:picLocks noChangeAspect="1"/>
-          </p:cNvPicPr>
-          <p:nvPr/>
-        </p:nvPicPr>
-        <p:blipFill>
-          <a:blip r:embed="rId2"/>
-          <a:stretch>
-            <a:fillRect/>
-          </a:stretch>
-        </p:blipFill>
-        <p:spPr>
-          <a:xfrm>
-            <a:off x="4117020" y="3149742"/>
-            <a:ext cx="403399" cy="403399"/>
-          </a:xfrm>
-          <a:prstGeom prst="rect">
-            <a:avLst/>
-          </a:prstGeom>
-        </p:spPr>
-      </p:pic>
-      <p:pic>
-        <p:nvPicPr>
-          <p:cNvPr id="9" name="Picture 8"/>
-          <p:cNvPicPr>
-            <a:picLocks noChangeAspect="1"/>
-          </p:cNvPicPr>
-          <p:nvPr/>
-        </p:nvPicPr>
-        <p:blipFill>
-          <a:blip r:embed="rId3"/>
-          <a:stretch>
-            <a:fillRect/>
-          </a:stretch>
-        </p:blipFill>
-        <p:spPr>
-          <a:xfrm>
-            <a:off x="4659356" y="3148380"/>
-            <a:ext cx="403399" cy="403399"/>
-          </a:xfrm>
-          <a:prstGeom prst="rect">
-            <a:avLst/>
-          </a:prstGeom>
-        </p:spPr>
-      </p:pic>
-      <p:pic>
-        <p:nvPicPr>
-          <p:cNvPr id="10" name="Picture 9"/>
-          <p:cNvPicPr>
-            <a:picLocks noChangeAspect="1"/>
-          </p:cNvPicPr>
-          <p:nvPr/>
-        </p:nvPicPr>
-        <p:blipFill>
-          <a:blip r:embed="rId3"/>
-          <a:stretch>
-            <a:fillRect/>
-          </a:stretch>
-        </p:blipFill>
-        <p:spPr>
-          <a:xfrm flipH="1">
-            <a:off x="3112304" y="3148380"/>
-            <a:ext cx="403399" cy="403399"/>
-          </a:xfrm>
-          <a:prstGeom prst="rect">
-            <a:avLst/>
-          </a:prstGeom>
-        </p:spPr>
-      </p:pic>
-      <p:pic>
-        <p:nvPicPr>
-          <p:cNvPr id="45" name="Picture 44"/>
-          <p:cNvPicPr>
-            <a:picLocks noChangeAspect="1"/>
-          </p:cNvPicPr>
-          <p:nvPr/>
-        </p:nvPicPr>
-        <p:blipFill>
-          <a:blip r:embed="rId4"/>
-          <a:stretch>
-            <a:fillRect/>
-          </a:stretch>
-        </p:blipFill>
-        <p:spPr>
-          <a:xfrm>
-            <a:off x="3648296" y="5708042"/>
-            <a:ext cx="395668" cy="399131"/>
-          </a:xfrm>
-          <a:prstGeom prst="rect">
-            <a:avLst/>
-          </a:prstGeom>
-        </p:spPr>
-      </p:pic>
-      <p:pic>
-        <p:nvPicPr>
-          <p:cNvPr id="48" name="Picture 47"/>
-          <p:cNvPicPr>
-            <a:picLocks noChangeAspect="1"/>
-          </p:cNvPicPr>
-          <p:nvPr/>
-        </p:nvPicPr>
-        <p:blipFill>
-          <a:blip r:embed="rId5"/>
-          <a:stretch>
-            <a:fillRect/>
-          </a:stretch>
-        </p:blipFill>
-        <p:spPr>
-          <a:xfrm>
-            <a:off x="5214594" y="5708042"/>
-            <a:ext cx="401576" cy="408159"/>
-          </a:xfrm>
-          <a:prstGeom prst="rect">
-            <a:avLst/>
-          </a:prstGeom>
-        </p:spPr>
-      </p:pic>
-      <p:sp>
-        <p:nvSpPr>
-          <p:cNvPr id="56" name="Rectangle 55"/>
-          <p:cNvSpPr/>
-          <p:nvPr/>
-        </p:nvSpPr>
-        <p:spPr>
-          <a:xfrm>
-            <a:off x="65407" y="2327297"/>
-            <a:ext cx="9025414" cy="215684"/>
-          </a:xfrm>
-          <a:prstGeom prst="rect">
-            <a:avLst/>
-          </a:prstGeom>
-          <a:solidFill>
-            <a:schemeClr val="tx1">
-              <a:lumMod val="50000"/>
-              <a:lumOff val="50000"/>
-            </a:schemeClr>
-          </a:solidFill>
-        </p:spPr>
-        <p:style>
-          <a:lnRef idx="1">
-            <a:schemeClr val="dk1"/>
-          </a:lnRef>
-          <a:fillRef idx="3">
-            <a:schemeClr val="dk1"/>
-          </a:fillRef>
-          <a:effectRef idx="2">
-            <a:schemeClr val="dk1"/>
-          </a:effectRef>
-          <a:fontRef idx="minor">
-            <a:schemeClr val="lt1"/>
-          </a:fontRef>
-        </p:style>
-        <p:txBody>
-          <a:bodyPr rot="0" spcFirstLastPara="0" vertOverflow="overflow" horzOverflow="overflow" vert="horz" wrap="square" lIns="91440" tIns="45720" rIns="91440" bIns="45720" numCol="1" spcCol="0" rtlCol="0" fromWordArt="0" anchor="ctr" anchorCtr="0" forceAA="0" compatLnSpc="1">
-            <a:prstTxWarp prst="textNoShape">
-              <a:avLst/>
-            </a:prstTxWarp>
-            <a:noAutofit/>
-          </a:bodyPr>
-          <a:lstStyle/>
-          <a:p>
-            <a:pPr algn="ctr"/>
-            <a:endParaRPr lang="en-US"/>
-          </a:p>
-        </p:txBody>
-      </p:sp>
-      <p:sp>
-        <p:nvSpPr>
-          <p:cNvPr id="5" name="Isosceles Triangle 4"/>
-          <p:cNvSpPr/>
-          <p:nvPr/>
-        </p:nvSpPr>
-        <p:spPr>
-          <a:xfrm flipV="1">
-            <a:off x="188635" y="2350906"/>
-            <a:ext cx="163953" cy="158326"/>
-          </a:xfrm>
-          <a:prstGeom prst="triangle">
-            <a:avLst/>
-          </a:prstGeom>
-        </p:spPr>
-        <p:style>
-          <a:lnRef idx="0">
-            <a:schemeClr val="accent3"/>
-          </a:lnRef>
-          <a:fillRef idx="3">
-            <a:schemeClr val="accent3"/>
-          </a:fillRef>
-          <a:effectRef idx="3">
-            <a:schemeClr val="accent3"/>
-          </a:effectRef>
-          <a:fontRef idx="minor">
-            <a:schemeClr val="lt1"/>
-          </a:fontRef>
-        </p:style>
-        <p:txBody>
-          <a:bodyPr rtlCol="0" anchor="ctr"/>
-          <a:lstStyle/>
-          <a:p>
-            <a:pPr algn="ctr"/>
-            <a:endParaRPr lang="en-US"/>
-          </a:p>
-        </p:txBody>
-      </p:sp>
-      <p:sp>
-        <p:nvSpPr>
-          <p:cNvPr id="30" name="Isosceles Triangle 29"/>
-          <p:cNvSpPr/>
-          <p:nvPr/>
-        </p:nvSpPr>
-        <p:spPr>
-          <a:xfrm flipH="1" flipV="1">
-            <a:off x="2495269" y="2350906"/>
-            <a:ext cx="163953" cy="192073"/>
-          </a:xfrm>
-          <a:prstGeom prst="triangle">
-            <a:avLst/>
-          </a:prstGeom>
-        </p:spPr>
-        <p:style>
-          <a:lnRef idx="2">
-            <a:schemeClr val="accent6">
-              <a:shade val="50000"/>
-            </a:schemeClr>
-          </a:lnRef>
-          <a:fillRef idx="1">
-            <a:schemeClr val="accent6"/>
-          </a:fillRef>
-          <a:effectRef idx="0">
-            <a:schemeClr val="accent6"/>
-          </a:effectRef>
-          <a:fontRef idx="minor">
-            <a:schemeClr val="lt1"/>
-          </a:fontRef>
-        </p:style>
-        <p:txBody>
-          <a:bodyPr rtlCol="0" anchor="ctr"/>
-          <a:lstStyle/>
-          <a:p>
-            <a:pPr algn="ctr"/>
-            <a:endParaRPr lang="en-US"/>
-          </a:p>
-        </p:txBody>
-      </p:sp>
-      <p:grpSp>
-        <p:nvGrpSpPr>
-          <p:cNvPr id="12" name="Group 11"/>
-          <p:cNvGrpSpPr/>
-          <p:nvPr/>
-        </p:nvGrpSpPr>
-        <p:grpSpPr>
-          <a:xfrm>
-            <a:off x="44844" y="3725486"/>
-            <a:ext cx="9025414" cy="850391"/>
-            <a:chOff x="0" y="3853591"/>
-            <a:chExt cx="9144000" cy="850391"/>
-          </a:xfrm>
-        </p:grpSpPr>
-        <p:sp>
-          <p:nvSpPr>
-            <p:cNvPr id="13" name="Rectangle 12"/>
-            <p:cNvSpPr/>
-            <p:nvPr/>
-          </p:nvSpPr>
-          <p:spPr>
-            <a:xfrm>
-              <a:off x="19604" y="3853591"/>
-              <a:ext cx="9124396" cy="45719"/>
-            </a:xfrm>
-            <a:prstGeom prst="rect">
-              <a:avLst/>
-            </a:prstGeom>
-            <a:solidFill>
-              <a:srgbClr val="FF0000"/>
-            </a:solidFill>
-          </p:spPr>
-          <p:style>
-            <a:lnRef idx="2">
-              <a:schemeClr val="accent2">
-                <a:shade val="50000"/>
-              </a:schemeClr>
-            </a:lnRef>
-            <a:fillRef idx="1">
-              <a:schemeClr val="accent2"/>
-            </a:fillRef>
-            <a:effectRef idx="0">
-              <a:schemeClr val="accent2"/>
-            </a:effectRef>
-            <a:fontRef idx="minor">
-              <a:schemeClr val="lt1"/>
-            </a:fontRef>
-          </p:style>
-          <p:txBody>
-            <a:bodyPr rtlCol="0" anchor="ctr"/>
-            <a:lstStyle/>
-            <a:p>
-              <a:pPr algn="ctr"/>
-              <a:endParaRPr lang="en-US"/>
-            </a:p>
-          </p:txBody>
-        </p:sp>
-        <p:pic>
-          <p:nvPicPr>
-            <p:cNvPr id="8" name="Picture 7"/>
-            <p:cNvPicPr>
-              <a:picLocks noChangeAspect="1"/>
-            </p:cNvPicPr>
-            <p:nvPr/>
-          </p:nvPicPr>
-          <p:blipFill>
-            <a:blip r:embed="rId6"/>
-            <a:stretch>
-              <a:fillRect/>
-            </a:stretch>
-          </p:blipFill>
-          <p:spPr>
-            <a:xfrm>
-              <a:off x="0" y="3899310"/>
-              <a:ext cx="9144000" cy="804672"/>
-            </a:xfrm>
-            <a:prstGeom prst="rect">
-              <a:avLst/>
-            </a:prstGeom>
-          </p:spPr>
-        </p:pic>
-      </p:grpSp>
-      <p:cxnSp>
-        <p:nvCxnSpPr>
-          <p:cNvPr id="29" name="Straight Connector 28"/>
-          <p:cNvCxnSpPr/>
-          <p:nvPr/>
-        </p:nvCxnSpPr>
-        <p:spPr>
-          <a:xfrm>
-            <a:off x="2848073" y="3031647"/>
-            <a:ext cx="0" cy="693839"/>
-          </a:xfrm>
-          <a:prstGeom prst="line">
-            <a:avLst/>
-          </a:prstGeom>
-          <a:ln w="9525" cmpd="sng">
-            <a:solidFill>
-              <a:schemeClr val="bg1">
-                <a:lumMod val="50000"/>
-              </a:schemeClr>
-            </a:solidFill>
-            <a:prstDash val="lgDash"/>
-          </a:ln>
-        </p:spPr>
-        <p:style>
-          <a:lnRef idx="2">
-            <a:schemeClr val="accent1"/>
-          </a:lnRef>
-          <a:fillRef idx="0">
-            <a:schemeClr val="accent1"/>
-          </a:fillRef>
-          <a:effectRef idx="1">
-            <a:schemeClr val="accent1"/>
-          </a:effectRef>
-          <a:fontRef idx="minor">
-            <a:schemeClr val="tx1"/>
-          </a:fontRef>
-        </p:style>
-      </p:cxnSp>
-      <p:cxnSp>
-        <p:nvCxnSpPr>
-          <p:cNvPr id="31" name="Straight Connector 30"/>
-          <p:cNvCxnSpPr/>
-          <p:nvPr/>
-        </p:nvCxnSpPr>
-        <p:spPr>
-          <a:xfrm>
-            <a:off x="5335634" y="3031647"/>
-            <a:ext cx="0" cy="693839"/>
-          </a:xfrm>
-          <a:prstGeom prst="line">
-            <a:avLst/>
-          </a:prstGeom>
-          <a:ln w="9525" cmpd="sng">
-            <a:solidFill>
-              <a:schemeClr val="bg1">
-                <a:lumMod val="50000"/>
-              </a:schemeClr>
-            </a:solidFill>
-            <a:prstDash val="lgDash"/>
-          </a:ln>
-        </p:spPr>
-        <p:style>
-          <a:lnRef idx="2">
-            <a:schemeClr val="accent1"/>
-          </a:lnRef>
-          <a:fillRef idx="0">
-            <a:schemeClr val="accent1"/>
-          </a:fillRef>
-          <a:effectRef idx="1">
-            <a:schemeClr val="accent1"/>
-          </a:effectRef>
-          <a:fontRef idx="minor">
-            <a:schemeClr val="tx1"/>
-          </a:fontRef>
-        </p:style>
-      </p:cxnSp>
-      <p:cxnSp>
-        <p:nvCxnSpPr>
-          <p:cNvPr id="32" name="Straight Connector 31"/>
-          <p:cNvCxnSpPr/>
-          <p:nvPr/>
-        </p:nvCxnSpPr>
-        <p:spPr>
-          <a:xfrm>
-            <a:off x="6905518" y="2992193"/>
-            <a:ext cx="0" cy="693839"/>
-          </a:xfrm>
-          <a:prstGeom prst="line">
-            <a:avLst/>
-          </a:prstGeom>
-          <a:ln w="9525" cmpd="sng">
-            <a:solidFill>
-              <a:schemeClr val="bg1">
-                <a:lumMod val="50000"/>
-              </a:schemeClr>
-            </a:solidFill>
-            <a:prstDash val="lgDash"/>
-          </a:ln>
-        </p:spPr>
-        <p:style>
-          <a:lnRef idx="2">
-            <a:schemeClr val="accent1"/>
-          </a:lnRef>
-          <a:fillRef idx="0">
-            <a:schemeClr val="accent1"/>
-          </a:fillRef>
-          <a:effectRef idx="1">
-            <a:schemeClr val="accent1"/>
-          </a:effectRef>
-          <a:fontRef idx="minor">
-            <a:schemeClr val="tx1"/>
-          </a:fontRef>
-        </p:style>
-      </p:cxnSp>
-      <p:sp>
-        <p:nvSpPr>
-          <p:cNvPr id="15" name="TextBox 14"/>
-          <p:cNvSpPr txBox="1"/>
-          <p:nvPr/>
-        </p:nvSpPr>
-        <p:spPr>
-          <a:xfrm>
-            <a:off x="8334487" y="1652785"/>
+            <a:off x="5264805" y="3762980"/>
             <a:ext cx="630903" cy="215444"/>
           </a:xfrm>
           <a:prstGeom prst="rect">
@@ -4658,7 +7654,7 @@
                 <a:latin typeface="Arial"/>
                 <a:cs typeface="Arial"/>
               </a:rPr>
-              <a:t>REPEAT</a:t>
+              <a:t>HANDS</a:t>
             </a:r>
             <a:endParaRPr lang="en-US" sz="800" dirty="0">
               <a:solidFill>
@@ -4675,14 +7671,63 @@
       </p:sp>
       <p:sp>
         <p:nvSpPr>
-          <p:cNvPr id="33" name="TextBox 32"/>
+          <p:cNvPr id="66" name="Oval 65"/>
+          <p:cNvSpPr/>
+          <p:nvPr/>
+        </p:nvSpPr>
+        <p:spPr>
+          <a:xfrm>
+            <a:off x="947979" y="4006606"/>
+            <a:ext cx="427677" cy="426064"/>
+          </a:xfrm>
+          <a:prstGeom prst="ellipse">
+            <a:avLst/>
+          </a:prstGeom>
+          <a:scene3d>
+            <a:camera prst="orthographicFront">
+              <a:rot lat="0" lon="0" rev="0"/>
+            </a:camera>
+            <a:lightRig rig="threePt" dir="t">
+              <a:rot lat="0" lon="0" rev="1200000"/>
+            </a:lightRig>
+          </a:scene3d>
+          <a:sp3d>
+            <a:bevelT w="63500" h="25400" prst="convex"/>
+          </a:sp3d>
+        </p:spPr>
+        <p:style>
+          <a:lnRef idx="0">
+            <a:schemeClr val="accent1"/>
+          </a:lnRef>
+          <a:fillRef idx="3">
+            <a:schemeClr val="accent1"/>
+          </a:fillRef>
+          <a:effectRef idx="3">
+            <a:schemeClr val="accent1"/>
+          </a:effectRef>
+          <a:fontRef idx="minor">
+            <a:schemeClr val="lt1"/>
+          </a:fontRef>
+        </p:style>
+        <p:txBody>
+          <a:bodyPr rtlCol="0" anchor="ctr"/>
+          <a:lstStyle/>
+          <a:p>
+            <a:pPr algn="ctr"/>
+            <a:endParaRPr lang="en-US"/>
+          </a:p>
+        </p:txBody>
+      </p:sp>
+      <p:sp>
+        <p:nvSpPr>
+          <p:cNvPr id="67" name="TextBox 66"/>
           <p:cNvSpPr txBox="1"/>
           <p:nvPr/>
         </p:nvSpPr>
         <p:spPr>
           <a:xfrm>
-            <a:off x="2794756" y="2965823"/>
-            <a:ext cx="630903" cy="215444"/>
+            <a:off x="1655096" y="3812808"/>
+            <a:ext cx="942807" cy="215444"/>
           </a:xfrm>
           <a:prstGeom prst="rect">
             <a:avLst/>
@@ -4706,7 +7751,20 @@
                 <a:latin typeface="Arial"/>
                 <a:cs typeface="Arial"/>
               </a:rPr>
-              <a:t>PLAY</a:t>
+              <a:t>SELECT</a:t>
+            </a:r>
+            <a:r>
+              <a:rPr lang="en-US" sz="800" dirty="0" smtClean="0">
+                <a:solidFill>
+                  <a:schemeClr val="tx1">
+                    <a:lumMod val="65000"/>
+                    <a:lumOff val="35000"/>
+                  </a:schemeClr>
+                </a:solidFill>
+                <a:latin typeface="Arial"/>
+                <a:cs typeface="Arial"/>
+              </a:rPr>
+              <a:t> END</a:t>
             </a:r>
             <a:endParaRPr lang="en-US" sz="800" dirty="0">
               <a:solidFill>
@@ -4723,110 +7781,42 @@
       </p:sp>
       <p:sp>
         <p:nvSpPr>
-          <p:cNvPr id="35" name="TextBox 34"/>
-          <p:cNvSpPr txBox="1"/>
-          <p:nvPr/>
-        </p:nvSpPr>
-        <p:spPr>
-          <a:xfrm>
-            <a:off x="6839966" y="2965823"/>
-            <a:ext cx="630903" cy="215444"/>
-          </a:xfrm>
-          <a:prstGeom prst="rect">
-            <a:avLst/>
-          </a:prstGeom>
-          <a:noFill/>
-        </p:spPr>
-        <p:txBody>
-          <a:bodyPr wrap="square" rtlCol="0">
-            <a:spAutoFit/>
-          </a:bodyPr>
-          <a:lstStyle/>
-          <a:p>
-            <a:r>
-              <a:rPr lang="en-US" sz="800" dirty="0" smtClean="0">
-                <a:solidFill>
-                  <a:schemeClr val="tx1">
-                    <a:lumMod val="65000"/>
-                    <a:lumOff val="35000"/>
-                  </a:schemeClr>
-                </a:solidFill>
-                <a:latin typeface="Arial"/>
-                <a:cs typeface="Arial"/>
-              </a:rPr>
-              <a:t>TEMPO</a:t>
-            </a:r>
-            <a:endParaRPr lang="en-US" sz="800" dirty="0">
-              <a:solidFill>
-                <a:schemeClr val="tx1">
-                  <a:lumMod val="65000"/>
-                  <a:lumOff val="35000"/>
-                </a:schemeClr>
-              </a:solidFill>
-              <a:latin typeface="Arial"/>
-              <a:cs typeface="Arial"/>
-            </a:endParaRPr>
-          </a:p>
-        </p:txBody>
-      </p:sp>
-      <p:cxnSp>
-        <p:nvCxnSpPr>
-          <p:cNvPr id="22" name="Straight Connector 21"/>
-          <p:cNvCxnSpPr/>
-          <p:nvPr/>
-        </p:nvCxnSpPr>
-        <p:spPr>
-          <a:xfrm>
-            <a:off x="7455267" y="3375741"/>
-            <a:ext cx="1397053" cy="0"/>
-          </a:xfrm>
-          <a:prstGeom prst="line">
-            <a:avLst/>
-          </a:prstGeom>
-          <a:ln w="57150" cmpd="sng"/>
-        </p:spPr>
-        <p:style>
-          <a:lnRef idx="3">
-            <a:schemeClr val="accent1"/>
-          </a:lnRef>
-          <a:fillRef idx="0">
-            <a:schemeClr val="accent1"/>
-          </a:fillRef>
-          <a:effectRef idx="2">
-            <a:schemeClr val="accent1"/>
-          </a:effectRef>
-          <a:fontRef idx="minor">
-            <a:schemeClr val="tx1"/>
-          </a:fontRef>
-        </p:style>
-      </p:cxnSp>
-      <p:sp>
-        <p:nvSpPr>
-          <p:cNvPr id="38" name="Oval 37"/>
+          <p:cNvPr id="68" name="Oval 67"/>
           <p:cNvSpPr/>
           <p:nvPr/>
         </p:nvSpPr>
         <p:spPr>
           <a:xfrm>
-            <a:off x="7874847" y="3309644"/>
-            <a:ext cx="137160" cy="137160"/>
+            <a:off x="1837796" y="3997406"/>
+            <a:ext cx="427677" cy="426064"/>
           </a:xfrm>
           <a:prstGeom prst="ellipse">
             <a:avLst/>
           </a:prstGeom>
+          <a:scene3d>
+            <a:camera prst="orthographicFront">
+              <a:rot lat="0" lon="0" rev="0"/>
+            </a:camera>
+            <a:lightRig rig="threePt" dir="t">
+              <a:rot lat="0" lon="0" rev="1200000"/>
+            </a:lightRig>
+          </a:scene3d>
+          <a:sp3d>
+            <a:bevelT w="63500" h="25400" prst="convex"/>
+          </a:sp3d>
         </p:spPr>
         <p:style>
-          <a:lnRef idx="1">
-            <a:schemeClr val="dk1"/>
+          <a:lnRef idx="0">
+            <a:schemeClr val="accent1"/>
           </a:lnRef>
-          <a:fillRef idx="2">
-            <a:schemeClr val="dk1"/>
+          <a:fillRef idx="3">
+            <a:schemeClr val="accent1"/>
           </a:fillRef>
-          <a:effectRef idx="1">
-            <a:schemeClr val="dk1"/>
+          <a:effectRef idx="3">
+            <a:schemeClr val="accent1"/>
           </a:effectRef>
           <a:fontRef idx="minor">
-            <a:schemeClr val="dk1"/>
+            <a:schemeClr val="lt1"/>
           </a:fontRef>
         </p:style>
         <p:txBody>
@@ -4838,314 +7828,6 @@
           </a:p>
         </p:txBody>
       </p:sp>
-      <p:sp>
-        <p:nvSpPr>
-          <p:cNvPr id="46" name="TextBox 45"/>
-          <p:cNvSpPr txBox="1"/>
-          <p:nvPr/>
-        </p:nvSpPr>
-        <p:spPr>
-          <a:xfrm>
-            <a:off x="-16936" y="2087082"/>
-            <a:ext cx="1123401" cy="215444"/>
-          </a:xfrm>
-          <a:prstGeom prst="rect">
-            <a:avLst/>
-          </a:prstGeom>
-          <a:noFill/>
-        </p:spPr>
-        <p:txBody>
-          <a:bodyPr wrap="square" rtlCol="0">
-            <a:spAutoFit/>
-          </a:bodyPr>
-          <a:lstStyle/>
-          <a:p>
-            <a:r>
-              <a:rPr lang="en-US" sz="800" dirty="0" smtClean="0">
-                <a:solidFill>
-                  <a:schemeClr val="tx1">
-                    <a:lumMod val="65000"/>
-                    <a:lumOff val="35000"/>
-                  </a:schemeClr>
-                </a:solidFill>
-                <a:latin typeface="Arial"/>
-                <a:cs typeface="Arial"/>
-              </a:rPr>
-              <a:t>DRAG TO START </a:t>
-            </a:r>
-            <a:endParaRPr lang="en-US" sz="800" dirty="0">
-              <a:solidFill>
-                <a:schemeClr val="tx1">
-                  <a:lumMod val="65000"/>
-                  <a:lumOff val="35000"/>
-                </a:schemeClr>
-              </a:solidFill>
-              <a:latin typeface="Arial"/>
-              <a:cs typeface="Arial"/>
-            </a:endParaRPr>
-          </a:p>
-        </p:txBody>
-      </p:sp>
-      <p:grpSp>
-        <p:nvGrpSpPr>
-          <p:cNvPr id="2" name="Group 1"/>
-          <p:cNvGrpSpPr/>
-          <p:nvPr/>
-        </p:nvGrpSpPr>
-        <p:grpSpPr>
-          <a:xfrm>
-            <a:off x="7027590" y="3184051"/>
-            <a:ext cx="255648" cy="417248"/>
-            <a:chOff x="6595790" y="1009052"/>
-            <a:chExt cx="255648" cy="417248"/>
-          </a:xfrm>
-        </p:grpSpPr>
-        <p:sp>
-          <p:nvSpPr>
-            <p:cNvPr id="49" name="Trapezoid 48"/>
-            <p:cNvSpPr/>
-            <p:nvPr/>
-          </p:nvSpPr>
-          <p:spPr>
-            <a:xfrm>
-              <a:off x="6595790" y="1009052"/>
-              <a:ext cx="255648" cy="417248"/>
-            </a:xfrm>
-            <a:prstGeom prst="trapezoid">
-              <a:avLst>
-                <a:gd name="adj" fmla="val 34677"/>
-              </a:avLst>
-            </a:prstGeom>
-            <a:ln/>
-          </p:spPr>
-          <p:style>
-            <a:lnRef idx="1">
-              <a:schemeClr val="accent6"/>
-            </a:lnRef>
-            <a:fillRef idx="2">
-              <a:schemeClr val="accent6"/>
-            </a:fillRef>
-            <a:effectRef idx="1">
-              <a:schemeClr val="accent6"/>
-            </a:effectRef>
-            <a:fontRef idx="minor">
-              <a:schemeClr val="dk1"/>
-            </a:fontRef>
-          </p:style>
-          <p:txBody>
-            <a:bodyPr rtlCol="0" anchor="ctr"/>
-            <a:lstStyle/>
-            <a:p>
-              <a:pPr algn="ctr"/>
-              <a:endParaRPr lang="en-US"/>
-            </a:p>
-          </p:txBody>
-        </p:sp>
-        <p:cxnSp>
-          <p:nvCxnSpPr>
-            <p:cNvPr id="51" name="Straight Connector 50"/>
-            <p:cNvCxnSpPr>
-              <a:stCxn id="49" idx="0"/>
-            </p:cNvCxnSpPr>
-            <p:nvPr/>
-          </p:nvCxnSpPr>
-          <p:spPr>
-            <a:xfrm flipH="1">
-              <a:off x="6716206" y="1009052"/>
-              <a:ext cx="7408" cy="311301"/>
-            </a:xfrm>
-            <a:prstGeom prst="line">
-              <a:avLst/>
-            </a:prstGeom>
-            <a:ln/>
-          </p:spPr>
-          <p:style>
-            <a:lnRef idx="1">
-              <a:schemeClr val="accent6"/>
-            </a:lnRef>
-            <a:fillRef idx="2">
-              <a:schemeClr val="accent6"/>
-            </a:fillRef>
-            <a:effectRef idx="1">
-              <a:schemeClr val="accent6"/>
-            </a:effectRef>
-            <a:fontRef idx="minor">
-              <a:schemeClr val="dk1"/>
-            </a:fontRef>
-          </p:style>
-        </p:cxnSp>
-        <p:sp>
-          <p:nvSpPr>
-            <p:cNvPr id="52" name="Isosceles Triangle 51"/>
-            <p:cNvSpPr/>
-            <p:nvPr/>
-          </p:nvSpPr>
-          <p:spPr>
-            <a:xfrm flipV="1">
-              <a:off x="6681839" y="1212403"/>
-              <a:ext cx="72457" cy="87692"/>
-            </a:xfrm>
-            <a:prstGeom prst="triangle">
-              <a:avLst/>
-            </a:prstGeom>
-            <a:ln/>
-          </p:spPr>
-          <p:style>
-            <a:lnRef idx="1">
-              <a:schemeClr val="accent6"/>
-            </a:lnRef>
-            <a:fillRef idx="2">
-              <a:schemeClr val="accent6"/>
-            </a:fillRef>
-            <a:effectRef idx="1">
-              <a:schemeClr val="accent6"/>
-            </a:effectRef>
-            <a:fontRef idx="minor">
-              <a:schemeClr val="dk1"/>
-            </a:fontRef>
-          </p:style>
-          <p:txBody>
-            <a:bodyPr rtlCol="0" anchor="ctr"/>
-            <a:lstStyle/>
-            <a:p>
-              <a:pPr algn="ctr"/>
-              <a:endParaRPr lang="en-US"/>
-            </a:p>
-          </p:txBody>
-        </p:sp>
-      </p:grpSp>
-      <p:sp>
-        <p:nvSpPr>
-          <p:cNvPr id="40" name="TextBox 39"/>
-          <p:cNvSpPr txBox="1"/>
-          <p:nvPr/>
-        </p:nvSpPr>
-        <p:spPr>
-          <a:xfrm>
-            <a:off x="2104770" y="2055557"/>
-            <a:ext cx="943234" cy="215444"/>
-          </a:xfrm>
-          <a:prstGeom prst="rect">
-            <a:avLst/>
-          </a:prstGeom>
-          <a:noFill/>
-        </p:spPr>
-        <p:txBody>
-          <a:bodyPr wrap="square" rtlCol="0">
-            <a:spAutoFit/>
-          </a:bodyPr>
-          <a:lstStyle/>
-          <a:p>
-            <a:r>
-              <a:rPr lang="en-US" sz="800" dirty="0" smtClean="0">
-                <a:solidFill>
-                  <a:schemeClr val="tx1">
-                    <a:lumMod val="65000"/>
-                    <a:lumOff val="35000"/>
-                  </a:schemeClr>
-                </a:solidFill>
-                <a:latin typeface="Arial"/>
-                <a:cs typeface="Arial"/>
-              </a:rPr>
-              <a:t>DRAG TO END</a:t>
-            </a:r>
-            <a:endParaRPr lang="en-US" sz="800" dirty="0">
-              <a:solidFill>
-                <a:schemeClr val="tx1">
-                  <a:lumMod val="65000"/>
-                  <a:lumOff val="35000"/>
-                </a:schemeClr>
-              </a:solidFill>
-              <a:latin typeface="Arial"/>
-              <a:cs typeface="Arial"/>
-            </a:endParaRPr>
-          </a:p>
-        </p:txBody>
-      </p:sp>
-      <p:pic>
-        <p:nvPicPr>
-          <p:cNvPr id="42" name="Picture 41"/>
-          <p:cNvPicPr>
-            <a:picLocks noChangeAspect="1"/>
-          </p:cNvPicPr>
-          <p:nvPr/>
-        </p:nvPicPr>
-        <p:blipFill>
-          <a:blip r:embed="rId7"/>
-          <a:stretch>
-            <a:fillRect/>
-          </a:stretch>
-        </p:blipFill>
-        <p:spPr>
-          <a:xfrm>
-            <a:off x="3617307" y="3142133"/>
-            <a:ext cx="403399" cy="403399"/>
-          </a:xfrm>
-          <a:prstGeom prst="rect">
-            <a:avLst/>
-          </a:prstGeom>
-        </p:spPr>
-      </p:pic>
-      <p:pic>
-        <p:nvPicPr>
-          <p:cNvPr id="55" name="Picture 54" descr="repeat.png"/>
-          <p:cNvPicPr>
-            <a:picLocks noChangeAspect="1"/>
-          </p:cNvPicPr>
-          <p:nvPr/>
-        </p:nvPicPr>
-        <p:blipFill>
-          <a:blip r:embed="rId8">
-            <a:extLst>
-              <a:ext uri="{28A0092B-C50C-407E-A947-70E740481C1C}">
-                <a14:useLocalDpi xmlns:a14="http://schemas.microsoft.com/office/drawing/2010/main" val="0"/>
-              </a:ext>
-            </a:extLst>
-          </a:blip>
-          <a:stretch>
-            <a:fillRect/>
-          </a:stretch>
-        </p:blipFill>
-        <p:spPr>
-          <a:xfrm>
-            <a:off x="8763001" y="2269490"/>
-            <a:ext cx="315451" cy="315451"/>
-          </a:xfrm>
-          <a:prstGeom prst="rect">
-            <a:avLst/>
-          </a:prstGeom>
-        </p:spPr>
-      </p:pic>
-      <p:pic>
-        <p:nvPicPr>
-          <p:cNvPr id="57" name="Picture 56" descr="repeatIconoff.png"/>
-          <p:cNvPicPr>
-            <a:picLocks noChangeAspect="1"/>
-          </p:cNvPicPr>
-          <p:nvPr/>
-        </p:nvPicPr>
-        <p:blipFill>
-          <a:blip r:embed="rId9">
-            <a:extLst>
-              <a:ext uri="{28A0092B-C50C-407E-A947-70E740481C1C}">
-                <a14:useLocalDpi xmlns:a14="http://schemas.microsoft.com/office/drawing/2010/main" val="0"/>
-              </a:ext>
-            </a:extLst>
-          </a:blip>
-          <a:stretch>
-            <a:fillRect/>
-          </a:stretch>
-        </p:blipFill>
-        <p:spPr>
-          <a:xfrm>
-            <a:off x="8316974" y="1971122"/>
-            <a:ext cx="332965" cy="332965"/>
-          </a:xfrm>
-          <a:prstGeom prst="rect">
-            <a:avLst/>
-          </a:prstGeom>
-        </p:spPr>
-      </p:pic>
     </p:spTree>
     <p:extLst>
       <p:ext uri="{BB962C8B-B14F-4D97-AF65-F5344CB8AC3E}">
@@ -6205,6 +8887,84 @@
           </a:prstGeom>
         </p:spPr>
       </p:pic>
+      <p:sp>
+        <p:nvSpPr>
+          <p:cNvPr id="23" name="Isosceles Triangle 22"/>
+          <p:cNvSpPr/>
+          <p:nvPr/>
+        </p:nvSpPr>
+        <p:spPr>
+          <a:xfrm flipV="1">
+            <a:off x="188635" y="1687192"/>
+            <a:ext cx="163953" cy="158326"/>
+          </a:xfrm>
+          <a:prstGeom prst="triangle">
+            <a:avLst/>
+          </a:prstGeom>
+        </p:spPr>
+        <p:style>
+          <a:lnRef idx="0">
+            <a:schemeClr val="accent3"/>
+          </a:lnRef>
+          <a:fillRef idx="3">
+            <a:schemeClr val="accent3"/>
+          </a:fillRef>
+          <a:effectRef idx="3">
+            <a:schemeClr val="accent3"/>
+          </a:effectRef>
+          <a:fontRef idx="minor">
+            <a:schemeClr val="lt1"/>
+          </a:fontRef>
+        </p:style>
+        <p:txBody>
+          <a:bodyPr rtlCol="0" anchor="ctr"/>
+          <a:lstStyle/>
+          <a:p>
+            <a:pPr algn="ctr"/>
+            <a:endParaRPr lang="en-US"/>
+          </a:p>
+        </p:txBody>
+      </p:sp>
+      <p:sp>
+        <p:nvSpPr>
+          <p:cNvPr id="24" name="Isosceles Triangle 23"/>
+          <p:cNvSpPr/>
+          <p:nvPr/>
+        </p:nvSpPr>
+        <p:spPr>
+          <a:xfrm flipH="1" flipV="1">
+            <a:off x="2495269" y="1687192"/>
+            <a:ext cx="163953" cy="192073"/>
+          </a:xfrm>
+          <a:prstGeom prst="triangle">
+            <a:avLst/>
+          </a:prstGeom>
+        </p:spPr>
+        <p:style>
+          <a:lnRef idx="2">
+            <a:schemeClr val="accent6">
+              <a:shade val="50000"/>
+            </a:schemeClr>
+          </a:lnRef>
+          <a:fillRef idx="1">
+            <a:schemeClr val="accent6"/>
+          </a:fillRef>
+          <a:effectRef idx="0">
+            <a:schemeClr val="accent6"/>
+          </a:effectRef>
+          <a:fontRef idx="minor">
+            <a:schemeClr val="lt1"/>
+          </a:fontRef>
+        </p:style>
+        <p:txBody>
+          <a:bodyPr rtlCol="0" anchor="ctr"/>
+          <a:lstStyle/>
+          <a:p>
+            <a:pPr algn="ctr"/>
+            <a:endParaRPr lang="en-US"/>
+          </a:p>
+        </p:txBody>
+      </p:sp>
     </p:spTree>
     <p:extLst>
       <p:ext uri="{BB962C8B-B14F-4D97-AF65-F5344CB8AC3E}">

</xml_diff>

<commit_message>
Different measure selection options
</commit_message>
<xml_diff>
--- a/GraphicDesign.pptx
+++ b/GraphicDesign.pptx
@@ -3330,7 +3330,7 @@
           <a:lstStyle/>
           <a:p>
             <a:pPr algn="ctr"/>
-            <a:endParaRPr lang="en-US"/>
+            <a:endParaRPr lang="en-US" dirty="0"/>
           </a:p>
         </p:txBody>
       </p:sp>
@@ -7793,6 +7793,9 @@
           <a:prstGeom prst="ellipse">
             <a:avLst/>
           </a:prstGeom>
+          <a:solidFill>
+            <a:srgbClr val="D42616"/>
+          </a:solidFill>
           <a:scene3d>
             <a:camera prst="orthographicFront">
               <a:rot lat="0" lon="0" rev="0"/>
@@ -7814,6 +7817,374 @@
           </a:fillRef>
           <a:effectRef idx="3">
             <a:schemeClr val="accent1"/>
+          </a:effectRef>
+          <a:fontRef idx="minor">
+            <a:schemeClr val="lt1"/>
+          </a:fontRef>
+        </p:style>
+        <p:txBody>
+          <a:bodyPr rtlCol="0" anchor="ctr"/>
+          <a:lstStyle/>
+          <a:p>
+            <a:pPr algn="ctr"/>
+            <a:endParaRPr lang="en-US"/>
+          </a:p>
+        </p:txBody>
+      </p:sp>
+      <p:sp>
+        <p:nvSpPr>
+          <p:cNvPr id="93" name="Rectangle 92"/>
+          <p:cNvSpPr/>
+          <p:nvPr/>
+        </p:nvSpPr>
+        <p:spPr>
+          <a:xfrm>
+            <a:off x="5488213" y="1898629"/>
+            <a:ext cx="54429" cy="472278"/>
+          </a:xfrm>
+          <a:prstGeom prst="rect">
+            <a:avLst/>
+          </a:prstGeom>
+        </p:spPr>
+        <p:style>
+          <a:lnRef idx="2">
+            <a:schemeClr val="accent3">
+              <a:shade val="50000"/>
+            </a:schemeClr>
+          </a:lnRef>
+          <a:fillRef idx="1">
+            <a:schemeClr val="accent3"/>
+          </a:fillRef>
+          <a:effectRef idx="0">
+            <a:schemeClr val="accent3"/>
+          </a:effectRef>
+          <a:fontRef idx="minor">
+            <a:schemeClr val="lt1"/>
+          </a:fontRef>
+        </p:style>
+        <p:txBody>
+          <a:bodyPr rtlCol="0" anchor="ctr"/>
+          <a:lstStyle/>
+          <a:p>
+            <a:pPr algn="ctr"/>
+            <a:endParaRPr lang="en-US"/>
+          </a:p>
+        </p:txBody>
+      </p:sp>
+      <p:sp>
+        <p:nvSpPr>
+          <p:cNvPr id="94" name="Rectangle 93"/>
+          <p:cNvSpPr/>
+          <p:nvPr/>
+        </p:nvSpPr>
+        <p:spPr>
+          <a:xfrm>
+            <a:off x="5848535" y="1896958"/>
+            <a:ext cx="54429" cy="472278"/>
+          </a:xfrm>
+          <a:prstGeom prst="rect">
+            <a:avLst/>
+          </a:prstGeom>
+        </p:spPr>
+        <p:style>
+          <a:lnRef idx="2">
+            <a:schemeClr val="accent2">
+              <a:shade val="50000"/>
+            </a:schemeClr>
+          </a:lnRef>
+          <a:fillRef idx="1">
+            <a:schemeClr val="accent2"/>
+          </a:fillRef>
+          <a:effectRef idx="0">
+            <a:schemeClr val="accent2"/>
+          </a:effectRef>
+          <a:fontRef idx="minor">
+            <a:schemeClr val="lt1"/>
+          </a:fontRef>
+        </p:style>
+        <p:txBody>
+          <a:bodyPr rtlCol="0" anchor="ctr"/>
+          <a:lstStyle/>
+          <a:p>
+            <a:pPr algn="ctr"/>
+            <a:endParaRPr lang="en-US"/>
+          </a:p>
+        </p:txBody>
+      </p:sp>
+      <p:pic>
+        <p:nvPicPr>
+          <p:cNvPr id="95" name="Picture 94"/>
+          <p:cNvPicPr>
+            <a:picLocks noChangeAspect="1"/>
+          </p:cNvPicPr>
+          <p:nvPr/>
+        </p:nvPicPr>
+        <p:blipFill>
+          <a:blip r:embed="rId10"/>
+          <a:stretch>
+            <a:fillRect/>
+          </a:stretch>
+        </p:blipFill>
+        <p:spPr>
+          <a:xfrm>
+            <a:off x="4803541" y="2161427"/>
+            <a:ext cx="214736" cy="207809"/>
+          </a:xfrm>
+          <a:prstGeom prst="rect">
+            <a:avLst/>
+          </a:prstGeom>
+        </p:spPr>
+      </p:pic>
+      <p:pic>
+        <p:nvPicPr>
+          <p:cNvPr id="96" name="Picture 95"/>
+          <p:cNvPicPr>
+            <a:picLocks noChangeAspect="1"/>
+          </p:cNvPicPr>
+          <p:nvPr/>
+        </p:nvPicPr>
+        <p:blipFill>
+          <a:blip r:embed="rId10"/>
+          <a:stretch>
+            <a:fillRect/>
+          </a:stretch>
+        </p:blipFill>
+        <p:spPr>
+          <a:xfrm rot="10800000">
+            <a:off x="4553984" y="1890943"/>
+            <a:ext cx="214736" cy="207809"/>
+          </a:xfrm>
+          <a:prstGeom prst="rect">
+            <a:avLst/>
+          </a:prstGeom>
+        </p:spPr>
+      </p:pic>
+      <p:sp>
+        <p:nvSpPr>
+          <p:cNvPr id="97" name="Rectangle 96"/>
+          <p:cNvSpPr/>
+          <p:nvPr/>
+        </p:nvSpPr>
+        <p:spPr>
+          <a:xfrm rot="16200000">
+            <a:off x="6561638" y="1735249"/>
+            <a:ext cx="56100" cy="412308"/>
+          </a:xfrm>
+          <a:prstGeom prst="rect">
+            <a:avLst/>
+          </a:prstGeom>
+        </p:spPr>
+        <p:style>
+          <a:lnRef idx="2">
+            <a:schemeClr val="accent3">
+              <a:shade val="50000"/>
+            </a:schemeClr>
+          </a:lnRef>
+          <a:fillRef idx="1">
+            <a:schemeClr val="accent3"/>
+          </a:fillRef>
+          <a:effectRef idx="0">
+            <a:schemeClr val="accent3"/>
+          </a:effectRef>
+          <a:fontRef idx="minor">
+            <a:schemeClr val="lt1"/>
+          </a:fontRef>
+        </p:style>
+        <p:txBody>
+          <a:bodyPr rtlCol="0" anchor="ctr"/>
+          <a:lstStyle/>
+          <a:p>
+            <a:pPr algn="ctr"/>
+            <a:endParaRPr lang="en-US"/>
+          </a:p>
+        </p:txBody>
+      </p:sp>
+      <p:sp>
+        <p:nvSpPr>
+          <p:cNvPr id="98" name="Rectangle 97"/>
+          <p:cNvSpPr/>
+          <p:nvPr/>
+        </p:nvSpPr>
+        <p:spPr>
+          <a:xfrm rot="16200000">
+            <a:off x="6570905" y="2121925"/>
+            <a:ext cx="54431" cy="417853"/>
+          </a:xfrm>
+          <a:prstGeom prst="rect">
+            <a:avLst/>
+          </a:prstGeom>
+        </p:spPr>
+        <p:style>
+          <a:lnRef idx="2">
+            <a:schemeClr val="accent2">
+              <a:shade val="50000"/>
+            </a:schemeClr>
+          </a:lnRef>
+          <a:fillRef idx="1">
+            <a:schemeClr val="accent2"/>
+          </a:fillRef>
+          <a:effectRef idx="0">
+            <a:schemeClr val="accent2"/>
+          </a:effectRef>
+          <a:fontRef idx="minor">
+            <a:schemeClr val="lt1"/>
+          </a:fontRef>
+        </p:style>
+        <p:txBody>
+          <a:bodyPr rtlCol="0" anchor="ctr"/>
+          <a:lstStyle/>
+          <a:p>
+            <a:pPr algn="ctr"/>
+            <a:endParaRPr lang="en-US"/>
+          </a:p>
+        </p:txBody>
+      </p:sp>
+      <p:sp>
+        <p:nvSpPr>
+          <p:cNvPr id="99" name="Rectangle 98"/>
+          <p:cNvSpPr/>
+          <p:nvPr/>
+        </p:nvSpPr>
+        <p:spPr>
+          <a:xfrm rot="16200000">
+            <a:off x="7009876" y="1738464"/>
+            <a:ext cx="56100" cy="412308"/>
+          </a:xfrm>
+          <a:prstGeom prst="rect">
+            <a:avLst/>
+          </a:prstGeom>
+        </p:spPr>
+        <p:style>
+          <a:lnRef idx="2">
+            <a:schemeClr val="accent3">
+              <a:shade val="50000"/>
+            </a:schemeClr>
+          </a:lnRef>
+          <a:fillRef idx="1">
+            <a:schemeClr val="accent3"/>
+          </a:fillRef>
+          <a:effectRef idx="0">
+            <a:schemeClr val="accent3"/>
+          </a:effectRef>
+          <a:fontRef idx="minor">
+            <a:schemeClr val="lt1"/>
+          </a:fontRef>
+        </p:style>
+        <p:txBody>
+          <a:bodyPr rtlCol="0" anchor="ctr"/>
+          <a:lstStyle/>
+          <a:p>
+            <a:pPr algn="ctr"/>
+            <a:endParaRPr lang="en-US"/>
+          </a:p>
+        </p:txBody>
+      </p:sp>
+      <p:sp>
+        <p:nvSpPr>
+          <p:cNvPr id="100" name="Rectangle 99"/>
+          <p:cNvSpPr/>
+          <p:nvPr/>
+        </p:nvSpPr>
+        <p:spPr>
+          <a:xfrm rot="16200000">
+            <a:off x="7019143" y="2125140"/>
+            <a:ext cx="54431" cy="417853"/>
+          </a:xfrm>
+          <a:prstGeom prst="rect">
+            <a:avLst/>
+          </a:prstGeom>
+        </p:spPr>
+        <p:style>
+          <a:lnRef idx="2">
+            <a:schemeClr val="accent2">
+              <a:shade val="50000"/>
+            </a:schemeClr>
+          </a:lnRef>
+          <a:fillRef idx="1">
+            <a:schemeClr val="accent2"/>
+          </a:fillRef>
+          <a:effectRef idx="0">
+            <a:schemeClr val="accent2"/>
+          </a:effectRef>
+          <a:fontRef idx="minor">
+            <a:schemeClr val="lt1"/>
+          </a:fontRef>
+        </p:style>
+        <p:txBody>
+          <a:bodyPr rtlCol="0" anchor="ctr"/>
+          <a:lstStyle/>
+          <a:p>
+            <a:pPr algn="ctr"/>
+            <a:endParaRPr lang="en-US"/>
+          </a:p>
+        </p:txBody>
+      </p:sp>
+      <p:sp>
+        <p:nvSpPr>
+          <p:cNvPr id="101" name="Rectangle 100"/>
+          <p:cNvSpPr/>
+          <p:nvPr/>
+        </p:nvSpPr>
+        <p:spPr>
+          <a:xfrm rot="16200000">
+            <a:off x="7460619" y="1735249"/>
+            <a:ext cx="56100" cy="412308"/>
+          </a:xfrm>
+          <a:prstGeom prst="rect">
+            <a:avLst/>
+          </a:prstGeom>
+        </p:spPr>
+        <p:style>
+          <a:lnRef idx="2">
+            <a:schemeClr val="accent3">
+              <a:shade val="50000"/>
+            </a:schemeClr>
+          </a:lnRef>
+          <a:fillRef idx="1">
+            <a:schemeClr val="accent3"/>
+          </a:fillRef>
+          <a:effectRef idx="0">
+            <a:schemeClr val="accent3"/>
+          </a:effectRef>
+          <a:fontRef idx="minor">
+            <a:schemeClr val="lt1"/>
+          </a:fontRef>
+        </p:style>
+        <p:txBody>
+          <a:bodyPr rtlCol="0" anchor="ctr"/>
+          <a:lstStyle/>
+          <a:p>
+            <a:pPr algn="ctr"/>
+            <a:endParaRPr lang="en-US"/>
+          </a:p>
+        </p:txBody>
+      </p:sp>
+      <p:sp>
+        <p:nvSpPr>
+          <p:cNvPr id="102" name="Rectangle 101"/>
+          <p:cNvSpPr/>
+          <p:nvPr/>
+        </p:nvSpPr>
+        <p:spPr>
+          <a:xfrm rot="16200000">
+            <a:off x="7469886" y="2121925"/>
+            <a:ext cx="54431" cy="417853"/>
+          </a:xfrm>
+          <a:prstGeom prst="rect">
+            <a:avLst/>
+          </a:prstGeom>
+        </p:spPr>
+        <p:style>
+          <a:lnRef idx="2">
+            <a:schemeClr val="accent2">
+              <a:shade val="50000"/>
+            </a:schemeClr>
+          </a:lnRef>
+          <a:fillRef idx="1">
+            <a:schemeClr val="accent2"/>
+          </a:fillRef>
+          <a:effectRef idx="0">
+            <a:schemeClr val="accent2"/>
           </a:effectRef>
           <a:fontRef idx="minor">
             <a:schemeClr val="lt1"/>
@@ -8965,6 +9336,54 @@
           </a:p>
         </p:txBody>
       </p:sp>
+      <p:pic>
+        <p:nvPicPr>
+          <p:cNvPr id="25" name="Picture 24"/>
+          <p:cNvPicPr>
+            <a:picLocks noChangeAspect="1"/>
+          </p:cNvPicPr>
+          <p:nvPr/>
+        </p:nvPicPr>
+        <p:blipFill>
+          <a:blip r:embed="rId12"/>
+          <a:stretch>
+            <a:fillRect/>
+          </a:stretch>
+        </p:blipFill>
+        <p:spPr>
+          <a:xfrm>
+            <a:off x="4500482" y="1443775"/>
+            <a:ext cx="214736" cy="207809"/>
+          </a:xfrm>
+          <a:prstGeom prst="rect">
+            <a:avLst/>
+          </a:prstGeom>
+        </p:spPr>
+      </p:pic>
+      <p:pic>
+        <p:nvPicPr>
+          <p:cNvPr id="26" name="Picture 25"/>
+          <p:cNvPicPr>
+            <a:picLocks noChangeAspect="1"/>
+          </p:cNvPicPr>
+          <p:nvPr/>
+        </p:nvPicPr>
+        <p:blipFill>
+          <a:blip r:embed="rId12"/>
+          <a:stretch>
+            <a:fillRect/>
+          </a:stretch>
+        </p:blipFill>
+        <p:spPr>
+          <a:xfrm rot="10800000">
+            <a:off x="4258394" y="1182362"/>
+            <a:ext cx="214736" cy="207809"/>
+          </a:xfrm>
+          <a:prstGeom prst="rect">
+            <a:avLst/>
+          </a:prstGeom>
+        </p:spPr>
+      </p:pic>
     </p:spTree>
     <p:extLst>
       <p:ext uri="{BB962C8B-B14F-4D97-AF65-F5344CB8AC3E}">

</xml_diff>

<commit_message>
With start and end selectors instead of buttons
</commit_message>
<xml_diff>
--- a/GraphicDesign.pptx
+++ b/GraphicDesign.pptx
@@ -3743,67 +3743,6 @@
           </a:p>
         </p:txBody>
       </p:sp>
-      <p:sp>
-        <p:nvSpPr>
-          <p:cNvPr id="46" name="TextBox 45"/>
-          <p:cNvSpPr txBox="1"/>
-          <p:nvPr/>
-        </p:nvSpPr>
-        <p:spPr>
-          <a:xfrm>
-            <a:off x="704096" y="3818290"/>
-            <a:ext cx="942807" cy="215444"/>
-          </a:xfrm>
-          <a:prstGeom prst="rect">
-            <a:avLst/>
-          </a:prstGeom>
-          <a:noFill/>
-        </p:spPr>
-        <p:txBody>
-          <a:bodyPr wrap="square" rtlCol="0">
-            <a:spAutoFit/>
-          </a:bodyPr>
-          <a:lstStyle/>
-          <a:p>
-            <a:r>
-              <a:rPr lang="en-US" sz="800" dirty="0" smtClean="0">
-                <a:solidFill>
-                  <a:schemeClr val="tx1">
-                    <a:lumMod val="65000"/>
-                    <a:lumOff val="35000"/>
-                  </a:schemeClr>
-                </a:solidFill>
-                <a:latin typeface="Arial"/>
-                <a:cs typeface="Arial"/>
-              </a:rPr>
-              <a:t>SELECT</a:t>
-            </a:r>
-            <a:r>
-              <a:rPr lang="en-US" sz="800" dirty="0" smtClean="0">
-                <a:solidFill>
-                  <a:schemeClr val="tx1">
-                    <a:lumMod val="65000"/>
-                    <a:lumOff val="35000"/>
-                  </a:schemeClr>
-                </a:solidFill>
-                <a:latin typeface="Arial"/>
-                <a:cs typeface="Arial"/>
-              </a:rPr>
-              <a:t> START </a:t>
-            </a:r>
-            <a:endParaRPr lang="en-US" sz="800" dirty="0">
-              <a:solidFill>
-                <a:schemeClr val="tx1">
-                  <a:lumMod val="65000"/>
-                  <a:lumOff val="35000"/>
-                </a:schemeClr>
-              </a:solidFill>
-              <a:latin typeface="Arial"/>
-              <a:cs typeface="Arial"/>
-            </a:endParaRPr>
-          </a:p>
-        </p:txBody>
-      </p:sp>
       <p:grpSp>
         <p:nvGrpSpPr>
           <p:cNvPr id="2" name="Group 1"/>
@@ -4025,7 +3964,7 @@
           <p:nvPr>
             <p:extLst>
               <p:ext uri="{D42A27DB-BD31-4B8C-83A1-F6EECF244321}">
-                <p14:modId xmlns:p14="http://schemas.microsoft.com/office/powerpoint/2010/main" val="3109970632"/>
+                <p14:modId xmlns:p14="http://schemas.microsoft.com/office/powerpoint/2010/main" val="2630430049"/>
               </p:ext>
             </p:extLst>
           </p:nvPr>
@@ -4076,9 +4015,7 @@
                       <a:r>
                         <a:rPr lang="en-US" sz="1200" dirty="0" smtClean="0">
                           <a:solidFill>
-                            <a:schemeClr val="bg1">
-                              <a:lumMod val="50000"/>
-                            </a:schemeClr>
+                            <a:schemeClr val="tx1"/>
                           </a:solidFill>
                           <a:latin typeface="Arial"/>
                           <a:cs typeface="Arial"/>
@@ -4087,9 +4024,7 @@
                       </a:r>
                       <a:endParaRPr lang="en-US" sz="1200" dirty="0">
                         <a:solidFill>
-                          <a:schemeClr val="bg1">
-                            <a:lumMod val="50000"/>
-                          </a:schemeClr>
+                          <a:schemeClr val="tx1"/>
                         </a:solidFill>
                         <a:latin typeface="Arial"/>
                         <a:cs typeface="Arial"/>
@@ -4098,9 +4033,7 @@
                   </a:txBody>
                   <a:tcPr>
                     <a:solidFill>
-                      <a:schemeClr val="bg1">
-                        <a:lumMod val="75000"/>
-                      </a:schemeClr>
+                      <a:srgbClr val="F6FEB3"/>
                     </a:solidFill>
                   </a:tcPr>
                 </a:tc>
@@ -7671,178 +7604,16 @@
       </p:sp>
       <p:sp>
         <p:nvSpPr>
-          <p:cNvPr id="66" name="Oval 65"/>
+          <p:cNvPr id="104" name="Isosceles Triangle 103"/>
           <p:cNvSpPr/>
           <p:nvPr/>
         </p:nvSpPr>
         <p:spPr>
-          <a:xfrm>
-            <a:off x="947979" y="4006606"/>
-            <a:ext cx="427677" cy="426064"/>
+          <a:xfrm rot="5400000">
+            <a:off x="-91194" y="2074829"/>
+            <a:ext cx="436381" cy="100584"/>
           </a:xfrm>
-          <a:prstGeom prst="ellipse">
-            <a:avLst/>
-          </a:prstGeom>
-          <a:scene3d>
-            <a:camera prst="orthographicFront">
-              <a:rot lat="0" lon="0" rev="0"/>
-            </a:camera>
-            <a:lightRig rig="threePt" dir="t">
-              <a:rot lat="0" lon="0" rev="1200000"/>
-            </a:lightRig>
-          </a:scene3d>
-          <a:sp3d>
-            <a:bevelT w="63500" h="25400" prst="convex"/>
-          </a:sp3d>
-        </p:spPr>
-        <p:style>
-          <a:lnRef idx="0">
-            <a:schemeClr val="accent1"/>
-          </a:lnRef>
-          <a:fillRef idx="3">
-            <a:schemeClr val="accent1"/>
-          </a:fillRef>
-          <a:effectRef idx="3">
-            <a:schemeClr val="accent1"/>
-          </a:effectRef>
-          <a:fontRef idx="minor">
-            <a:schemeClr val="lt1"/>
-          </a:fontRef>
-        </p:style>
-        <p:txBody>
-          <a:bodyPr rtlCol="0" anchor="ctr"/>
-          <a:lstStyle/>
-          <a:p>
-            <a:pPr algn="ctr"/>
-            <a:endParaRPr lang="en-US"/>
-          </a:p>
-        </p:txBody>
-      </p:sp>
-      <p:sp>
-        <p:nvSpPr>
-          <p:cNvPr id="67" name="TextBox 66"/>
-          <p:cNvSpPr txBox="1"/>
-          <p:nvPr/>
-        </p:nvSpPr>
-        <p:spPr>
-          <a:xfrm>
-            <a:off x="1655096" y="3812808"/>
-            <a:ext cx="942807" cy="215444"/>
-          </a:xfrm>
-          <a:prstGeom prst="rect">
-            <a:avLst/>
-          </a:prstGeom>
-          <a:noFill/>
-        </p:spPr>
-        <p:txBody>
-          <a:bodyPr wrap="square" rtlCol="0">
-            <a:spAutoFit/>
-          </a:bodyPr>
-          <a:lstStyle/>
-          <a:p>
-            <a:r>
-              <a:rPr lang="en-US" sz="800" dirty="0" smtClean="0">
-                <a:solidFill>
-                  <a:schemeClr val="tx1">
-                    <a:lumMod val="65000"/>
-                    <a:lumOff val="35000"/>
-                  </a:schemeClr>
-                </a:solidFill>
-                <a:latin typeface="Arial"/>
-                <a:cs typeface="Arial"/>
-              </a:rPr>
-              <a:t>SELECT</a:t>
-            </a:r>
-            <a:r>
-              <a:rPr lang="en-US" sz="800" dirty="0" smtClean="0">
-                <a:solidFill>
-                  <a:schemeClr val="tx1">
-                    <a:lumMod val="65000"/>
-                    <a:lumOff val="35000"/>
-                  </a:schemeClr>
-                </a:solidFill>
-                <a:latin typeface="Arial"/>
-                <a:cs typeface="Arial"/>
-              </a:rPr>
-              <a:t> END</a:t>
-            </a:r>
-            <a:endParaRPr lang="en-US" sz="800" dirty="0">
-              <a:solidFill>
-                <a:schemeClr val="tx1">
-                  <a:lumMod val="65000"/>
-                  <a:lumOff val="35000"/>
-                </a:schemeClr>
-              </a:solidFill>
-              <a:latin typeface="Arial"/>
-              <a:cs typeface="Arial"/>
-            </a:endParaRPr>
-          </a:p>
-        </p:txBody>
-      </p:sp>
-      <p:sp>
-        <p:nvSpPr>
-          <p:cNvPr id="68" name="Oval 67"/>
-          <p:cNvSpPr/>
-          <p:nvPr/>
-        </p:nvSpPr>
-        <p:spPr>
-          <a:xfrm>
-            <a:off x="1837796" y="3997406"/>
-            <a:ext cx="427677" cy="426064"/>
-          </a:xfrm>
-          <a:prstGeom prst="ellipse">
-            <a:avLst/>
-          </a:prstGeom>
-          <a:solidFill>
-            <a:srgbClr val="D42616"/>
-          </a:solidFill>
-          <a:scene3d>
-            <a:camera prst="orthographicFront">
-              <a:rot lat="0" lon="0" rev="0"/>
-            </a:camera>
-            <a:lightRig rig="threePt" dir="t">
-              <a:rot lat="0" lon="0" rev="1200000"/>
-            </a:lightRig>
-          </a:scene3d>
-          <a:sp3d>
-            <a:bevelT w="63500" h="25400" prst="convex"/>
-          </a:sp3d>
-        </p:spPr>
-        <p:style>
-          <a:lnRef idx="0">
-            <a:schemeClr val="accent1"/>
-          </a:lnRef>
-          <a:fillRef idx="3">
-            <a:schemeClr val="accent1"/>
-          </a:fillRef>
-          <a:effectRef idx="3">
-            <a:schemeClr val="accent1"/>
-          </a:effectRef>
-          <a:fontRef idx="minor">
-            <a:schemeClr val="lt1"/>
-          </a:fontRef>
-        </p:style>
-        <p:txBody>
-          <a:bodyPr rtlCol="0" anchor="ctr"/>
-          <a:lstStyle/>
-          <a:p>
-            <a:pPr algn="ctr"/>
-            <a:endParaRPr lang="en-US"/>
-          </a:p>
-        </p:txBody>
-      </p:sp>
-      <p:sp>
-        <p:nvSpPr>
-          <p:cNvPr id="93" name="Rectangle 92"/>
-          <p:cNvSpPr/>
-          <p:nvPr/>
-        </p:nvSpPr>
-        <p:spPr>
-          <a:xfrm>
-            <a:off x="5488213" y="1898629"/>
-            <a:ext cx="54429" cy="472278"/>
-          </a:xfrm>
-          <a:prstGeom prst="rect">
+          <a:prstGeom prst="triangle">
             <a:avLst/>
           </a:prstGeom>
         </p:spPr>
@@ -7873,29 +7644,27 @@
       </p:sp>
       <p:sp>
         <p:nvSpPr>
-          <p:cNvPr id="94" name="Rectangle 93"/>
+          <p:cNvPr id="105" name="Isosceles Triangle 104"/>
           <p:cNvSpPr/>
           <p:nvPr/>
         </p:nvSpPr>
         <p:spPr>
-          <a:xfrm>
-            <a:off x="5848535" y="1896958"/>
-            <a:ext cx="54429" cy="472278"/>
+          <a:xfrm rot="16200000" flipH="1">
+            <a:off x="2936212" y="2074829"/>
+            <a:ext cx="436381" cy="100584"/>
           </a:xfrm>
-          <a:prstGeom prst="rect">
+          <a:prstGeom prst="triangle">
             <a:avLst/>
           </a:prstGeom>
         </p:spPr>
         <p:style>
-          <a:lnRef idx="2">
-            <a:schemeClr val="accent2">
-              <a:shade val="50000"/>
-            </a:schemeClr>
+          <a:lnRef idx="1">
+            <a:schemeClr val="accent2"/>
           </a:lnRef>
-          <a:fillRef idx="1">
+          <a:fillRef idx="3">
             <a:schemeClr val="accent2"/>
           </a:fillRef>
-          <a:effectRef idx="0">
+          <a:effectRef idx="2">
             <a:schemeClr val="accent2"/>
           </a:effectRef>
           <a:fontRef idx="minor">
@@ -7911,294 +7680,128 @@
           </a:p>
         </p:txBody>
       </p:sp>
-      <p:pic>
-        <p:nvPicPr>
-          <p:cNvPr id="95" name="Picture 94"/>
-          <p:cNvPicPr>
-            <a:picLocks noChangeAspect="1"/>
-          </p:cNvPicPr>
+      <p:sp>
+        <p:nvSpPr>
+          <p:cNvPr id="106" name="TextBox 105"/>
+          <p:cNvSpPr txBox="1"/>
           <p:nvPr/>
-        </p:nvPicPr>
-        <p:blipFill>
-          <a:blip r:embed="rId10"/>
-          <a:stretch>
-            <a:fillRect/>
-          </a:stretch>
-        </p:blipFill>
+        </p:nvSpPr>
         <p:spPr>
           <a:xfrm>
-            <a:off x="4803541" y="2161427"/>
-            <a:ext cx="214736" cy="207809"/>
+            <a:off x="2796586" y="1664838"/>
+            <a:ext cx="942807" cy="215444"/>
           </a:xfrm>
           <a:prstGeom prst="rect">
             <a:avLst/>
           </a:prstGeom>
+          <a:noFill/>
         </p:spPr>
-      </p:pic>
-      <p:pic>
-        <p:nvPicPr>
-          <p:cNvPr id="96" name="Picture 95"/>
-          <p:cNvPicPr>
-            <a:picLocks noChangeAspect="1"/>
-          </p:cNvPicPr>
+        <p:txBody>
+          <a:bodyPr wrap="square" rtlCol="0">
+            <a:spAutoFit/>
+          </a:bodyPr>
+          <a:lstStyle/>
+          <a:p>
+            <a:r>
+              <a:rPr lang="en-US" sz="800" dirty="0" smtClean="0">
+                <a:solidFill>
+                  <a:schemeClr val="bg1"/>
+                </a:solidFill>
+                <a:latin typeface="Arial"/>
+                <a:cs typeface="Arial"/>
+              </a:rPr>
+              <a:t>DRAG TO END</a:t>
+            </a:r>
+            <a:endParaRPr lang="en-US" sz="800" dirty="0">
+              <a:solidFill>
+                <a:schemeClr val="bg1"/>
+              </a:solidFill>
+              <a:latin typeface="Arial"/>
+              <a:cs typeface="Arial"/>
+            </a:endParaRPr>
+          </a:p>
+        </p:txBody>
+      </p:sp>
+      <p:sp>
+        <p:nvSpPr>
+          <p:cNvPr id="107" name="TextBox 106"/>
+          <p:cNvSpPr txBox="1"/>
           <p:nvPr/>
-        </p:nvPicPr>
-        <p:blipFill>
-          <a:blip r:embed="rId10"/>
-          <a:stretch>
-            <a:fillRect/>
-          </a:stretch>
-        </p:blipFill>
+        </p:nvSpPr>
         <p:spPr>
-          <a:xfrm rot="10800000">
-            <a:off x="4553984" y="1890943"/>
-            <a:ext cx="214736" cy="207809"/>
+          <a:xfrm>
+            <a:off x="48477" y="1663823"/>
+            <a:ext cx="1049458" cy="215444"/>
           </a:xfrm>
           <a:prstGeom prst="rect">
             <a:avLst/>
           </a:prstGeom>
+          <a:noFill/>
         </p:spPr>
-      </p:pic>
-      <p:sp>
-        <p:nvSpPr>
-          <p:cNvPr id="97" name="Rectangle 96"/>
-          <p:cNvSpPr/>
+        <p:txBody>
+          <a:bodyPr wrap="square" rtlCol="0">
+            <a:spAutoFit/>
+          </a:bodyPr>
+          <a:lstStyle>
+            <a:defPPr>
+              <a:defRPr lang="en-US"/>
+            </a:defPPr>
+            <a:lvl1pPr>
+              <a:defRPr sz="800">
+                <a:solidFill>
+                  <a:schemeClr val="bg1"/>
+                </a:solidFill>
+                <a:latin typeface="Arial"/>
+                <a:cs typeface="Arial"/>
+              </a:defRPr>
+            </a:lvl1pPr>
+          </a:lstStyle>
+          <a:p>
+            <a:r>
+              <a:rPr lang="en-US" dirty="0"/>
+              <a:t>DRAG TO START</a:t>
+            </a:r>
+            <a:endParaRPr lang="en-US" dirty="0"/>
+          </a:p>
+        </p:txBody>
+      </p:sp>
+      <p:cxnSp>
+        <p:nvCxnSpPr>
+          <p:cNvPr id="110" name="Straight Connector 109"/>
+          <p:cNvCxnSpPr/>
           <p:nvPr/>
-        </p:nvSpPr>
+        </p:nvCxnSpPr>
         <p:spPr>
-          <a:xfrm rot="16200000">
-            <a:off x="6561638" y="1735249"/>
-            <a:ext cx="56100" cy="412308"/>
+          <a:xfrm>
+            <a:off x="1950063" y="1896670"/>
+            <a:ext cx="0" cy="474237"/>
           </a:xfrm>
-          <a:prstGeom prst="rect">
+          <a:prstGeom prst="line">
             <a:avLst/>
           </a:prstGeom>
+          <a:ln>
+            <a:solidFill>
+              <a:schemeClr val="accent3">
+                <a:lumMod val="50000"/>
+              </a:schemeClr>
+            </a:solidFill>
+          </a:ln>
         </p:spPr>
         <p:style>
-          <a:lnRef idx="2">
-            <a:schemeClr val="accent3">
-              <a:shade val="50000"/>
-            </a:schemeClr>
+          <a:lnRef idx="3">
+            <a:schemeClr val="accent2"/>
           </a:lnRef>
-          <a:fillRef idx="1">
-            <a:schemeClr val="accent3"/>
-          </a:fillRef>
-          <a:effectRef idx="0">
-            <a:schemeClr val="accent3"/>
-          </a:effectRef>
-          <a:fontRef idx="minor">
-            <a:schemeClr val="lt1"/>
-          </a:fontRef>
-        </p:style>
-        <p:txBody>
-          <a:bodyPr rtlCol="0" anchor="ctr"/>
-          <a:lstStyle/>
-          <a:p>
-            <a:pPr algn="ctr"/>
-            <a:endParaRPr lang="en-US"/>
-          </a:p>
-        </p:txBody>
-      </p:sp>
-      <p:sp>
-        <p:nvSpPr>
-          <p:cNvPr id="98" name="Rectangle 97"/>
-          <p:cNvSpPr/>
-          <p:nvPr/>
-        </p:nvSpPr>
-        <p:spPr>
-          <a:xfrm rot="16200000">
-            <a:off x="6570905" y="2121925"/>
-            <a:ext cx="54431" cy="417853"/>
-          </a:xfrm>
-          <a:prstGeom prst="rect">
-            <a:avLst/>
-          </a:prstGeom>
-        </p:spPr>
-        <p:style>
-          <a:lnRef idx="2">
-            <a:schemeClr val="accent2">
-              <a:shade val="50000"/>
-            </a:schemeClr>
-          </a:lnRef>
-          <a:fillRef idx="1">
+          <a:fillRef idx="0">
             <a:schemeClr val="accent2"/>
           </a:fillRef>
-          <a:effectRef idx="0">
+          <a:effectRef idx="2">
             <a:schemeClr val="accent2"/>
           </a:effectRef>
           <a:fontRef idx="minor">
-            <a:schemeClr val="lt1"/>
+            <a:schemeClr val="tx1"/>
           </a:fontRef>
         </p:style>
-        <p:txBody>
-          <a:bodyPr rtlCol="0" anchor="ctr"/>
-          <a:lstStyle/>
-          <a:p>
-            <a:pPr algn="ctr"/>
-            <a:endParaRPr lang="en-US"/>
-          </a:p>
-        </p:txBody>
-      </p:sp>
-      <p:sp>
-        <p:nvSpPr>
-          <p:cNvPr id="99" name="Rectangle 98"/>
-          <p:cNvSpPr/>
-          <p:nvPr/>
-        </p:nvSpPr>
-        <p:spPr>
-          <a:xfrm rot="16200000">
-            <a:off x="7009876" y="1738464"/>
-            <a:ext cx="56100" cy="412308"/>
-          </a:xfrm>
-          <a:prstGeom prst="rect">
-            <a:avLst/>
-          </a:prstGeom>
-        </p:spPr>
-        <p:style>
-          <a:lnRef idx="2">
-            <a:schemeClr val="accent3">
-              <a:shade val="50000"/>
-            </a:schemeClr>
-          </a:lnRef>
-          <a:fillRef idx="1">
-            <a:schemeClr val="accent3"/>
-          </a:fillRef>
-          <a:effectRef idx="0">
-            <a:schemeClr val="accent3"/>
-          </a:effectRef>
-          <a:fontRef idx="minor">
-            <a:schemeClr val="lt1"/>
-          </a:fontRef>
-        </p:style>
-        <p:txBody>
-          <a:bodyPr rtlCol="0" anchor="ctr"/>
-          <a:lstStyle/>
-          <a:p>
-            <a:pPr algn="ctr"/>
-            <a:endParaRPr lang="en-US"/>
-          </a:p>
-        </p:txBody>
-      </p:sp>
-      <p:sp>
-        <p:nvSpPr>
-          <p:cNvPr id="100" name="Rectangle 99"/>
-          <p:cNvSpPr/>
-          <p:nvPr/>
-        </p:nvSpPr>
-        <p:spPr>
-          <a:xfrm rot="16200000">
-            <a:off x="7019143" y="2125140"/>
-            <a:ext cx="54431" cy="417853"/>
-          </a:xfrm>
-          <a:prstGeom prst="rect">
-            <a:avLst/>
-          </a:prstGeom>
-        </p:spPr>
-        <p:style>
-          <a:lnRef idx="2">
-            <a:schemeClr val="accent2">
-              <a:shade val="50000"/>
-            </a:schemeClr>
-          </a:lnRef>
-          <a:fillRef idx="1">
-            <a:schemeClr val="accent2"/>
-          </a:fillRef>
-          <a:effectRef idx="0">
-            <a:schemeClr val="accent2"/>
-          </a:effectRef>
-          <a:fontRef idx="minor">
-            <a:schemeClr val="lt1"/>
-          </a:fontRef>
-        </p:style>
-        <p:txBody>
-          <a:bodyPr rtlCol="0" anchor="ctr"/>
-          <a:lstStyle/>
-          <a:p>
-            <a:pPr algn="ctr"/>
-            <a:endParaRPr lang="en-US"/>
-          </a:p>
-        </p:txBody>
-      </p:sp>
-      <p:sp>
-        <p:nvSpPr>
-          <p:cNvPr id="101" name="Rectangle 100"/>
-          <p:cNvSpPr/>
-          <p:nvPr/>
-        </p:nvSpPr>
-        <p:spPr>
-          <a:xfrm rot="16200000">
-            <a:off x="7460619" y="1735249"/>
-            <a:ext cx="56100" cy="412308"/>
-          </a:xfrm>
-          <a:prstGeom prst="rect">
-            <a:avLst/>
-          </a:prstGeom>
-        </p:spPr>
-        <p:style>
-          <a:lnRef idx="2">
-            <a:schemeClr val="accent3">
-              <a:shade val="50000"/>
-            </a:schemeClr>
-          </a:lnRef>
-          <a:fillRef idx="1">
-            <a:schemeClr val="accent3"/>
-          </a:fillRef>
-          <a:effectRef idx="0">
-            <a:schemeClr val="accent3"/>
-          </a:effectRef>
-          <a:fontRef idx="minor">
-            <a:schemeClr val="lt1"/>
-          </a:fontRef>
-        </p:style>
-        <p:txBody>
-          <a:bodyPr rtlCol="0" anchor="ctr"/>
-          <a:lstStyle/>
-          <a:p>
-            <a:pPr algn="ctr"/>
-            <a:endParaRPr lang="en-US"/>
-          </a:p>
-        </p:txBody>
-      </p:sp>
-      <p:sp>
-        <p:nvSpPr>
-          <p:cNvPr id="102" name="Rectangle 101"/>
-          <p:cNvSpPr/>
-          <p:nvPr/>
-        </p:nvSpPr>
-        <p:spPr>
-          <a:xfrm rot="16200000">
-            <a:off x="7469886" y="2121925"/>
-            <a:ext cx="54431" cy="417853"/>
-          </a:xfrm>
-          <a:prstGeom prst="rect">
-            <a:avLst/>
-          </a:prstGeom>
-        </p:spPr>
-        <p:style>
-          <a:lnRef idx="2">
-            <a:schemeClr val="accent2">
-              <a:shade val="50000"/>
-            </a:schemeClr>
-          </a:lnRef>
-          <a:fillRef idx="1">
-            <a:schemeClr val="accent2"/>
-          </a:fillRef>
-          <a:effectRef idx="0">
-            <a:schemeClr val="accent2"/>
-          </a:effectRef>
-          <a:fontRef idx="minor">
-            <a:schemeClr val="lt1"/>
-          </a:fontRef>
-        </p:style>
-        <p:txBody>
-          <a:bodyPr rtlCol="0" anchor="ctr"/>
-          <a:lstStyle/>
-          <a:p>
-            <a:pPr algn="ctr"/>
-            <a:endParaRPr lang="en-US"/>
-          </a:p>
-        </p:txBody>
-      </p:sp>
+      </p:cxnSp>
     </p:spTree>
     <p:extLst>
       <p:ext uri="{BB962C8B-B14F-4D97-AF65-F5344CB8AC3E}">

</xml_diff>

<commit_message>
Increase uglifier to ADVANCED
</commit_message>
<xml_diff>
--- a/GraphicDesign.pptx
+++ b/GraphicDesign.pptx
@@ -292,7 +292,7 @@
           <a:p>
             <a:fld id="{3306185E-68BF-194B-9C7C-28321EFA365C}" type="datetimeFigureOut">
               <a:rPr lang="en-US" smtClean="0"/>
-              <a:t>3/26/13</a:t>
+              <a:t>3/27/13</a:t>
             </a:fld>
             <a:endParaRPr lang="en-US"/>
           </a:p>
@@ -462,7 +462,7 @@
           <a:p>
             <a:fld id="{3306185E-68BF-194B-9C7C-28321EFA365C}" type="datetimeFigureOut">
               <a:rPr lang="en-US" smtClean="0"/>
-              <a:t>3/26/13</a:t>
+              <a:t>3/27/13</a:t>
             </a:fld>
             <a:endParaRPr lang="en-US"/>
           </a:p>
@@ -642,7 +642,7 @@
           <a:p>
             <a:fld id="{3306185E-68BF-194B-9C7C-28321EFA365C}" type="datetimeFigureOut">
               <a:rPr lang="en-US" smtClean="0"/>
-              <a:t>3/26/13</a:t>
+              <a:t>3/27/13</a:t>
             </a:fld>
             <a:endParaRPr lang="en-US"/>
           </a:p>
@@ -812,7 +812,7 @@
           <a:p>
             <a:fld id="{3306185E-68BF-194B-9C7C-28321EFA365C}" type="datetimeFigureOut">
               <a:rPr lang="en-US" smtClean="0"/>
-              <a:t>3/26/13</a:t>
+              <a:t>3/27/13</a:t>
             </a:fld>
             <a:endParaRPr lang="en-US"/>
           </a:p>
@@ -1058,7 +1058,7 @@
           <a:p>
             <a:fld id="{3306185E-68BF-194B-9C7C-28321EFA365C}" type="datetimeFigureOut">
               <a:rPr lang="en-US" smtClean="0"/>
-              <a:t>3/26/13</a:t>
+              <a:t>3/27/13</a:t>
             </a:fld>
             <a:endParaRPr lang="en-US"/>
           </a:p>
@@ -1346,7 +1346,7 @@
           <a:p>
             <a:fld id="{3306185E-68BF-194B-9C7C-28321EFA365C}" type="datetimeFigureOut">
               <a:rPr lang="en-US" smtClean="0"/>
-              <a:t>3/26/13</a:t>
+              <a:t>3/27/13</a:t>
             </a:fld>
             <a:endParaRPr lang="en-US"/>
           </a:p>
@@ -1768,7 +1768,7 @@
           <a:p>
             <a:fld id="{3306185E-68BF-194B-9C7C-28321EFA365C}" type="datetimeFigureOut">
               <a:rPr lang="en-US" smtClean="0"/>
-              <a:t>3/26/13</a:t>
+              <a:t>3/27/13</a:t>
             </a:fld>
             <a:endParaRPr lang="en-US"/>
           </a:p>
@@ -1886,7 +1886,7 @@
           <a:p>
             <a:fld id="{3306185E-68BF-194B-9C7C-28321EFA365C}" type="datetimeFigureOut">
               <a:rPr lang="en-US" smtClean="0"/>
-              <a:t>3/26/13</a:t>
+              <a:t>3/27/13</a:t>
             </a:fld>
             <a:endParaRPr lang="en-US"/>
           </a:p>
@@ -1981,7 +1981,7 @@
           <a:p>
             <a:fld id="{3306185E-68BF-194B-9C7C-28321EFA365C}" type="datetimeFigureOut">
               <a:rPr lang="en-US" smtClean="0"/>
-              <a:t>3/26/13</a:t>
+              <a:t>3/27/13</a:t>
             </a:fld>
             <a:endParaRPr lang="en-US"/>
           </a:p>
@@ -2258,7 +2258,7 @@
           <a:p>
             <a:fld id="{3306185E-68BF-194B-9C7C-28321EFA365C}" type="datetimeFigureOut">
               <a:rPr lang="en-US" smtClean="0"/>
-              <a:t>3/26/13</a:t>
+              <a:t>3/27/13</a:t>
             </a:fld>
             <a:endParaRPr lang="en-US"/>
           </a:p>
@@ -2511,7 +2511,7 @@
           <a:p>
             <a:fld id="{3306185E-68BF-194B-9C7C-28321EFA365C}" type="datetimeFigureOut">
               <a:rPr lang="en-US" smtClean="0"/>
-              <a:t>3/26/13</a:t>
+              <a:t>3/27/13</a:t>
             </a:fld>
             <a:endParaRPr lang="en-US"/>
           </a:p>
@@ -2724,7 +2724,7 @@
           <a:p>
             <a:fld id="{3306185E-68BF-194B-9C7C-28321EFA365C}" type="datetimeFigureOut">
               <a:rPr lang="en-US" smtClean="0"/>
-              <a:t>3/26/13</a:t>
+              <a:t>3/27/13</a:t>
             </a:fld>
             <a:endParaRPr lang="en-US"/>
           </a:p>
@@ -7491,8 +7491,8 @@
         </p:nvSpPr>
         <p:spPr>
           <a:xfrm rot="5400000">
-            <a:off x="-88788" y="1417139"/>
-            <a:ext cx="436381" cy="100584"/>
+            <a:off x="-56171" y="1384523"/>
+            <a:ext cx="436381" cy="165818"/>
           </a:xfrm>
           <a:prstGeom prst="triangle">
             <a:avLst/>
@@ -7531,8 +7531,8 @@
         </p:nvSpPr>
         <p:spPr>
           <a:xfrm rot="16200000" flipH="1">
-            <a:off x="2938618" y="1417139"/>
-            <a:ext cx="436381" cy="100584"/>
+            <a:off x="2901383" y="1379905"/>
+            <a:ext cx="434193" cy="177244"/>
           </a:xfrm>
           <a:prstGeom prst="triangle">
             <a:avLst/>

</xml_diff>